<commit_message>
Presentation before sending to Martin
Signed-off-by: Andrey Shamis <lolnik@gmail.com>
</commit_message>
<xml_diff>
--- a/מצגת.pptx
+++ b/מצגת.pptx
@@ -4,17 +4,25 @@
   <p:sldMasterIdLst>
     <p:sldMasterId id="2147483660" r:id="rId1"/>
   </p:sldMasterIdLst>
+  <p:notesMasterIdLst>
+    <p:notesMasterId r:id="rId17"/>
+  </p:notesMasterIdLst>
   <p:sldIdLst>
     <p:sldId id="256" r:id="rId2"/>
     <p:sldId id="257" r:id="rId3"/>
     <p:sldId id="258" r:id="rId4"/>
-    <p:sldId id="259" r:id="rId5"/>
-    <p:sldId id="260" r:id="rId6"/>
-    <p:sldId id="261" r:id="rId7"/>
-    <p:sldId id="262" r:id="rId8"/>
-    <p:sldId id="264" r:id="rId9"/>
-    <p:sldId id="263" r:id="rId10"/>
-    <p:sldId id="265" r:id="rId11"/>
+    <p:sldId id="266" r:id="rId5"/>
+    <p:sldId id="268" r:id="rId6"/>
+    <p:sldId id="267" r:id="rId7"/>
+    <p:sldId id="259" r:id="rId8"/>
+    <p:sldId id="260" r:id="rId9"/>
+    <p:sldId id="269" r:id="rId10"/>
+    <p:sldId id="261" r:id="rId11"/>
+    <p:sldId id="262" r:id="rId12"/>
+    <p:sldId id="264" r:id="rId13"/>
+    <p:sldId id="263" r:id="rId14"/>
+    <p:sldId id="270" r:id="rId15"/>
+    <p:sldId id="265" r:id="rId16"/>
   </p:sldIdLst>
   <p:sldSz cx="9144000" cy="6858000" type="screen4x3"/>
   <p:notesSz cx="6858000" cy="9144000"/>
@@ -116,6 +124,1201 @@
 </p:presentation>
 </file>
 
+<file path=ppt/notesMasters/notesMaster1.xml><?xml version="1.0" encoding="utf-8"?>
+<p:notesMaster xmlns:a="http://schemas.openxmlformats.org/drawingml/2006/main" xmlns:r="http://schemas.openxmlformats.org/officeDocument/2006/relationships" xmlns:p="http://schemas.openxmlformats.org/presentationml/2006/main">
+  <p:cSld>
+    <p:bg>
+      <p:bgRef idx="1001">
+        <a:schemeClr val="bg1"/>
+      </p:bgRef>
+    </p:bg>
+    <p:spTree>
+      <p:nvGrpSpPr>
+        <p:cNvPr id="1" name=""/>
+        <p:cNvGrpSpPr/>
+        <p:nvPr/>
+      </p:nvGrpSpPr>
+      <p:grpSpPr>
+        <a:xfrm>
+          <a:off x="0" y="0"/>
+          <a:ext cx="0" cy="0"/>
+          <a:chOff x="0" y="0"/>
+          <a:chExt cx="0" cy="0"/>
+        </a:xfrm>
+      </p:grpSpPr>
+      <p:sp>
+        <p:nvSpPr>
+          <p:cNvPr id="2" name="Header Placeholder 1"/>
+          <p:cNvSpPr>
+            <a:spLocks noGrp="1"/>
+          </p:cNvSpPr>
+          <p:nvPr>
+            <p:ph type="hdr" sz="quarter"/>
+          </p:nvPr>
+        </p:nvSpPr>
+        <p:spPr>
+          <a:xfrm>
+            <a:off x="3886200" y="0"/>
+            <a:ext cx="2971800" cy="457200"/>
+          </a:xfrm>
+          <a:prstGeom prst="rect">
+            <a:avLst/>
+          </a:prstGeom>
+        </p:spPr>
+        <p:txBody>
+          <a:bodyPr vert="horz" lIns="91440" tIns="45720" rIns="91440" bIns="45720" rtlCol="1"/>
+          <a:lstStyle>
+            <a:lvl1pPr algn="r">
+              <a:defRPr sz="1200"/>
+            </a:lvl1pPr>
+          </a:lstStyle>
+          <a:p>
+            <a:endParaRPr lang="he-IL"/>
+          </a:p>
+        </p:txBody>
+      </p:sp>
+      <p:sp>
+        <p:nvSpPr>
+          <p:cNvPr id="3" name="Date Placeholder 2"/>
+          <p:cNvSpPr>
+            <a:spLocks noGrp="1"/>
+          </p:cNvSpPr>
+          <p:nvPr>
+            <p:ph type="dt" idx="1"/>
+          </p:nvPr>
+        </p:nvSpPr>
+        <p:spPr>
+          <a:xfrm>
+            <a:off x="1588" y="0"/>
+            <a:ext cx="2971800" cy="457200"/>
+          </a:xfrm>
+          <a:prstGeom prst="rect">
+            <a:avLst/>
+          </a:prstGeom>
+        </p:spPr>
+        <p:txBody>
+          <a:bodyPr vert="horz" lIns="91440" tIns="45720" rIns="91440" bIns="45720" rtlCol="1"/>
+          <a:lstStyle>
+            <a:lvl1pPr algn="l">
+              <a:defRPr sz="1200"/>
+            </a:lvl1pPr>
+          </a:lstStyle>
+          <a:p>
+            <a:fld id="{9A78BA3A-7736-4AAE-B32E-AB7964FE7FAF}" type="datetimeFigureOut">
+              <a:rPr lang="he-IL" smtClean="0"/>
+              <a:t>ה'/כסלו/תשע"ג</a:t>
+            </a:fld>
+            <a:endParaRPr lang="he-IL"/>
+          </a:p>
+        </p:txBody>
+      </p:sp>
+      <p:sp>
+        <p:nvSpPr>
+          <p:cNvPr id="4" name="Slide Image Placeholder 3"/>
+          <p:cNvSpPr>
+            <a:spLocks noGrp="1" noRot="1" noChangeAspect="1"/>
+          </p:cNvSpPr>
+          <p:nvPr>
+            <p:ph type="sldImg" idx="2"/>
+          </p:nvPr>
+        </p:nvSpPr>
+        <p:spPr>
+          <a:xfrm>
+            <a:off x="1143000" y="685800"/>
+            <a:ext cx="4572000" cy="3429000"/>
+          </a:xfrm>
+          <a:prstGeom prst="rect">
+            <a:avLst/>
+          </a:prstGeom>
+          <a:noFill/>
+          <a:ln w="12700">
+            <a:solidFill>
+              <a:prstClr val="black"/>
+            </a:solidFill>
+          </a:ln>
+        </p:spPr>
+        <p:txBody>
+          <a:bodyPr vert="horz" lIns="91440" tIns="45720" rIns="91440" bIns="45720" rtlCol="1" anchor="ctr"/>
+          <a:lstStyle/>
+          <a:p>
+            <a:endParaRPr lang="he-IL"/>
+          </a:p>
+        </p:txBody>
+      </p:sp>
+      <p:sp>
+        <p:nvSpPr>
+          <p:cNvPr id="5" name="Notes Placeholder 4"/>
+          <p:cNvSpPr>
+            <a:spLocks noGrp="1"/>
+          </p:cNvSpPr>
+          <p:nvPr>
+            <p:ph type="body" sz="quarter" idx="3"/>
+          </p:nvPr>
+        </p:nvSpPr>
+        <p:spPr>
+          <a:xfrm>
+            <a:off x="685800" y="4343400"/>
+            <a:ext cx="5486400" cy="4114800"/>
+          </a:xfrm>
+          <a:prstGeom prst="rect">
+            <a:avLst/>
+          </a:prstGeom>
+        </p:spPr>
+        <p:txBody>
+          <a:bodyPr vert="horz" lIns="91440" tIns="45720" rIns="91440" bIns="45720" rtlCol="1"/>
+          <a:lstStyle/>
+          <a:p>
+            <a:pPr lvl="0"/>
+            <a:r>
+              <a:rPr lang="en-US" smtClean="0"/>
+              <a:t>Click to edit Master text styles</a:t>
+            </a:r>
+          </a:p>
+          <a:p>
+            <a:pPr lvl="1"/>
+            <a:r>
+              <a:rPr lang="en-US" smtClean="0"/>
+              <a:t>Second level</a:t>
+            </a:r>
+          </a:p>
+          <a:p>
+            <a:pPr lvl="2"/>
+            <a:r>
+              <a:rPr lang="en-US" smtClean="0"/>
+              <a:t>Third level</a:t>
+            </a:r>
+          </a:p>
+          <a:p>
+            <a:pPr lvl="3"/>
+            <a:r>
+              <a:rPr lang="en-US" smtClean="0"/>
+              <a:t>Fourth level</a:t>
+            </a:r>
+          </a:p>
+          <a:p>
+            <a:pPr lvl="4"/>
+            <a:r>
+              <a:rPr lang="en-US" smtClean="0"/>
+              <a:t>Fifth level</a:t>
+            </a:r>
+            <a:endParaRPr lang="he-IL"/>
+          </a:p>
+        </p:txBody>
+      </p:sp>
+      <p:sp>
+        <p:nvSpPr>
+          <p:cNvPr id="6" name="Footer Placeholder 5"/>
+          <p:cNvSpPr>
+            <a:spLocks noGrp="1"/>
+          </p:cNvSpPr>
+          <p:nvPr>
+            <p:ph type="ftr" sz="quarter" idx="4"/>
+          </p:nvPr>
+        </p:nvSpPr>
+        <p:spPr>
+          <a:xfrm>
+            <a:off x="3886200" y="8685213"/>
+            <a:ext cx="2971800" cy="457200"/>
+          </a:xfrm>
+          <a:prstGeom prst="rect">
+            <a:avLst/>
+          </a:prstGeom>
+        </p:spPr>
+        <p:txBody>
+          <a:bodyPr vert="horz" lIns="91440" tIns="45720" rIns="91440" bIns="45720" rtlCol="1" anchor="b"/>
+          <a:lstStyle>
+            <a:lvl1pPr algn="r">
+              <a:defRPr sz="1200"/>
+            </a:lvl1pPr>
+          </a:lstStyle>
+          <a:p>
+            <a:endParaRPr lang="he-IL"/>
+          </a:p>
+        </p:txBody>
+      </p:sp>
+      <p:sp>
+        <p:nvSpPr>
+          <p:cNvPr id="7" name="Slide Number Placeholder 6"/>
+          <p:cNvSpPr>
+            <a:spLocks noGrp="1"/>
+          </p:cNvSpPr>
+          <p:nvPr>
+            <p:ph type="sldNum" sz="quarter" idx="5"/>
+          </p:nvPr>
+        </p:nvSpPr>
+        <p:spPr>
+          <a:xfrm>
+            <a:off x="1588" y="8685213"/>
+            <a:ext cx="2971800" cy="457200"/>
+          </a:xfrm>
+          <a:prstGeom prst="rect">
+            <a:avLst/>
+          </a:prstGeom>
+        </p:spPr>
+        <p:txBody>
+          <a:bodyPr vert="horz" lIns="91440" tIns="45720" rIns="91440" bIns="45720" rtlCol="1" anchor="b"/>
+          <a:lstStyle>
+            <a:lvl1pPr algn="l">
+              <a:defRPr sz="1200"/>
+            </a:lvl1pPr>
+          </a:lstStyle>
+          <a:p>
+            <a:fld id="{7A6A5AAE-82E3-4B26-81AD-E86F1575EFF2}" type="slidenum">
+              <a:rPr lang="he-IL" smtClean="0"/>
+              <a:t>‹#›</a:t>
+            </a:fld>
+            <a:endParaRPr lang="he-IL"/>
+          </a:p>
+        </p:txBody>
+      </p:sp>
+    </p:spTree>
+    <p:extLst>
+      <p:ext uri="{BB962C8B-B14F-4D97-AF65-F5344CB8AC3E}">
+        <p14:creationId xmlns:p14="http://schemas.microsoft.com/office/powerpoint/2010/main" val="2363625559"/>
+      </p:ext>
+    </p:extLst>
+  </p:cSld>
+  <p:clrMap bg1="lt1" tx1="dk1" bg2="lt2" tx2="dk2" accent1="accent1" accent2="accent2" accent3="accent3" accent4="accent4" accent5="accent5" accent6="accent6" hlink="hlink" folHlink="folHlink"/>
+  <p:notesStyle>
+    <a:lvl1pPr marL="0" algn="r" defTabSz="914400" rtl="1" eaLnBrk="1" latinLnBrk="0" hangingPunct="1">
+      <a:defRPr sz="1200" kern="1200">
+        <a:solidFill>
+          <a:schemeClr val="tx1"/>
+        </a:solidFill>
+        <a:latin typeface="+mn-lt"/>
+        <a:ea typeface="+mn-ea"/>
+        <a:cs typeface="+mn-cs"/>
+      </a:defRPr>
+    </a:lvl1pPr>
+    <a:lvl2pPr marL="457200" algn="r" defTabSz="914400" rtl="1" eaLnBrk="1" latinLnBrk="0" hangingPunct="1">
+      <a:defRPr sz="1200" kern="1200">
+        <a:solidFill>
+          <a:schemeClr val="tx1"/>
+        </a:solidFill>
+        <a:latin typeface="+mn-lt"/>
+        <a:ea typeface="+mn-ea"/>
+        <a:cs typeface="+mn-cs"/>
+      </a:defRPr>
+    </a:lvl2pPr>
+    <a:lvl3pPr marL="914400" algn="r" defTabSz="914400" rtl="1" eaLnBrk="1" latinLnBrk="0" hangingPunct="1">
+      <a:defRPr sz="1200" kern="1200">
+        <a:solidFill>
+          <a:schemeClr val="tx1"/>
+        </a:solidFill>
+        <a:latin typeface="+mn-lt"/>
+        <a:ea typeface="+mn-ea"/>
+        <a:cs typeface="+mn-cs"/>
+      </a:defRPr>
+    </a:lvl3pPr>
+    <a:lvl4pPr marL="1371600" algn="r" defTabSz="914400" rtl="1" eaLnBrk="1" latinLnBrk="0" hangingPunct="1">
+      <a:defRPr sz="1200" kern="1200">
+        <a:solidFill>
+          <a:schemeClr val="tx1"/>
+        </a:solidFill>
+        <a:latin typeface="+mn-lt"/>
+        <a:ea typeface="+mn-ea"/>
+        <a:cs typeface="+mn-cs"/>
+      </a:defRPr>
+    </a:lvl4pPr>
+    <a:lvl5pPr marL="1828800" algn="r" defTabSz="914400" rtl="1" eaLnBrk="1" latinLnBrk="0" hangingPunct="1">
+      <a:defRPr sz="1200" kern="1200">
+        <a:solidFill>
+          <a:schemeClr val="tx1"/>
+        </a:solidFill>
+        <a:latin typeface="+mn-lt"/>
+        <a:ea typeface="+mn-ea"/>
+        <a:cs typeface="+mn-cs"/>
+      </a:defRPr>
+    </a:lvl5pPr>
+    <a:lvl6pPr marL="2286000" algn="r" defTabSz="914400" rtl="1" eaLnBrk="1" latinLnBrk="0" hangingPunct="1">
+      <a:defRPr sz="1200" kern="1200">
+        <a:solidFill>
+          <a:schemeClr val="tx1"/>
+        </a:solidFill>
+        <a:latin typeface="+mn-lt"/>
+        <a:ea typeface="+mn-ea"/>
+        <a:cs typeface="+mn-cs"/>
+      </a:defRPr>
+    </a:lvl6pPr>
+    <a:lvl7pPr marL="2743200" algn="r" defTabSz="914400" rtl="1" eaLnBrk="1" latinLnBrk="0" hangingPunct="1">
+      <a:defRPr sz="1200" kern="1200">
+        <a:solidFill>
+          <a:schemeClr val="tx1"/>
+        </a:solidFill>
+        <a:latin typeface="+mn-lt"/>
+        <a:ea typeface="+mn-ea"/>
+        <a:cs typeface="+mn-cs"/>
+      </a:defRPr>
+    </a:lvl7pPr>
+    <a:lvl8pPr marL="3200400" algn="r" defTabSz="914400" rtl="1" eaLnBrk="1" latinLnBrk="0" hangingPunct="1">
+      <a:defRPr sz="1200" kern="1200">
+        <a:solidFill>
+          <a:schemeClr val="tx1"/>
+        </a:solidFill>
+        <a:latin typeface="+mn-lt"/>
+        <a:ea typeface="+mn-ea"/>
+        <a:cs typeface="+mn-cs"/>
+      </a:defRPr>
+    </a:lvl8pPr>
+    <a:lvl9pPr marL="3657600" algn="r" defTabSz="914400" rtl="1" eaLnBrk="1" latinLnBrk="0" hangingPunct="1">
+      <a:defRPr sz="1200" kern="1200">
+        <a:solidFill>
+          <a:schemeClr val="tx1"/>
+        </a:solidFill>
+        <a:latin typeface="+mn-lt"/>
+        <a:ea typeface="+mn-ea"/>
+        <a:cs typeface="+mn-cs"/>
+      </a:defRPr>
+    </a:lvl9pPr>
+  </p:notesStyle>
+</p:notesMaster>
+</file>
+
+<file path=ppt/notesSlides/notesSlide1.xml><?xml version="1.0" encoding="utf-8"?>
+<p:notes xmlns:a="http://schemas.openxmlformats.org/drawingml/2006/main" xmlns:r="http://schemas.openxmlformats.org/officeDocument/2006/relationships" xmlns:p="http://schemas.openxmlformats.org/presentationml/2006/main">
+  <p:cSld>
+    <p:spTree>
+      <p:nvGrpSpPr>
+        <p:cNvPr id="1" name=""/>
+        <p:cNvGrpSpPr/>
+        <p:nvPr/>
+      </p:nvGrpSpPr>
+      <p:grpSpPr>
+        <a:xfrm>
+          <a:off x="0" y="0"/>
+          <a:ext cx="0" cy="0"/>
+          <a:chOff x="0" y="0"/>
+          <a:chExt cx="0" cy="0"/>
+        </a:xfrm>
+      </p:grpSpPr>
+      <p:sp>
+        <p:nvSpPr>
+          <p:cNvPr id="2" name="Slide Image Placeholder 1"/>
+          <p:cNvSpPr>
+            <a:spLocks noGrp="1" noRot="1" noChangeAspect="1"/>
+          </p:cNvSpPr>
+          <p:nvPr>
+            <p:ph type="sldImg"/>
+          </p:nvPr>
+        </p:nvSpPr>
+        <p:spPr/>
+      </p:sp>
+      <p:sp>
+        <p:nvSpPr>
+          <p:cNvPr id="3" name="Notes Placeholder 2"/>
+          <p:cNvSpPr>
+            <a:spLocks noGrp="1"/>
+          </p:cNvSpPr>
+          <p:nvPr>
+            <p:ph type="body" idx="1"/>
+          </p:nvPr>
+        </p:nvSpPr>
+        <p:spPr/>
+        <p:txBody>
+          <a:bodyPr/>
+          <a:lstStyle/>
+          <a:p>
+            <a:pPr marL="171450" marR="0" indent="-171450" algn="r" defTabSz="914400" rtl="1" eaLnBrk="1" fontAlgn="auto" latinLnBrk="0" hangingPunct="1">
+              <a:lnSpc>
+                <a:spcPct val="100000"/>
+              </a:lnSpc>
+              <a:spcBef>
+                <a:spcPts val="0"/>
+              </a:spcBef>
+              <a:spcAft>
+                <a:spcPts val="0"/>
+              </a:spcAft>
+              <a:buClrTx/>
+              <a:buSzTx/>
+              <a:buFont typeface="Arial" pitchFamily="34" charset="0"/>
+              <a:buChar char="•"/>
+              <a:tabLst/>
+              <a:defRPr/>
+            </a:pPr>
+            <a:r>
+              <a:rPr lang="he-IL" dirty="0" smtClean="0"/>
+              <a:t>מאז הולדתה של תקשורת אלחוטית</a:t>
+            </a:r>
+            <a:r>
+              <a:rPr lang="en-US" dirty="0" smtClean="0"/>
+              <a:t>WIFI </a:t>
+            </a:r>
+            <a:r>
+              <a:rPr lang="he-IL" dirty="0" smtClean="0"/>
+              <a:t> ועד היום פותחו מספר רב של דרכים ופרוטוקולים להעברת מיידע באמצעות תווך </a:t>
+            </a:r>
+            <a:r>
+              <a:rPr lang="en-US" dirty="0" smtClean="0"/>
+              <a:t>WIFI</a:t>
+            </a:r>
+            <a:r>
+              <a:rPr lang="he-IL" dirty="0" smtClean="0"/>
+              <a:t>.  </a:t>
+            </a:r>
+          </a:p>
+          <a:p>
+            <a:pPr marL="171450" indent="-171450" algn="r" rtl="1">
+              <a:buFont typeface="Arial" pitchFamily="34" charset="0"/>
+              <a:buChar char="•"/>
+            </a:pPr>
+            <a:r>
+              <a:rPr lang="he-IL" dirty="0" smtClean="0"/>
+              <a:t>כיום מכשיר בעל התקן </a:t>
+            </a:r>
+            <a:r>
+              <a:rPr lang="en-US" dirty="0" smtClean="0"/>
+              <a:t>WIFI </a:t>
+            </a:r>
+            <a:r>
+              <a:rPr lang="he-IL" dirty="0" smtClean="0"/>
+              <a:t> תומך במספר רב של פרוטוקולים הנ"ל.  ברוב המקרים התקשורת מתבצעת באמצעות נקודת גישה (</a:t>
+            </a:r>
+            <a:r>
+              <a:rPr lang="en-US" dirty="0" smtClean="0"/>
+              <a:t>Access Point</a:t>
+            </a:r>
+            <a:r>
+              <a:rPr lang="he-IL" dirty="0" smtClean="0"/>
+              <a:t>).  לכל פרוטוקול יש היתרונות וחסרונות שונים בין פרוטוקול לפרוטוקול התלויים בתנאי סביבה, חומרת ההתקנים, וציוד קצה. אופן עבודה עם </a:t>
+            </a:r>
+            <a:r>
+              <a:rPr lang="en-US" dirty="0" smtClean="0"/>
+              <a:t>WIFI</a:t>
+            </a:r>
+            <a:r>
+              <a:rPr lang="he-IL" dirty="0" smtClean="0"/>
+              <a:t> מתחלק לשני סוגים עיקריים: </a:t>
+            </a:r>
+            <a:endParaRPr lang="ru-RU" dirty="0" smtClean="0"/>
+          </a:p>
+          <a:p>
+            <a:pPr marL="628650" lvl="1" indent="-171450" algn="r" rtl="1">
+              <a:buFont typeface="Arial" pitchFamily="34" charset="0"/>
+              <a:buChar char="•"/>
+            </a:pPr>
+            <a:r>
+              <a:rPr lang="he-IL" dirty="0" smtClean="0"/>
+              <a:t>תקשורת ישירה בין שני התקני </a:t>
+            </a:r>
+            <a:r>
+              <a:rPr lang="en-US" dirty="0" smtClean="0"/>
+              <a:t>WIFI </a:t>
+            </a:r>
+            <a:r>
+              <a:rPr lang="he-IL" dirty="0" smtClean="0"/>
+              <a:t>(</a:t>
+            </a:r>
+            <a:r>
+              <a:rPr lang="en-US" dirty="0" smtClean="0"/>
+              <a:t>IBSS, Tunneled Data Link Setup - TDLS , WIFI Direct</a:t>
+            </a:r>
+            <a:r>
+              <a:rPr lang="he-IL" dirty="0" smtClean="0"/>
+              <a:t>)</a:t>
+            </a:r>
+            <a:endParaRPr lang="ru-RU" dirty="0" smtClean="0"/>
+          </a:p>
+          <a:p>
+            <a:pPr marL="628650" lvl="1" indent="-171450" algn="r" rtl="1">
+              <a:buFont typeface="Arial" pitchFamily="34" charset="0"/>
+              <a:buChar char="•"/>
+            </a:pPr>
+            <a:r>
+              <a:rPr lang="he-IL" dirty="0" smtClean="0"/>
+              <a:t>תקשורת לא ישירה המשתמשת בנקודת גישה (</a:t>
+            </a:r>
+            <a:r>
+              <a:rPr lang="en-US" dirty="0" smtClean="0"/>
+              <a:t>Base Service Set - BSS</a:t>
+            </a:r>
+            <a:r>
+              <a:rPr lang="he-IL" dirty="0" smtClean="0"/>
+              <a:t>)</a:t>
+            </a:r>
+            <a:endParaRPr lang="ru-RU" dirty="0" smtClean="0"/>
+          </a:p>
+          <a:p>
+            <a:pPr marL="171450" marR="0" indent="-171450" algn="r" defTabSz="914400" rtl="1" eaLnBrk="1" fontAlgn="auto" latinLnBrk="0" hangingPunct="1">
+              <a:lnSpc>
+                <a:spcPct val="100000"/>
+              </a:lnSpc>
+              <a:spcBef>
+                <a:spcPts val="0"/>
+              </a:spcBef>
+              <a:spcAft>
+                <a:spcPts val="0"/>
+              </a:spcAft>
+              <a:buClrTx/>
+              <a:buSzTx/>
+              <a:buFont typeface="Arial" pitchFamily="34" charset="0"/>
+              <a:buChar char="•"/>
+              <a:tabLst/>
+              <a:defRPr/>
+            </a:pPr>
+            <a:endParaRPr lang="he-IL" dirty="0" smtClean="0"/>
+          </a:p>
+          <a:p>
+            <a:pPr marL="171450" marR="0" indent="-171450" algn="r" defTabSz="914400" rtl="1" eaLnBrk="1" fontAlgn="auto" latinLnBrk="0" hangingPunct="1">
+              <a:lnSpc>
+                <a:spcPct val="100000"/>
+              </a:lnSpc>
+              <a:spcBef>
+                <a:spcPts val="0"/>
+              </a:spcBef>
+              <a:spcAft>
+                <a:spcPts val="0"/>
+              </a:spcAft>
+              <a:buClrTx/>
+              <a:buSzTx/>
+              <a:buFont typeface="Arial" pitchFamily="34" charset="0"/>
+              <a:buChar char="•"/>
+              <a:tabLst/>
+              <a:defRPr/>
+            </a:pPr>
+            <a:endParaRPr lang="he-IL" dirty="0" smtClean="0"/>
+          </a:p>
+          <a:p>
+            <a:endParaRPr lang="he-IL" dirty="0" smtClean="0"/>
+          </a:p>
+          <a:p>
+            <a:endParaRPr lang="he-IL" dirty="0"/>
+          </a:p>
+        </p:txBody>
+      </p:sp>
+      <p:sp>
+        <p:nvSpPr>
+          <p:cNvPr id="4" name="Slide Number Placeholder 3"/>
+          <p:cNvSpPr>
+            <a:spLocks noGrp="1"/>
+          </p:cNvSpPr>
+          <p:nvPr>
+            <p:ph type="sldNum" sz="quarter" idx="10"/>
+          </p:nvPr>
+        </p:nvSpPr>
+        <p:spPr/>
+        <p:txBody>
+          <a:bodyPr/>
+          <a:lstStyle/>
+          <a:p>
+            <a:fld id="{7A6A5AAE-82E3-4B26-81AD-E86F1575EFF2}" type="slidenum">
+              <a:rPr lang="he-IL" smtClean="0"/>
+              <a:t>3</a:t>
+            </a:fld>
+            <a:endParaRPr lang="he-IL"/>
+          </a:p>
+        </p:txBody>
+      </p:sp>
+    </p:spTree>
+    <p:extLst>
+      <p:ext uri="{BB962C8B-B14F-4D97-AF65-F5344CB8AC3E}">
+        <p14:creationId xmlns:p14="http://schemas.microsoft.com/office/powerpoint/2010/main" val="1845053797"/>
+      </p:ext>
+    </p:extLst>
+  </p:cSld>
+  <p:clrMapOvr>
+    <a:masterClrMapping/>
+  </p:clrMapOvr>
+</p:notes>
+</file>
+
+<file path=ppt/notesSlides/notesSlide2.xml><?xml version="1.0" encoding="utf-8"?>
+<p:notes xmlns:a="http://schemas.openxmlformats.org/drawingml/2006/main" xmlns:r="http://schemas.openxmlformats.org/officeDocument/2006/relationships" xmlns:p="http://schemas.openxmlformats.org/presentationml/2006/main">
+  <p:cSld>
+    <p:spTree>
+      <p:nvGrpSpPr>
+        <p:cNvPr id="1" name=""/>
+        <p:cNvGrpSpPr/>
+        <p:nvPr/>
+      </p:nvGrpSpPr>
+      <p:grpSpPr>
+        <a:xfrm>
+          <a:off x="0" y="0"/>
+          <a:ext cx="0" cy="0"/>
+          <a:chOff x="0" y="0"/>
+          <a:chExt cx="0" cy="0"/>
+        </a:xfrm>
+      </p:grpSpPr>
+      <p:sp>
+        <p:nvSpPr>
+          <p:cNvPr id="2" name="Slide Image Placeholder 1"/>
+          <p:cNvSpPr>
+            <a:spLocks noGrp="1" noRot="1" noChangeAspect="1"/>
+          </p:cNvSpPr>
+          <p:nvPr>
+            <p:ph type="sldImg"/>
+          </p:nvPr>
+        </p:nvSpPr>
+        <p:spPr/>
+      </p:sp>
+      <p:sp>
+        <p:nvSpPr>
+          <p:cNvPr id="3" name="Notes Placeholder 2"/>
+          <p:cNvSpPr>
+            <a:spLocks noGrp="1"/>
+          </p:cNvSpPr>
+          <p:nvPr>
+            <p:ph type="body" idx="1"/>
+          </p:nvPr>
+        </p:nvSpPr>
+        <p:spPr/>
+        <p:txBody>
+          <a:bodyPr/>
+          <a:lstStyle/>
+          <a:p>
+            <a:pPr marL="0" marR="0" indent="0" algn="r" defTabSz="914400" rtl="1" eaLnBrk="1" fontAlgn="auto" latinLnBrk="0" hangingPunct="1">
+              <a:lnSpc>
+                <a:spcPct val="100000"/>
+              </a:lnSpc>
+              <a:spcBef>
+                <a:spcPts val="0"/>
+              </a:spcBef>
+              <a:spcAft>
+                <a:spcPts val="0"/>
+              </a:spcAft>
+              <a:buClrTx/>
+              <a:buSzTx/>
+              <a:buFontTx/>
+              <a:buNone/>
+              <a:tabLst/>
+              <a:defRPr/>
+            </a:pPr>
+            <a:r>
+              <a:rPr lang="he-IL" dirty="0" smtClean="0"/>
+              <a:t>אחד הפרוטוקולים החדשים שמפתחים כיום נקרא</a:t>
+            </a:r>
+            <a:r>
+              <a:rPr lang="en-US" dirty="0" smtClean="0"/>
+              <a:t> TDLS (802.11z) </a:t>
+            </a:r>
+            <a:r>
+              <a:rPr lang="he-IL" dirty="0" smtClean="0"/>
+              <a:t>שהוסף ב – 2012 כהרחבה ל</a:t>
+            </a:r>
+            <a:r>
+              <a:rPr lang="en-US" dirty="0" smtClean="0"/>
+              <a:t> -</a:t>
+            </a:r>
+            <a:r>
+              <a:rPr lang="he-IL" dirty="0" smtClean="0"/>
+              <a:t> 802.11 2007 </a:t>
+            </a:r>
+            <a:r>
+              <a:rPr lang="en-US" dirty="0" smtClean="0"/>
+              <a:t>specification</a:t>
+            </a:r>
+            <a:r>
+              <a:rPr lang="he-IL" dirty="0" smtClean="0"/>
+              <a:t>. פרוטוקול זה מאפשר העברת מידע בצורה ישירה ומאובטחת בין שני התקני</a:t>
+            </a:r>
+            <a:r>
+              <a:rPr lang="en-US" dirty="0" smtClean="0"/>
+              <a:t>WIFI  </a:t>
+            </a:r>
+            <a:r>
+              <a:rPr lang="he-IL" dirty="0" smtClean="0"/>
+              <a:t>שעובדים באותו </a:t>
+            </a:r>
+            <a:r>
+              <a:rPr lang="en-US" dirty="0" smtClean="0"/>
+              <a:t>BSS </a:t>
+            </a:r>
+            <a:r>
+              <a:rPr lang="he-IL" dirty="0" smtClean="0"/>
+              <a:t>ללא צורך בהתנתקות מנקודתה גישה, כלומר אפשר להמשיך לעבוד במקביל בדרך הרגילה דרך נקודת גישה. לאור הנאמר לעיל גם בעת עבודה ב- </a:t>
+            </a:r>
+            <a:r>
+              <a:rPr lang="en-US" dirty="0" smtClean="0"/>
+              <a:t>TDLS</a:t>
+            </a:r>
+            <a:r>
+              <a:rPr lang="he-IL" dirty="0" smtClean="0"/>
+              <a:t> לא תמיד נקבל את הביצועים האופטימאליים. למשל בהעברה ישירה, עכב המרחק הרב בין שתי תחנות </a:t>
+            </a:r>
+            <a:r>
+              <a:rPr lang="en-US" dirty="0" smtClean="0"/>
+              <a:t>WIFI</a:t>
+            </a:r>
+            <a:r>
+              <a:rPr lang="he-IL" dirty="0" smtClean="0"/>
+              <a:t> ,מיקומן הפיזי ורעשים בסביבת העבודה, קצב שידור הנתונים ירד. במצב הזה יש לשקול להעביר נתונים דרך נקודת גישה כדי לקבל ביצועים טובים יותר, כלומר לחזור לעבוד בדרך הרגילה.</a:t>
+            </a:r>
+          </a:p>
+          <a:p>
+            <a:pPr marL="171450" marR="0" indent="-171450" algn="r" defTabSz="914400" rtl="1" eaLnBrk="1" fontAlgn="auto" latinLnBrk="0" hangingPunct="1">
+              <a:lnSpc>
+                <a:spcPct val="100000"/>
+              </a:lnSpc>
+              <a:spcBef>
+                <a:spcPts val="0"/>
+              </a:spcBef>
+              <a:spcAft>
+                <a:spcPts val="0"/>
+              </a:spcAft>
+              <a:buClrTx/>
+              <a:buSzTx/>
+              <a:buFont typeface="Arial" pitchFamily="34" charset="0"/>
+              <a:buChar char="•"/>
+              <a:tabLst/>
+              <a:defRPr/>
+            </a:pPr>
+            <a:r>
+              <a:rPr lang="he-IL" dirty="0" smtClean="0"/>
+              <a:t>כדי להגיע לביצועים האופטימאליים (</a:t>
+            </a:r>
+            <a:r>
+              <a:rPr lang="en-US" b="1" dirty="0" smtClean="0"/>
+              <a:t>throughput</a:t>
+            </a:r>
+            <a:r>
+              <a:rPr lang="he-IL" dirty="0" smtClean="0"/>
+              <a:t>) במהלך עבודה על תווך </a:t>
+            </a:r>
+            <a:r>
+              <a:rPr lang="en-US" dirty="0" smtClean="0"/>
+              <a:t>WIFI</a:t>
+            </a:r>
+            <a:r>
+              <a:rPr lang="he-IL" dirty="0" smtClean="0"/>
+              <a:t> ישנו צורך לדגום מעת לעת את תנאי הסביבה והחומרה של התקן </a:t>
+            </a:r>
+            <a:r>
+              <a:rPr lang="en-US" dirty="0" smtClean="0"/>
+              <a:t>WIFI</a:t>
+            </a:r>
+            <a:r>
+              <a:rPr lang="he-IL" dirty="0" smtClean="0"/>
+              <a:t> על מנת לבחור בפרוטוקול האופטימלי לתנאי הסביבה הנוכחים. בחירה זו נקראת </a:t>
+            </a:r>
+            <a:r>
+              <a:rPr lang="en-US" dirty="0" smtClean="0"/>
+              <a:t>Smart Link Selection (SLS)</a:t>
+            </a:r>
+            <a:r>
+              <a:rPr lang="he-IL" dirty="0" smtClean="0"/>
+              <a:t>.</a:t>
+            </a:r>
+            <a:endParaRPr lang="ru-RU" dirty="0" smtClean="0"/>
+          </a:p>
+          <a:p>
+            <a:pPr marL="171450" marR="0" indent="-171450" algn="r" defTabSz="914400" rtl="1" eaLnBrk="1" fontAlgn="auto" latinLnBrk="0" hangingPunct="1">
+              <a:lnSpc>
+                <a:spcPct val="100000"/>
+              </a:lnSpc>
+              <a:spcBef>
+                <a:spcPts val="0"/>
+              </a:spcBef>
+              <a:spcAft>
+                <a:spcPts val="0"/>
+              </a:spcAft>
+              <a:buClrTx/>
+              <a:buSzTx/>
+              <a:buFont typeface="Arial" pitchFamily="34" charset="0"/>
+              <a:buChar char="•"/>
+              <a:tabLst/>
+              <a:defRPr/>
+            </a:pPr>
+            <a:endParaRPr lang="he-IL" dirty="0" smtClean="0"/>
+          </a:p>
+          <a:p>
+            <a:endParaRPr lang="he-IL" dirty="0"/>
+          </a:p>
+        </p:txBody>
+      </p:sp>
+      <p:sp>
+        <p:nvSpPr>
+          <p:cNvPr id="4" name="Slide Number Placeholder 3"/>
+          <p:cNvSpPr>
+            <a:spLocks noGrp="1"/>
+          </p:cNvSpPr>
+          <p:nvPr>
+            <p:ph type="sldNum" sz="quarter" idx="10"/>
+          </p:nvPr>
+        </p:nvSpPr>
+        <p:spPr/>
+        <p:txBody>
+          <a:bodyPr/>
+          <a:lstStyle/>
+          <a:p>
+            <a:fld id="{7A6A5AAE-82E3-4B26-81AD-E86F1575EFF2}" type="slidenum">
+              <a:rPr lang="he-IL" smtClean="0"/>
+              <a:t>4</a:t>
+            </a:fld>
+            <a:endParaRPr lang="he-IL"/>
+          </a:p>
+        </p:txBody>
+      </p:sp>
+    </p:spTree>
+    <p:extLst>
+      <p:ext uri="{BB962C8B-B14F-4D97-AF65-F5344CB8AC3E}">
+        <p14:creationId xmlns:p14="http://schemas.microsoft.com/office/powerpoint/2010/main" val="1860896246"/>
+      </p:ext>
+    </p:extLst>
+  </p:cSld>
+  <p:clrMapOvr>
+    <a:masterClrMapping/>
+  </p:clrMapOvr>
+</p:notes>
+</file>
+
+<file path=ppt/notesSlides/notesSlide3.xml><?xml version="1.0" encoding="utf-8"?>
+<p:notes xmlns:a="http://schemas.openxmlformats.org/drawingml/2006/main" xmlns:r="http://schemas.openxmlformats.org/officeDocument/2006/relationships" xmlns:p="http://schemas.openxmlformats.org/presentationml/2006/main">
+  <p:cSld>
+    <p:spTree>
+      <p:nvGrpSpPr>
+        <p:cNvPr id="1" name=""/>
+        <p:cNvGrpSpPr/>
+        <p:nvPr/>
+      </p:nvGrpSpPr>
+      <p:grpSpPr>
+        <a:xfrm>
+          <a:off x="0" y="0"/>
+          <a:ext cx="0" cy="0"/>
+          <a:chOff x="0" y="0"/>
+          <a:chExt cx="0" cy="0"/>
+        </a:xfrm>
+      </p:grpSpPr>
+      <p:sp>
+        <p:nvSpPr>
+          <p:cNvPr id="2" name="Slide Image Placeholder 1"/>
+          <p:cNvSpPr>
+            <a:spLocks noGrp="1" noRot="1" noChangeAspect="1"/>
+          </p:cNvSpPr>
+          <p:nvPr>
+            <p:ph type="sldImg"/>
+          </p:nvPr>
+        </p:nvSpPr>
+        <p:spPr/>
+      </p:sp>
+      <p:sp>
+        <p:nvSpPr>
+          <p:cNvPr id="3" name="Notes Placeholder 2"/>
+          <p:cNvSpPr>
+            <a:spLocks noGrp="1"/>
+          </p:cNvSpPr>
+          <p:nvPr>
+            <p:ph type="body" idx="1"/>
+          </p:nvPr>
+        </p:nvSpPr>
+        <p:spPr/>
+        <p:txBody>
+          <a:bodyPr/>
+          <a:lstStyle/>
+          <a:p>
+            <a:pPr marL="0" marR="0" indent="0" algn="r" defTabSz="914400" rtl="1" eaLnBrk="1" fontAlgn="auto" latinLnBrk="0" hangingPunct="1">
+              <a:lnSpc>
+                <a:spcPct val="100000"/>
+              </a:lnSpc>
+              <a:spcBef>
+                <a:spcPts val="0"/>
+              </a:spcBef>
+              <a:spcAft>
+                <a:spcPts val="0"/>
+              </a:spcAft>
+              <a:buClrTx/>
+              <a:buSzTx/>
+              <a:buFontTx/>
+              <a:buNone/>
+              <a:tabLst/>
+              <a:defRPr/>
+            </a:pPr>
+            <a:r>
+              <a:rPr lang="he-IL" dirty="0" smtClean="0"/>
+              <a:t>כדי להגיע לביצועים האופטימאליים (</a:t>
+            </a:r>
+            <a:r>
+              <a:rPr lang="en-US" b="1" dirty="0" smtClean="0"/>
+              <a:t>throughput</a:t>
+            </a:r>
+            <a:r>
+              <a:rPr lang="he-IL" dirty="0" smtClean="0"/>
+              <a:t>) במהלך עבודה על תווך </a:t>
+            </a:r>
+            <a:r>
+              <a:rPr lang="en-US" dirty="0" smtClean="0"/>
+              <a:t>WIFI</a:t>
+            </a:r>
+            <a:r>
+              <a:rPr lang="he-IL" dirty="0" smtClean="0"/>
+              <a:t> ישנו צורך לדגום מעת לעת את תנאי הסביבה והחומרה של התקן </a:t>
+            </a:r>
+            <a:r>
+              <a:rPr lang="en-US" dirty="0" smtClean="0"/>
+              <a:t>WIFI</a:t>
+            </a:r>
+            <a:r>
+              <a:rPr lang="he-IL" dirty="0" smtClean="0"/>
+              <a:t> על מנת לבחור בפרוטוקול האופטימלי לתנאי הסביבה הנוכחים. בחירה זו נקראת </a:t>
+            </a:r>
+            <a:r>
+              <a:rPr lang="en-US" dirty="0" smtClean="0"/>
+              <a:t>Smart Link Selection (SLS)</a:t>
+            </a:r>
+            <a:r>
+              <a:rPr lang="he-IL" dirty="0" smtClean="0"/>
+              <a:t>.</a:t>
+            </a:r>
+            <a:endParaRPr lang="ru-RU" dirty="0" smtClean="0"/>
+          </a:p>
+          <a:p>
+            <a:endParaRPr lang="he-IL" dirty="0"/>
+          </a:p>
+        </p:txBody>
+      </p:sp>
+      <p:sp>
+        <p:nvSpPr>
+          <p:cNvPr id="4" name="Slide Number Placeholder 3"/>
+          <p:cNvSpPr>
+            <a:spLocks noGrp="1"/>
+          </p:cNvSpPr>
+          <p:nvPr>
+            <p:ph type="sldNum" sz="quarter" idx="10"/>
+          </p:nvPr>
+        </p:nvSpPr>
+        <p:spPr/>
+        <p:txBody>
+          <a:bodyPr/>
+          <a:lstStyle/>
+          <a:p>
+            <a:fld id="{7A6A5AAE-82E3-4B26-81AD-E86F1575EFF2}" type="slidenum">
+              <a:rPr lang="he-IL" smtClean="0"/>
+              <a:t>6</a:t>
+            </a:fld>
+            <a:endParaRPr lang="he-IL"/>
+          </a:p>
+        </p:txBody>
+      </p:sp>
+    </p:spTree>
+    <p:extLst>
+      <p:ext uri="{BB962C8B-B14F-4D97-AF65-F5344CB8AC3E}">
+        <p14:creationId xmlns:p14="http://schemas.microsoft.com/office/powerpoint/2010/main" val="2529703140"/>
+      </p:ext>
+    </p:extLst>
+  </p:cSld>
+  <p:clrMapOvr>
+    <a:masterClrMapping/>
+  </p:clrMapOvr>
+</p:notes>
+</file>
+
+<file path=ppt/notesSlides/notesSlide4.xml><?xml version="1.0" encoding="utf-8"?>
+<p:notes xmlns:a="http://schemas.openxmlformats.org/drawingml/2006/main" xmlns:r="http://schemas.openxmlformats.org/officeDocument/2006/relationships" xmlns:p="http://schemas.openxmlformats.org/presentationml/2006/main">
+  <p:cSld>
+    <p:spTree>
+      <p:nvGrpSpPr>
+        <p:cNvPr id="1" name=""/>
+        <p:cNvGrpSpPr/>
+        <p:nvPr/>
+      </p:nvGrpSpPr>
+      <p:grpSpPr>
+        <a:xfrm>
+          <a:off x="0" y="0"/>
+          <a:ext cx="0" cy="0"/>
+          <a:chOff x="0" y="0"/>
+          <a:chExt cx="0" cy="0"/>
+        </a:xfrm>
+      </p:grpSpPr>
+      <p:sp>
+        <p:nvSpPr>
+          <p:cNvPr id="2" name="Slide Image Placeholder 1"/>
+          <p:cNvSpPr>
+            <a:spLocks noGrp="1" noRot="1" noChangeAspect="1"/>
+          </p:cNvSpPr>
+          <p:nvPr>
+            <p:ph type="sldImg"/>
+          </p:nvPr>
+        </p:nvSpPr>
+        <p:spPr/>
+      </p:sp>
+      <p:sp>
+        <p:nvSpPr>
+          <p:cNvPr id="3" name="Notes Placeholder 2"/>
+          <p:cNvSpPr>
+            <a:spLocks noGrp="1"/>
+          </p:cNvSpPr>
+          <p:nvPr>
+            <p:ph type="body" idx="1"/>
+          </p:nvPr>
+        </p:nvSpPr>
+        <p:spPr/>
+        <p:txBody>
+          <a:bodyPr/>
+          <a:lstStyle/>
+          <a:p>
+            <a:pPr marL="171450" lvl="0" indent="-171450" algn="r" rtl="1">
+              <a:buFont typeface="Arial" pitchFamily="34" charset="0"/>
+              <a:buChar char="•"/>
+            </a:pPr>
+            <a:r>
+              <a:rPr lang="he-IL" b="1" dirty="0" smtClean="0"/>
+              <a:t>נבדוק שהאלגוריתמים נותנים יעילות מרבית </a:t>
+            </a:r>
+            <a:r>
+              <a:rPr lang="he-IL" dirty="0" smtClean="0"/>
+              <a:t>– נבחר </a:t>
+            </a:r>
+            <a:r>
+              <a:rPr lang="en-US" dirty="0" smtClean="0"/>
+              <a:t>X</a:t>
+            </a:r>
+            <a:r>
+              <a:rPr lang="he-IL" dirty="0" smtClean="0"/>
+              <a:t> מצבי סביבה שונים (מצבים קיצוניים וחשובים). נחשב תאורטית באיזה משני מודי עבודה עדיף לנו לעבוד במצבים הנ"ל ע"מ לקבל קצב העברת נתונים מרבי. נבדוק שגם האלגוריתמים שלנו מבצעים בחירה נכונה ב"מוד" עבודה במצבים הנ"ל ע"י השווה עם החישובים התאורטיים.</a:t>
+            </a:r>
+            <a:endParaRPr lang="ru-RU" dirty="0" smtClean="0"/>
+          </a:p>
+          <a:p>
+            <a:pPr marL="171450" indent="-171450" algn="r" rtl="1">
+              <a:buFont typeface="Arial" pitchFamily="34" charset="0"/>
+              <a:buChar char="•"/>
+            </a:pPr>
+            <a:r>
+              <a:rPr lang="he-IL" dirty="0" smtClean="0"/>
+              <a:t>(</a:t>
+            </a:r>
+            <a:r>
+              <a:rPr lang="he-IL" u="sng" dirty="0" smtClean="0"/>
+              <a:t>מוד עבודה</a:t>
+            </a:r>
+            <a:r>
+              <a:rPr lang="he-IL" dirty="0" smtClean="0"/>
+              <a:t>: </a:t>
+            </a:r>
+            <a:r>
+              <a:rPr lang="en-US" dirty="0" smtClean="0"/>
+              <a:t>TDLS </a:t>
+            </a:r>
+            <a:r>
+              <a:rPr lang="he-IL" dirty="0" smtClean="0"/>
+              <a:t> והדרך הרגילה (</a:t>
+            </a:r>
+            <a:r>
+              <a:rPr lang="en-US" dirty="0" smtClean="0"/>
+              <a:t>BSS</a:t>
+            </a:r>
+            <a:r>
+              <a:rPr lang="he-IL" dirty="0" smtClean="0"/>
+              <a:t>))  </a:t>
+            </a:r>
+            <a:endParaRPr lang="ru-RU" dirty="0" smtClean="0"/>
+          </a:p>
+          <a:p>
+            <a:pPr marL="171450" indent="-171450" algn="r" rtl="1">
+              <a:buFont typeface="Arial" pitchFamily="34" charset="0"/>
+              <a:buChar char="•"/>
+            </a:pPr>
+            <a:r>
+              <a:rPr lang="he-IL" dirty="0" smtClean="0"/>
+              <a:t>(</a:t>
+            </a:r>
+            <a:r>
+              <a:rPr lang="he-IL" u="sng" dirty="0" smtClean="0"/>
+              <a:t>מצבי סביבה</a:t>
+            </a:r>
+            <a:r>
+              <a:rPr lang="he-IL" dirty="0" smtClean="0"/>
+              <a:t>: מרחק בין תחנות, מספר תחנות בסביה, רעש בסביה – </a:t>
+            </a:r>
+            <a:r>
+              <a:rPr lang="en-US" dirty="0" smtClean="0"/>
+              <a:t>CRC</a:t>
+            </a:r>
+            <a:r>
+              <a:rPr lang="he-IL" dirty="0" smtClean="0"/>
+              <a:t>, עוצמת שידור ועוד..)</a:t>
+            </a:r>
+            <a:endParaRPr lang="ru-RU" dirty="0" smtClean="0"/>
+          </a:p>
+          <a:p>
+            <a:pPr marL="171450" lvl="0" indent="-171450" algn="r" rtl="1">
+              <a:buFont typeface="Arial" pitchFamily="34" charset="0"/>
+              <a:buChar char="•"/>
+            </a:pPr>
+            <a:r>
+              <a:rPr lang="he-IL" b="1" dirty="0" smtClean="0"/>
+              <a:t>נבדוק שהסימולטור מציאותי </a:t>
+            </a:r>
+            <a:r>
+              <a:rPr lang="he-IL" dirty="0" smtClean="0"/>
+              <a:t>ע"י השוואת נתוני סביבה שהסימולטור מציג לבין נתוני הסביבה שמספק התקן</a:t>
+            </a:r>
+            <a:r>
+              <a:rPr lang="en-US" dirty="0" smtClean="0"/>
+              <a:t>WIFI </a:t>
+            </a:r>
+            <a:r>
+              <a:rPr lang="he-IL" dirty="0" smtClean="0"/>
+              <a:t> אמתי במצבי עבודה שונים (שליחת נתונים..), בתנאי סביבה שונים (מקרי קיצון ומקרי אמצע).</a:t>
+            </a:r>
+            <a:endParaRPr lang="ru-RU" dirty="0" smtClean="0"/>
+          </a:p>
+          <a:p>
+            <a:pPr marL="171450" indent="-171450" algn="r" rtl="1">
+              <a:buFont typeface="Arial" pitchFamily="34" charset="0"/>
+              <a:buChar char="•"/>
+            </a:pPr>
+            <a:r>
+              <a:rPr lang="he-IL" dirty="0" smtClean="0"/>
+              <a:t>במילים אחרות נבדוק שהסימולטור שלנו מתנהג כמה התקן </a:t>
+            </a:r>
+            <a:r>
+              <a:rPr lang="en-US" dirty="0" smtClean="0"/>
+              <a:t>WIFI</a:t>
+            </a:r>
+            <a:r>
+              <a:rPr lang="he-IL" dirty="0" smtClean="0"/>
+              <a:t> אמתי ביחס לנתוני סביבה הרלוונטיים לאלגוריתמי </a:t>
+            </a:r>
+            <a:r>
+              <a:rPr lang="en-US" dirty="0" smtClean="0"/>
+              <a:t>SLS</a:t>
+            </a:r>
+            <a:r>
+              <a:rPr lang="he-IL" dirty="0" smtClean="0"/>
+              <a:t> במצבי עבודה שונים (לדוגמא: שליחת נתונים). </a:t>
+            </a:r>
+            <a:endParaRPr lang="ru-RU" dirty="0" smtClean="0"/>
+          </a:p>
+          <a:p>
+            <a:endParaRPr lang="he-IL" dirty="0"/>
+          </a:p>
+        </p:txBody>
+      </p:sp>
+      <p:sp>
+        <p:nvSpPr>
+          <p:cNvPr id="4" name="Slide Number Placeholder 3"/>
+          <p:cNvSpPr>
+            <a:spLocks noGrp="1"/>
+          </p:cNvSpPr>
+          <p:nvPr>
+            <p:ph type="sldNum" sz="quarter" idx="10"/>
+          </p:nvPr>
+        </p:nvSpPr>
+        <p:spPr/>
+        <p:txBody>
+          <a:bodyPr/>
+          <a:lstStyle/>
+          <a:p>
+            <a:fld id="{7A6A5AAE-82E3-4B26-81AD-E86F1575EFF2}" type="slidenum">
+              <a:rPr lang="he-IL" smtClean="0"/>
+              <a:t>13</a:t>
+            </a:fld>
+            <a:endParaRPr lang="he-IL"/>
+          </a:p>
+        </p:txBody>
+      </p:sp>
+    </p:spTree>
+    <p:extLst>
+      <p:ext uri="{BB962C8B-B14F-4D97-AF65-F5344CB8AC3E}">
+        <p14:creationId xmlns:p14="http://schemas.microsoft.com/office/powerpoint/2010/main" val="411862516"/>
+      </p:ext>
+    </p:extLst>
+  </p:cSld>
+  <p:clrMapOvr>
+    <a:masterClrMapping/>
+  </p:clrMapOvr>
+</p:notes>
+</file>
+
 <file path=ppt/slideLayouts/slideLayout1.xml><?xml version="1.0" encoding="utf-8"?>
 <p:sldLayout xmlns:a="http://schemas.openxmlformats.org/drawingml/2006/main" xmlns:r="http://schemas.openxmlformats.org/officeDocument/2006/relationships" xmlns:p="http://schemas.openxmlformats.org/presentationml/2006/main" showMasterSp="0" type="title" preserve="1">
   <p:cSld name="Титульный слайд">
@@ -187,7 +1390,7 @@
           <a:p>
             <a:fld id="{B4C71EC6-210F-42DE-9C53-41977AD35B3D}" type="datetimeFigureOut">
               <a:rPr lang="ru-RU" smtClean="0"/>
-              <a:t>17.11.2012</a:t>
+              <a:t>19.11.2012</a:t>
             </a:fld>
             <a:endParaRPr lang="ru-RU"/>
           </a:p>
@@ -712,7 +1915,7 @@
           <a:p>
             <a:fld id="{B4C71EC6-210F-42DE-9C53-41977AD35B3D}" type="datetimeFigureOut">
               <a:rPr lang="ru-RU" smtClean="0"/>
-              <a:t>17.11.2012</a:t>
+              <a:t>19.11.2012</a:t>
             </a:fld>
             <a:endParaRPr lang="ru-RU"/>
           </a:p>
@@ -1026,7 +2229,7 @@
           <a:p>
             <a:fld id="{B4C71EC6-210F-42DE-9C53-41977AD35B3D}" type="datetimeFigureOut">
               <a:rPr lang="ru-RU" smtClean="0"/>
-              <a:t>17.11.2012</a:t>
+              <a:t>19.11.2012</a:t>
             </a:fld>
             <a:endParaRPr lang="ru-RU"/>
           </a:p>
@@ -1312,7 +2515,7 @@
           <a:p>
             <a:fld id="{B4C71EC6-210F-42DE-9C53-41977AD35B3D}" type="datetimeFigureOut">
               <a:rPr lang="ru-RU" smtClean="0"/>
-              <a:t>17.11.2012</a:t>
+              <a:t>19.11.2012</a:t>
             </a:fld>
             <a:endParaRPr lang="ru-RU"/>
           </a:p>
@@ -1887,7 +3090,7 @@
           <a:p>
             <a:fld id="{B4C71EC6-210F-42DE-9C53-41977AD35B3D}" type="datetimeFigureOut">
               <a:rPr lang="ru-RU" smtClean="0"/>
-              <a:t>17.11.2012</a:t>
+              <a:t>19.11.2012</a:t>
             </a:fld>
             <a:endParaRPr lang="ru-RU"/>
           </a:p>
@@ -1977,7 +3180,7 @@
           <a:p>
             <a:fld id="{B4C71EC6-210F-42DE-9C53-41977AD35B3D}" type="datetimeFigureOut">
               <a:rPr lang="ru-RU" smtClean="0"/>
-              <a:t>17.11.2012</a:t>
+              <a:t>19.11.2012</a:t>
             </a:fld>
             <a:endParaRPr lang="ru-RU"/>
           </a:p>
@@ -2686,7 +3889,7 @@
           <a:p>
             <a:fld id="{B4C71EC6-210F-42DE-9C53-41977AD35B3D}" type="datetimeFigureOut">
               <a:rPr lang="ru-RU" smtClean="0"/>
-              <a:t>17.11.2012</a:t>
+              <a:t>19.11.2012</a:t>
             </a:fld>
             <a:endParaRPr lang="ru-RU"/>
           </a:p>
@@ -2938,7 +4141,7 @@
           <a:p>
             <a:fld id="{B4C71EC6-210F-42DE-9C53-41977AD35B3D}" type="datetimeFigureOut">
               <a:rPr lang="ru-RU" smtClean="0"/>
-              <a:t>17.11.2012</a:t>
+              <a:t>19.11.2012</a:t>
             </a:fld>
             <a:endParaRPr lang="ru-RU"/>
           </a:p>
@@ -3167,7 +4370,7 @@
           <a:p>
             <a:fld id="{B4C71EC6-210F-42DE-9C53-41977AD35B3D}" type="datetimeFigureOut">
               <a:rPr lang="ru-RU" smtClean="0"/>
-              <a:t>17.11.2012</a:t>
+              <a:t>19.11.2012</a:t>
             </a:fld>
             <a:endParaRPr lang="ru-RU"/>
           </a:p>
@@ -3441,7 +4644,7 @@
           <a:p>
             <a:fld id="{B4C71EC6-210F-42DE-9C53-41977AD35B3D}" type="datetimeFigureOut">
               <a:rPr lang="ru-RU" smtClean="0"/>
-              <a:t>17.11.2012</a:t>
+              <a:t>19.11.2012</a:t>
             </a:fld>
             <a:endParaRPr lang="ru-RU"/>
           </a:p>
@@ -3727,7 +4930,7 @@
           <a:p>
             <a:fld id="{B4C71EC6-210F-42DE-9C53-41977AD35B3D}" type="datetimeFigureOut">
               <a:rPr lang="ru-RU" smtClean="0"/>
-              <a:t>17.11.2012</a:t>
+              <a:t>19.11.2012</a:t>
             </a:fld>
             <a:endParaRPr lang="ru-RU"/>
           </a:p>
@@ -3995,7 +5198,7 @@
           <a:p>
             <a:fld id="{B4C71EC6-210F-42DE-9C53-41977AD35B3D}" type="datetimeFigureOut">
               <a:rPr lang="ru-RU" smtClean="0"/>
-              <a:t>17.11.2012</a:t>
+              <a:t>19.11.2012</a:t>
             </a:fld>
             <a:endParaRPr lang="ru-RU"/>
           </a:p>
@@ -4535,10 +5738,615 @@
   <p:clrMapOvr>
     <a:masterClrMapping/>
   </p:clrMapOvr>
+  <p:timing>
+    <p:tnLst>
+      <p:par>
+        <p:cTn id="1" dur="indefinite" restart="never" nodeType="tmRoot"/>
+      </p:par>
+    </p:tnLst>
+  </p:timing>
 </p:sld>
 </file>
 
 <file path=ppt/slides/slide10.xml><?xml version="1.0" encoding="utf-8"?>
+<p:sld xmlns:a="http://schemas.openxmlformats.org/drawingml/2006/main" xmlns:r="http://schemas.openxmlformats.org/officeDocument/2006/relationships" xmlns:p="http://schemas.openxmlformats.org/presentationml/2006/main">
+  <p:cSld>
+    <p:spTree>
+      <p:nvGrpSpPr>
+        <p:cNvPr id="1" name=""/>
+        <p:cNvGrpSpPr/>
+        <p:nvPr/>
+      </p:nvGrpSpPr>
+      <p:grpSpPr>
+        <a:xfrm>
+          <a:off x="0" y="0"/>
+          <a:ext cx="0" cy="0"/>
+          <a:chOff x="0" y="0"/>
+          <a:chExt cx="0" cy="0"/>
+        </a:xfrm>
+      </p:grpSpPr>
+      <p:sp>
+        <p:nvSpPr>
+          <p:cNvPr id="2" name="Объект 1"/>
+          <p:cNvSpPr>
+            <a:spLocks noGrp="1"/>
+          </p:cNvSpPr>
+          <p:nvPr>
+            <p:ph idx="1"/>
+          </p:nvPr>
+        </p:nvSpPr>
+        <p:spPr/>
+        <p:txBody>
+          <a:bodyPr/>
+          <a:lstStyle/>
+          <a:p>
+            <a:pPr lvl="0" algn="r" rtl="1"/>
+            <a:r>
+              <a:rPr lang="he-IL" dirty="0"/>
+              <a:t>תקשורת מחשבים</a:t>
+            </a:r>
+            <a:r>
+              <a:rPr lang="he-IL" dirty="0" smtClean="0"/>
+              <a:t>.</a:t>
+            </a:r>
+          </a:p>
+          <a:p>
+            <a:pPr lvl="0" algn="r" rtl="1"/>
+            <a:endParaRPr lang="ru-RU" dirty="0"/>
+          </a:p>
+          <a:p>
+            <a:pPr lvl="0" algn="r" rtl="1"/>
+            <a:r>
+              <a:rPr lang="he-IL" dirty="0"/>
+              <a:t>סימולציה של מערכות חומרה/תוכנה</a:t>
+            </a:r>
+            <a:r>
+              <a:rPr lang="he-IL" dirty="0" smtClean="0"/>
+              <a:t>.</a:t>
+            </a:r>
+          </a:p>
+          <a:p>
+            <a:pPr lvl="0" algn="r" rtl="1"/>
+            <a:endParaRPr lang="ru-RU" dirty="0"/>
+          </a:p>
+          <a:p>
+            <a:pPr lvl="0" algn="r" rtl="1"/>
+            <a:r>
+              <a:rPr lang="he-IL" dirty="0"/>
+              <a:t>פרוטוקולי ניתוב. </a:t>
+            </a:r>
+            <a:endParaRPr lang="ru-RU" dirty="0"/>
+          </a:p>
+          <a:p>
+            <a:pPr algn="r" rtl="1"/>
+            <a:endParaRPr lang="ru-RU" dirty="0"/>
+          </a:p>
+        </p:txBody>
+      </p:sp>
+      <p:sp>
+        <p:nvSpPr>
+          <p:cNvPr id="3" name="Заголовок 2"/>
+          <p:cNvSpPr>
+            <a:spLocks noGrp="1"/>
+          </p:cNvSpPr>
+          <p:nvPr>
+            <p:ph type="title"/>
+          </p:nvPr>
+        </p:nvSpPr>
+        <p:spPr>
+          <a:xfrm>
+            <a:off x="467544" y="332656"/>
+            <a:ext cx="8424936" cy="1080120"/>
+          </a:xfrm>
+        </p:spPr>
+        <p:txBody>
+          <a:bodyPr/>
+          <a:lstStyle/>
+          <a:p>
+            <a:pPr lvl="0"/>
+            <a:r>
+              <a:rPr lang="he-IL" sz="3600" b="1" dirty="0"/>
+              <a:t>תחומים במדעי המחשב אליהם הפרויקט </a:t>
+            </a:r>
+            <a:r>
+              <a:rPr lang="he-IL" sz="3600" b="1" dirty="0" smtClean="0"/>
+              <a:t>משתייך</a:t>
+            </a:r>
+            <a:endParaRPr lang="ru-RU" sz="3600" dirty="0"/>
+          </a:p>
+        </p:txBody>
+      </p:sp>
+    </p:spTree>
+    <p:extLst>
+      <p:ext uri="{BB962C8B-B14F-4D97-AF65-F5344CB8AC3E}">
+        <p14:creationId xmlns:p14="http://schemas.microsoft.com/office/powerpoint/2010/main" val="1197746625"/>
+      </p:ext>
+    </p:extLst>
+  </p:cSld>
+  <p:clrMapOvr>
+    <a:masterClrMapping/>
+  </p:clrMapOvr>
+  <p:timing>
+    <p:tnLst>
+      <p:par>
+        <p:cTn id="1" dur="indefinite" restart="never" nodeType="tmRoot"/>
+      </p:par>
+    </p:tnLst>
+  </p:timing>
+</p:sld>
+</file>
+
+<file path=ppt/slides/slide11.xml><?xml version="1.0" encoding="utf-8"?>
+<p:sld xmlns:a="http://schemas.openxmlformats.org/drawingml/2006/main" xmlns:r="http://schemas.openxmlformats.org/officeDocument/2006/relationships" xmlns:p="http://schemas.openxmlformats.org/presentationml/2006/main">
+  <p:cSld>
+    <p:spTree>
+      <p:nvGrpSpPr>
+        <p:cNvPr id="1" name=""/>
+        <p:cNvGrpSpPr/>
+        <p:nvPr/>
+      </p:nvGrpSpPr>
+      <p:grpSpPr>
+        <a:xfrm>
+          <a:off x="0" y="0"/>
+          <a:ext cx="0" cy="0"/>
+          <a:chOff x="0" y="0"/>
+          <a:chExt cx="0" cy="0"/>
+        </a:xfrm>
+      </p:grpSpPr>
+      <p:sp>
+        <p:nvSpPr>
+          <p:cNvPr id="2" name="Объект 1"/>
+          <p:cNvSpPr>
+            <a:spLocks noGrp="1"/>
+          </p:cNvSpPr>
+          <p:nvPr>
+            <p:ph idx="1"/>
+          </p:nvPr>
+        </p:nvSpPr>
+        <p:spPr>
+          <a:xfrm>
+            <a:off x="323528" y="2248347"/>
+            <a:ext cx="8352927" cy="3877815"/>
+          </a:xfrm>
+        </p:spPr>
+        <p:txBody>
+          <a:bodyPr/>
+          <a:lstStyle/>
+          <a:p>
+            <a:pPr lvl="0" algn="r" rtl="1"/>
+            <a:r>
+              <a:rPr lang="he-IL" dirty="0"/>
+              <a:t>הערכת פיתוח של האלגוריתמים - ניתוח של תוצאות</a:t>
+            </a:r>
+            <a:r>
+              <a:rPr lang="he-IL" dirty="0" smtClean="0"/>
+              <a:t>.</a:t>
+            </a:r>
+          </a:p>
+          <a:p>
+            <a:pPr lvl="0" algn="r" rtl="1"/>
+            <a:endParaRPr lang="ru-RU" dirty="0"/>
+          </a:p>
+          <a:p>
+            <a:pPr lvl="0" algn="r" rtl="1"/>
+            <a:r>
+              <a:rPr lang="he-IL" dirty="0"/>
+              <a:t>יצירה ואימות שהסימולטור מציאותי למערכת </a:t>
+            </a:r>
+            <a:r>
+              <a:rPr lang="en-US" dirty="0"/>
+              <a:t>WIFI</a:t>
+            </a:r>
+            <a:r>
+              <a:rPr lang="he-IL" dirty="0"/>
+              <a:t> בהקשר ל- </a:t>
+            </a:r>
+            <a:r>
+              <a:rPr lang="en-US" dirty="0"/>
+              <a:t>SLS</a:t>
+            </a:r>
+            <a:r>
+              <a:rPr lang="he-IL" dirty="0"/>
+              <a:t>. </a:t>
+            </a:r>
+            <a:endParaRPr lang="ru-RU" dirty="0"/>
+          </a:p>
+          <a:p>
+            <a:pPr algn="r" rtl="1"/>
+            <a:endParaRPr lang="ru-RU" dirty="0"/>
+          </a:p>
+        </p:txBody>
+      </p:sp>
+      <p:sp>
+        <p:nvSpPr>
+          <p:cNvPr id="3" name="Заголовок 2"/>
+          <p:cNvSpPr>
+            <a:spLocks noGrp="1"/>
+          </p:cNvSpPr>
+          <p:nvPr>
+            <p:ph type="title"/>
+          </p:nvPr>
+        </p:nvSpPr>
+        <p:spPr/>
+        <p:txBody>
+          <a:bodyPr/>
+          <a:lstStyle/>
+          <a:p>
+            <a:pPr lvl="0"/>
+            <a:r>
+              <a:rPr lang="he-IL" b="1" dirty="0"/>
+              <a:t>המורכבות </a:t>
+            </a:r>
+            <a:r>
+              <a:rPr lang="he-IL" b="1" dirty="0" smtClean="0"/>
+              <a:t>בפרויקט</a:t>
+            </a:r>
+            <a:endParaRPr lang="ru-RU" dirty="0"/>
+          </a:p>
+        </p:txBody>
+      </p:sp>
+    </p:spTree>
+    <p:extLst>
+      <p:ext uri="{BB962C8B-B14F-4D97-AF65-F5344CB8AC3E}">
+        <p14:creationId xmlns:p14="http://schemas.microsoft.com/office/powerpoint/2010/main" val="1284990727"/>
+      </p:ext>
+    </p:extLst>
+  </p:cSld>
+  <p:clrMapOvr>
+    <a:masterClrMapping/>
+  </p:clrMapOvr>
+  <p:timing>
+    <p:tnLst>
+      <p:par>
+        <p:cTn id="1" dur="indefinite" restart="never" nodeType="tmRoot"/>
+      </p:par>
+    </p:tnLst>
+  </p:timing>
+</p:sld>
+</file>
+
+<file path=ppt/slides/slide12.xml><?xml version="1.0" encoding="utf-8"?>
+<p:sld xmlns:a="http://schemas.openxmlformats.org/drawingml/2006/main" xmlns:r="http://schemas.openxmlformats.org/officeDocument/2006/relationships" xmlns:p="http://schemas.openxmlformats.org/presentationml/2006/main">
+  <p:cSld>
+    <p:spTree>
+      <p:nvGrpSpPr>
+        <p:cNvPr id="1" name=""/>
+        <p:cNvGrpSpPr/>
+        <p:nvPr/>
+      </p:nvGrpSpPr>
+      <p:grpSpPr>
+        <a:xfrm>
+          <a:off x="0" y="0"/>
+          <a:ext cx="0" cy="0"/>
+          <a:chOff x="0" y="0"/>
+          <a:chExt cx="0" cy="0"/>
+        </a:xfrm>
+      </p:grpSpPr>
+      <p:sp>
+        <p:nvSpPr>
+          <p:cNvPr id="2" name="Объект 1"/>
+          <p:cNvSpPr>
+            <a:spLocks noGrp="1"/>
+          </p:cNvSpPr>
+          <p:nvPr>
+            <p:ph idx="1"/>
+          </p:nvPr>
+        </p:nvSpPr>
+        <p:spPr/>
+        <p:txBody>
+          <a:bodyPr/>
+          <a:lstStyle/>
+          <a:p>
+            <a:pPr lvl="0" algn="r" rtl="1"/>
+            <a:r>
+              <a:rPr lang="en-US" dirty="0" smtClean="0"/>
+              <a:t>Distributed </a:t>
+            </a:r>
+            <a:r>
+              <a:rPr lang="en-US" dirty="0"/>
+              <a:t>version control system</a:t>
+            </a:r>
+            <a:r>
+              <a:rPr lang="he-IL" dirty="0" smtClean="0"/>
+              <a:t>.</a:t>
+            </a:r>
+          </a:p>
+          <a:p>
+            <a:pPr lvl="0" algn="r" rtl="1"/>
+            <a:endParaRPr lang="ru-RU" dirty="0"/>
+          </a:p>
+          <a:p>
+            <a:pPr lvl="0" algn="r" rtl="1"/>
+            <a:r>
+              <a:rPr lang="he-IL" dirty="0"/>
+              <a:t>תיבדק אפשרות לשימוש בסימולטורים קיימים לדימוי שכבה פיזית של תקשורת </a:t>
+            </a:r>
+            <a:r>
+              <a:rPr lang="en-US" dirty="0"/>
+              <a:t>WIFI</a:t>
+            </a:r>
+            <a:r>
+              <a:rPr lang="he-IL" dirty="0" smtClean="0"/>
+              <a:t>.</a:t>
+            </a:r>
+          </a:p>
+          <a:p>
+            <a:pPr lvl="0" algn="r" rtl="1"/>
+            <a:endParaRPr lang="ru-RU" dirty="0"/>
+          </a:p>
+          <a:p>
+            <a:pPr lvl="0" algn="r" rtl="1"/>
+            <a:r>
+              <a:rPr lang="he-IL" dirty="0"/>
+              <a:t>תישקל אפשרות לשימוש בכלים לעבודה ב – </a:t>
+            </a:r>
+            <a:r>
+              <a:rPr lang="en-US" dirty="0"/>
+              <a:t>Linux Kernel</a:t>
+            </a:r>
+            <a:r>
+              <a:rPr lang="he-IL" dirty="0"/>
+              <a:t>.</a:t>
+            </a:r>
+            <a:endParaRPr lang="ru-RU" dirty="0"/>
+          </a:p>
+          <a:p>
+            <a:pPr algn="r" rtl="1"/>
+            <a:endParaRPr lang="ru-RU" dirty="0"/>
+          </a:p>
+        </p:txBody>
+      </p:sp>
+      <p:sp>
+        <p:nvSpPr>
+          <p:cNvPr id="3" name="Заголовок 2"/>
+          <p:cNvSpPr>
+            <a:spLocks noGrp="1"/>
+          </p:cNvSpPr>
+          <p:nvPr>
+            <p:ph type="title"/>
+          </p:nvPr>
+        </p:nvSpPr>
+        <p:spPr/>
+        <p:txBody>
+          <a:bodyPr/>
+          <a:lstStyle/>
+          <a:p>
+            <a:pPr lvl="0"/>
+            <a:r>
+              <a:rPr lang="he-IL" sz="4000" b="1" dirty="0"/>
+              <a:t>כלים בהם יעשה שימוש במהלך </a:t>
+            </a:r>
+            <a:r>
+              <a:rPr lang="he-IL" sz="4000" b="1" dirty="0" smtClean="0"/>
+              <a:t>הפרויקט</a:t>
+            </a:r>
+            <a:endParaRPr lang="ru-RU" sz="4000" dirty="0"/>
+          </a:p>
+        </p:txBody>
+      </p:sp>
+    </p:spTree>
+    <p:extLst>
+      <p:ext uri="{BB962C8B-B14F-4D97-AF65-F5344CB8AC3E}">
+        <p14:creationId xmlns:p14="http://schemas.microsoft.com/office/powerpoint/2010/main" val="2294792646"/>
+      </p:ext>
+    </p:extLst>
+  </p:cSld>
+  <p:clrMapOvr>
+    <a:masterClrMapping/>
+  </p:clrMapOvr>
+  <p:timing>
+    <p:tnLst>
+      <p:par>
+        <p:cTn id="1" dur="indefinite" restart="never" nodeType="tmRoot"/>
+      </p:par>
+    </p:tnLst>
+  </p:timing>
+</p:sld>
+</file>
+
+<file path=ppt/slides/slide13.xml><?xml version="1.0" encoding="utf-8"?>
+<p:sld xmlns:a="http://schemas.openxmlformats.org/drawingml/2006/main" xmlns:r="http://schemas.openxmlformats.org/officeDocument/2006/relationships" xmlns:p="http://schemas.openxmlformats.org/presentationml/2006/main">
+  <p:cSld>
+    <p:spTree>
+      <p:nvGrpSpPr>
+        <p:cNvPr id="1" name=""/>
+        <p:cNvGrpSpPr/>
+        <p:nvPr/>
+      </p:nvGrpSpPr>
+      <p:grpSpPr>
+        <a:xfrm>
+          <a:off x="0" y="0"/>
+          <a:ext cx="0" cy="0"/>
+          <a:chOff x="0" y="0"/>
+          <a:chExt cx="0" cy="0"/>
+        </a:xfrm>
+      </p:grpSpPr>
+      <p:sp>
+        <p:nvSpPr>
+          <p:cNvPr id="2" name="Объект 1"/>
+          <p:cNvSpPr>
+            <a:spLocks noGrp="1"/>
+          </p:cNvSpPr>
+          <p:nvPr>
+            <p:ph idx="1"/>
+          </p:nvPr>
+        </p:nvSpPr>
+        <p:spPr/>
+        <p:txBody>
+          <a:bodyPr>
+            <a:normAutofit/>
+          </a:bodyPr>
+          <a:lstStyle/>
+          <a:p>
+            <a:pPr lvl="0" algn="r" rtl="1"/>
+            <a:r>
+              <a:rPr lang="he-IL" dirty="0"/>
+              <a:t>נבדוק שהאלגוריתמים נותנים יעילות </a:t>
+            </a:r>
+            <a:r>
+              <a:rPr lang="he-IL" dirty="0" smtClean="0"/>
+              <a:t>מרבית </a:t>
+            </a:r>
+          </a:p>
+          <a:p>
+            <a:pPr lvl="0" algn="r" rtl="1"/>
+            <a:endParaRPr lang="he-IL" dirty="0" smtClean="0"/>
+          </a:p>
+          <a:p>
+            <a:pPr lvl="0" algn="r" rtl="1"/>
+            <a:r>
+              <a:rPr lang="he-IL" dirty="0" smtClean="0"/>
+              <a:t>נבדוק שהסימולטור מציאותי</a:t>
+            </a:r>
+            <a:endParaRPr lang="ru-RU" dirty="0"/>
+          </a:p>
+        </p:txBody>
+      </p:sp>
+      <p:sp>
+        <p:nvSpPr>
+          <p:cNvPr id="3" name="Заголовок 2"/>
+          <p:cNvSpPr>
+            <a:spLocks noGrp="1"/>
+          </p:cNvSpPr>
+          <p:nvPr>
+            <p:ph type="title"/>
+          </p:nvPr>
+        </p:nvSpPr>
+        <p:spPr/>
+        <p:txBody>
+          <a:bodyPr/>
+          <a:lstStyle/>
+          <a:p>
+            <a:pPr lvl="0"/>
+            <a:r>
+              <a:rPr lang="he-IL" sz="4800" b="1" dirty="0"/>
+              <a:t>כיצד תבחן הצלחה של </a:t>
+            </a:r>
+            <a:r>
+              <a:rPr lang="he-IL" sz="4800" b="1" dirty="0" smtClean="0"/>
+              <a:t>הפרויקט</a:t>
+            </a:r>
+            <a:endParaRPr lang="ru-RU" sz="4800" dirty="0"/>
+          </a:p>
+        </p:txBody>
+      </p:sp>
+    </p:spTree>
+    <p:extLst>
+      <p:ext uri="{BB962C8B-B14F-4D97-AF65-F5344CB8AC3E}">
+        <p14:creationId xmlns:p14="http://schemas.microsoft.com/office/powerpoint/2010/main" val="368764763"/>
+      </p:ext>
+    </p:extLst>
+  </p:cSld>
+  <p:clrMapOvr>
+    <a:masterClrMapping/>
+  </p:clrMapOvr>
+  <p:timing>
+    <p:tnLst>
+      <p:par>
+        <p:cTn id="1" dur="indefinite" restart="never" nodeType="tmRoot"/>
+      </p:par>
+    </p:tnLst>
+  </p:timing>
+</p:sld>
+</file>
+
+<file path=ppt/slides/slide14.xml><?xml version="1.0" encoding="utf-8"?>
+<p:sld xmlns:a="http://schemas.openxmlformats.org/drawingml/2006/main" xmlns:r="http://schemas.openxmlformats.org/officeDocument/2006/relationships" xmlns:p="http://schemas.openxmlformats.org/presentationml/2006/main">
+  <p:cSld>
+    <p:spTree>
+      <p:nvGrpSpPr>
+        <p:cNvPr id="1" name=""/>
+        <p:cNvGrpSpPr/>
+        <p:nvPr/>
+      </p:nvGrpSpPr>
+      <p:grpSpPr>
+        <a:xfrm>
+          <a:off x="0" y="0"/>
+          <a:ext cx="0" cy="0"/>
+          <a:chOff x="0" y="0"/>
+          <a:chExt cx="0" cy="0"/>
+        </a:xfrm>
+      </p:grpSpPr>
+      <p:pic>
+        <p:nvPicPr>
+          <p:cNvPr id="4" name="Picture 3"/>
+          <p:cNvPicPr>
+            <a:picLocks noChangeAspect="1"/>
+          </p:cNvPicPr>
+          <p:nvPr/>
+        </p:nvPicPr>
+        <p:blipFill>
+          <a:blip r:embed="rId2">
+            <a:extLst>
+              <a:ext uri="{28A0092B-C50C-407E-A947-70E740481C1C}">
+                <a14:useLocalDpi xmlns:a14="http://schemas.microsoft.com/office/drawing/2010/main" val="0"/>
+              </a:ext>
+            </a:extLst>
+          </a:blip>
+          <a:stretch>
+            <a:fillRect/>
+          </a:stretch>
+        </p:blipFill>
+        <p:spPr>
+          <a:xfrm>
+            <a:off x="103433" y="1196752"/>
+            <a:ext cx="8924787" cy="5552256"/>
+          </a:xfrm>
+          <a:prstGeom prst="rect">
+            <a:avLst/>
+          </a:prstGeom>
+        </p:spPr>
+      </p:pic>
+      <p:sp>
+        <p:nvSpPr>
+          <p:cNvPr id="7" name="Заголовок 2"/>
+          <p:cNvSpPr>
+            <a:spLocks noGrp="1"/>
+          </p:cNvSpPr>
+          <p:nvPr>
+            <p:ph type="title"/>
+          </p:nvPr>
+        </p:nvSpPr>
+        <p:spPr>
+          <a:xfrm>
+            <a:off x="687694" y="332656"/>
+            <a:ext cx="7756263" cy="1054250"/>
+          </a:xfrm>
+        </p:spPr>
+        <p:txBody>
+          <a:bodyPr/>
+          <a:lstStyle/>
+          <a:p>
+            <a:pPr lvl="0"/>
+            <a:r>
+              <a:rPr lang="en-US" sz="4800" b="1" dirty="0" smtClean="0"/>
+              <a:t>GANTT</a:t>
+            </a:r>
+            <a:endParaRPr lang="ru-RU" sz="4800" dirty="0"/>
+          </a:p>
+        </p:txBody>
+      </p:sp>
+    </p:spTree>
+    <p:extLst>
+      <p:ext uri="{BB962C8B-B14F-4D97-AF65-F5344CB8AC3E}">
+        <p14:creationId xmlns:p14="http://schemas.microsoft.com/office/powerpoint/2010/main" val="22630056"/>
+      </p:ext>
+    </p:extLst>
+  </p:cSld>
+  <p:clrMapOvr>
+    <a:masterClrMapping/>
+  </p:clrMapOvr>
+  <p:timing>
+    <p:tnLst>
+      <p:par>
+        <p:cTn id="1" dur="indefinite" restart="never" nodeType="tmRoot"/>
+      </p:par>
+    </p:tnLst>
+  </p:timing>
+</p:sld>
+</file>
+
+<file path=ppt/slides/slide15.xml><?xml version="1.0" encoding="utf-8"?>
 <p:sld xmlns:a="http://schemas.openxmlformats.org/drawingml/2006/main" xmlns:r="http://schemas.openxmlformats.org/officeDocument/2006/relationships" xmlns:p="http://schemas.openxmlformats.org/presentationml/2006/main">
   <p:cSld>
     <p:spTree>
@@ -4618,6 +6426,13 @@
   <p:clrMapOvr>
     <a:masterClrMapping/>
   </p:clrMapOvr>
+  <p:timing>
+    <p:tnLst>
+      <p:par>
+        <p:cTn id="1" dur="indefinite" restart="never" nodeType="tmRoot"/>
+      </p:par>
+    </p:tnLst>
+  </p:timing>
 </p:sld>
 </file>
 
@@ -4670,14 +6485,14 @@
           <p:nvPr>
             <p:extLst>
               <p:ext uri="{D42A27DB-BD31-4B8C-83A1-F6EECF244321}">
-                <p14:modId xmlns:p14="http://schemas.microsoft.com/office/powerpoint/2010/main" val="1418465905"/>
+                <p14:modId xmlns:p14="http://schemas.microsoft.com/office/powerpoint/2010/main" val="1356625285"/>
               </p:ext>
             </p:extLst>
           </p:nvPr>
         </p:nvGraphicFramePr>
         <p:xfrm>
           <a:off x="1187624" y="2204864"/>
-          <a:ext cx="6697107" cy="3423225"/>
+          <a:ext cx="6697107" cy="3715897"/>
         </p:xfrm>
         <a:graphic>
           <a:graphicData uri="http://schemas.openxmlformats.org/drawingml/2006/table">
@@ -5121,16 +6936,64 @@
                         <a:t>שם </a:t>
                       </a:r>
                       <a:r>
+                        <a:rPr lang="he-IL" sz="1400" dirty="0" smtClean="0">
+                          <a:effectLst/>
+                        </a:rPr>
+                        <a:t>המנחים:               </a:t>
+                      </a:r>
+                      <a:r>
                         <a:rPr lang="he-IL" sz="1400" dirty="0">
                           <a:effectLst/>
                         </a:rPr>
-                        <a:t>המנחה:               מרטין לנד</a:t>
+                        <a:t>מרטין </a:t>
                       </a:r>
-                      <a:endParaRPr lang="ru-RU" sz="1100" dirty="0">
+                      <a:r>
+                        <a:rPr lang="he-IL" sz="1400" dirty="0" smtClean="0">
+                          <a:effectLst/>
+                        </a:rPr>
+                        <a:t>לנד (מכללה)</a:t>
+                      </a:r>
+                    </a:p>
+                    <a:p>
+                      <a:pPr lvl="1" algn="just" rtl="1">
+                        <a:lnSpc>
+                          <a:spcPct val="150000"/>
+                        </a:lnSpc>
+                        <a:spcAft>
+                          <a:spcPts val="0"/>
+                        </a:spcAft>
+                        <a:tabLst>
+                          <a:tab pos="731520" algn="l"/>
+                          <a:tab pos="1463040" algn="l"/>
+                          <a:tab pos="2194560" algn="l"/>
+                          <a:tab pos="2926080" algn="l"/>
+                          <a:tab pos="3657600" algn="l"/>
+                          <a:tab pos="4389120" algn="l"/>
+                          <a:tab pos="5120005" algn="l"/>
+                          <a:tab pos="5852160" algn="l"/>
+                          <a:tab pos="6583680" algn="l"/>
+                        </a:tabLst>
+                      </a:pPr>
+                      <a:r>
+                        <a:rPr lang="he-IL" sz="1400" dirty="0" smtClean="0">
+                          <a:effectLst/>
+                        </a:rPr>
+                        <a:t>                                  אילן פאר</a:t>
+                      </a:r>
+                      <a:r>
+                        <a:rPr lang="en-US" sz="1400" baseline="0" dirty="0" smtClean="0">
+                          <a:effectLst/>
+                        </a:rPr>
+                        <a:t> </a:t>
+                      </a:r>
+                      <a:r>
+                        <a:rPr lang="he-IL" sz="1400" baseline="0" dirty="0" smtClean="0">
+                          <a:effectLst/>
+                        </a:rPr>
+                        <a:t>(אינטל)</a:t>
+                      </a:r>
+                      <a:endParaRPr lang="he-IL" sz="1400" dirty="0" smtClean="0">
                         <a:effectLst/>
-                        <a:latin typeface="Times New Roman"/>
-                        <a:ea typeface="Times New Roman"/>
-                        <a:cs typeface="David"/>
                       </a:endParaRPr>
                     </a:p>
                   </a:txBody>
@@ -5283,6 +7146,13 @@
   <p:clrMapOvr>
     <a:masterClrMapping/>
   </p:clrMapOvr>
+  <p:timing>
+    <p:tnLst>
+      <p:par>
+        <p:cTn id="1" dur="indefinite" restart="never" nodeType="tmRoot"/>
+      </p:par>
+    </p:tnLst>
+  </p:timing>
 </p:sld>
 </file>
 
@@ -5321,22 +7191,29 @@
         </p:spPr>
         <p:txBody>
           <a:bodyPr>
-            <a:normAutofit fontScale="62500" lnSpcReduction="20000"/>
+            <a:normAutofit/>
           </a:bodyPr>
           <a:lstStyle/>
           <a:p>
             <a:pPr algn="r" rtl="1"/>
             <a:r>
+              <a:rPr lang="he-IL" dirty="0" smtClean="0"/>
+              <a:t>אופן השימוש ב - </a:t>
+            </a:r>
+            <a:r>
+              <a:rPr lang="en-US" dirty="0" smtClean="0"/>
+              <a:t>WIFI</a:t>
+            </a:r>
+            <a:r>
+              <a:rPr lang="he-IL" dirty="0" smtClean="0"/>
+              <a:t> היום</a:t>
+            </a:r>
+          </a:p>
+          <a:p>
+            <a:pPr algn="r" rtl="1"/>
+            <a:r>
               <a:rPr lang="he-IL" dirty="0"/>
-              <a:t>מאז הולדתה של תקשורת אלחוטית</a:t>
-            </a:r>
-            <a:r>
-              <a:rPr lang="en-US" dirty="0"/>
-              <a:t>WIFI </a:t>
-            </a:r>
-            <a:r>
-              <a:rPr lang="he-IL" dirty="0"/>
-              <a:t> ועד היום פותחו מספר רב של דרכים ופרוטוקולים להעברת מיידע באמצעות תווך </a:t>
+              <a:t>אופן עבודה עם </a:t>
             </a:r>
             <a:r>
               <a:rPr lang="en-US" dirty="0"/>
@@ -5344,63 +7221,57 @@
             </a:r>
             <a:r>
               <a:rPr lang="he-IL" dirty="0"/>
-              <a:t>.  </a:t>
-            </a:r>
-            <a:endParaRPr lang="ru-RU" dirty="0"/>
-          </a:p>
-          <a:p>
-            <a:pPr algn="r" rtl="1"/>
-            <a:r>
-              <a:rPr lang="he-IL" dirty="0"/>
-              <a:t>כיום מכשיר בעל התקן </a:t>
-            </a:r>
-            <a:r>
-              <a:rPr lang="en-US" dirty="0"/>
+              <a:t> מתחלק לשני סוגים עיקריים</a:t>
+            </a:r>
+            <a:r>
+              <a:rPr lang="he-IL" dirty="0" smtClean="0"/>
+              <a:t>:</a:t>
+            </a:r>
+          </a:p>
+          <a:p>
+            <a:pPr lvl="1" algn="r" rtl="1"/>
+            <a:r>
+              <a:rPr lang="he-IL" dirty="0" smtClean="0"/>
+              <a:t>תקשורת ישירה בין שני התקני </a:t>
+            </a:r>
+            <a:r>
+              <a:rPr lang="en-US" dirty="0" smtClean="0"/>
               <a:t>WIFI </a:t>
             </a:r>
             <a:r>
-              <a:rPr lang="he-IL" dirty="0"/>
-              <a:t> תומך במספר רב של פרוטוקולים הנ"ל.  ברוב המקרים התקשורת מתבצעת באמצעות נקודת גישה (</a:t>
-            </a:r>
-            <a:r>
-              <a:rPr lang="en-US" dirty="0"/>
-              <a:t>Access Point</a:t>
-            </a:r>
-            <a:r>
-              <a:rPr lang="he-IL" dirty="0"/>
-              <a:t>).  לכל פרוטוקול יש היתרונות וחסרונות שונים בין פרוטוקול לפרוטוקול התלויים בתנאי סביבה, חומרת ההתקנים, וציוד קצה. אופן עבודה עם </a:t>
-            </a:r>
-            <a:r>
-              <a:rPr lang="en-US" dirty="0"/>
-              <a:t>WIFI</a:t>
-            </a:r>
-            <a:r>
-              <a:rPr lang="he-IL" dirty="0"/>
-              <a:t> מתחלק לשני סוגים עיקריים: </a:t>
-            </a:r>
-            <a:endParaRPr lang="ru-RU" dirty="0"/>
-          </a:p>
-          <a:p>
-            <a:pPr lvl="0" algn="r" rtl="1"/>
-            <a:r>
-              <a:rPr lang="he-IL" dirty="0"/>
-              <a:t>תקשורת ישירה בין שני התקני </a:t>
-            </a:r>
-            <a:r>
-              <a:rPr lang="en-US" dirty="0"/>
-              <a:t>WIFI </a:t>
-            </a:r>
-            <a:endParaRPr lang="ru-RU" dirty="0"/>
-          </a:p>
-          <a:p>
-            <a:pPr algn="r" rtl="1"/>
+              <a:rPr lang="he-IL" dirty="0" smtClean="0"/>
+              <a:t> </a:t>
+            </a:r>
             <a:r>
               <a:rPr lang="he-IL" dirty="0"/>
               <a:t>(</a:t>
             </a:r>
             <a:r>
               <a:rPr lang="en-US" dirty="0"/>
-              <a:t>IBSS, Tunneled Data Link Setup - TDLS , WIFI Direct</a:t>
+              <a:t>IBSS, Tunneled </a:t>
+            </a:r>
+            <a:r>
+              <a:rPr lang="en-US" dirty="0" smtClean="0"/>
+              <a:t>Data </a:t>
+            </a:r>
+            <a:r>
+              <a:rPr lang="en-US" dirty="0"/>
+              <a:t>Link Setup - TDLS , WIFI Direct</a:t>
+            </a:r>
+            <a:r>
+              <a:rPr lang="he-IL" dirty="0" smtClean="0"/>
+              <a:t>)</a:t>
+            </a:r>
+          </a:p>
+          <a:p>
+            <a:pPr lvl="1" algn="r" rtl="1"/>
+            <a:r>
+              <a:rPr lang="he-IL" dirty="0"/>
+              <a:t>תקשורת לא ישירה המשתמשת בנקודת גישה (</a:t>
+            </a:r>
+            <a:r>
+              <a:rPr lang="en-US" dirty="0"/>
+              <a:t>Base Service Set - BSS</a:t>
             </a:r>
             <a:r>
               <a:rPr lang="he-IL" dirty="0"/>
@@ -5409,129 +7280,29 @@
             <a:endParaRPr lang="ru-RU" dirty="0"/>
           </a:p>
           <a:p>
-            <a:pPr lvl="0" algn="r" rtl="1"/>
-            <a:r>
-              <a:rPr lang="he-IL" dirty="0"/>
-              <a:t>תקשורת לא ישירה המשתמשת בנקודת גישה (</a:t>
-            </a:r>
-            <a:r>
-              <a:rPr lang="en-US" dirty="0"/>
-              <a:t>Base Service Set - BSS</a:t>
-            </a:r>
-            <a:r>
-              <a:rPr lang="he-IL" dirty="0"/>
-              <a:t>)</a:t>
-            </a:r>
-            <a:endParaRPr lang="ru-RU" dirty="0"/>
-          </a:p>
-          <a:p>
-            <a:pPr algn="r" rtl="1"/>
-            <a:r>
-              <a:rPr lang="he-IL" dirty="0"/>
-              <a:t>אחד הפרוטוקולים החדשים שמפתחים כיום נקרא</a:t>
-            </a:r>
-            <a:r>
-              <a:rPr lang="en-US" dirty="0"/>
-              <a:t> TDLS (802.11z) </a:t>
-            </a:r>
-            <a:r>
-              <a:rPr lang="he-IL" dirty="0"/>
-              <a:t>שהוסף ב – 2012 כהרחבה ל</a:t>
-            </a:r>
-            <a:r>
-              <a:rPr lang="en-US" dirty="0"/>
-              <a:t> -</a:t>
-            </a:r>
-            <a:r>
-              <a:rPr lang="he-IL" dirty="0"/>
-              <a:t> 802.11 2007 </a:t>
-            </a:r>
-            <a:r>
-              <a:rPr lang="en-US" dirty="0"/>
-              <a:t>specification</a:t>
-            </a:r>
-            <a:r>
-              <a:rPr lang="he-IL" dirty="0"/>
-              <a:t>. פרוטוקול זה מאפשר העברת מידע בצורה ישירה ומאובטחת בין שני התקני</a:t>
-            </a:r>
-            <a:r>
-              <a:rPr lang="en-US" dirty="0"/>
-              <a:t>WIFI  </a:t>
-            </a:r>
-            <a:r>
-              <a:rPr lang="he-IL" dirty="0"/>
-              <a:t>שעובדים באותו </a:t>
-            </a:r>
-            <a:r>
-              <a:rPr lang="en-US" dirty="0"/>
-              <a:t>BSS </a:t>
-            </a:r>
-            <a:r>
-              <a:rPr lang="he-IL" dirty="0"/>
-              <a:t>ללא צורך בהתנתקות מנקודתה גישה, כלומר אפשר להמשיך לעבוד במקביל בדרך הרגילה דרך נקודת גישה. לאור הנאמר לעיל גם בעת עבודה ב- </a:t>
-            </a:r>
-            <a:r>
-              <a:rPr lang="en-US" dirty="0"/>
-              <a:t>TDLS</a:t>
-            </a:r>
-            <a:r>
-              <a:rPr lang="he-IL" dirty="0"/>
-              <a:t> לא תמיד נקבל את הביצועים האופטימאליים. למשל בהעברה ישירה, עכב המרחק הרב בין שתי תחנות </a:t>
-            </a:r>
-            <a:r>
-              <a:rPr lang="en-US" dirty="0"/>
-              <a:t>WIFI</a:t>
-            </a:r>
-            <a:r>
-              <a:rPr lang="he-IL" dirty="0"/>
-              <a:t> ,מיקומן הפיזי ורעשים בסביבת העבודה, קצב שידור הנתונים ירד. במצב הזה יש לשקול להעביר נתונים דרך נקודת גישה כדי לקבל ביצועים טובים יותר, כלומר לחזור לעבוד בדרך הרגילה.</a:t>
-            </a:r>
-            <a:endParaRPr lang="ru-RU" dirty="0"/>
-          </a:p>
-          <a:p>
-            <a:pPr algn="r" rtl="1"/>
-            <a:r>
-              <a:rPr lang="he-IL" dirty="0"/>
-              <a:t>כדי להגיע לביצועים האופטימאליים (</a:t>
-            </a:r>
-            <a:r>
-              <a:rPr lang="en-US" b="1" dirty="0"/>
-              <a:t>throughput</a:t>
-            </a:r>
-            <a:r>
-              <a:rPr lang="he-IL" dirty="0"/>
-              <a:t>) במהלך עבודה על תווך </a:t>
-            </a:r>
-            <a:r>
-              <a:rPr lang="en-US" dirty="0"/>
-              <a:t>WIFI</a:t>
-            </a:r>
-            <a:r>
-              <a:rPr lang="he-IL" dirty="0"/>
-              <a:t> ישנו צורך לדגום מעת לעת את תנאי הסביבה והחומרה של התקן </a:t>
-            </a:r>
-            <a:r>
-              <a:rPr lang="en-US" dirty="0"/>
-              <a:t>WIFI</a:t>
-            </a:r>
-            <a:r>
-              <a:rPr lang="he-IL" dirty="0"/>
-              <a:t> על מנת לבחור בפרוטוקול האופטימלי לתנאי הסביבה הנוכחים. בחירה זו נקראת </a:t>
-            </a:r>
-            <a:r>
-              <a:rPr lang="en-US" dirty="0"/>
-              <a:t>Smart Link Selection (SLS)</a:t>
-            </a:r>
-            <a:r>
-              <a:rPr lang="he-IL" dirty="0"/>
-              <a:t>.</a:t>
-            </a:r>
-            <a:endParaRPr lang="ru-RU" dirty="0"/>
-          </a:p>
-          <a:p>
             <a:pPr algn="r" rtl="1"/>
             <a:endParaRPr lang="ru-RU" dirty="0"/>
           </a:p>
+          <a:p>
+            <a:pPr lvl="1" algn="r" rtl="1"/>
+            <a:endParaRPr lang="ru-RU" dirty="0" smtClean="0"/>
+          </a:p>
+          <a:p>
+            <a:pPr lvl="1" algn="r" rtl="1"/>
+            <a:endParaRPr lang="he-IL" dirty="0" smtClean="0"/>
+          </a:p>
+          <a:p>
+            <a:pPr algn="r" rtl="1"/>
+            <a:endParaRPr lang="he-IL" dirty="0" smtClean="0"/>
+          </a:p>
+          <a:p>
+            <a:pPr algn="r" rtl="1"/>
+            <a:endParaRPr lang="ru-RU" dirty="0"/>
+          </a:p>
+          <a:p>
+            <a:pPr algn="r" rtl="1"/>
+            <a:endParaRPr lang="ru-RU" dirty="0"/>
+          </a:p>
         </p:txBody>
       </p:sp>
       <p:sp>
@@ -5557,6 +7328,47 @@
           </a:p>
         </p:txBody>
       </p:sp>
+      <p:pic>
+        <p:nvPicPr>
+          <p:cNvPr id="2050" name="Picture 2" descr="C:\Users\ilia\Documents\My Dropbox\Project\Pictures\TDLS - Support WPA.JPG"/>
+          <p:cNvPicPr>
+            <a:picLocks noChangeAspect="1" noChangeArrowheads="1"/>
+          </p:cNvPicPr>
+          <p:nvPr/>
+        </p:nvPicPr>
+        <p:blipFill>
+          <a:blip r:embed="rId3" cstate="print">
+            <a:extLst>
+              <a:ext uri="{28A0092B-C50C-407E-A947-70E740481C1C}">
+                <a14:useLocalDpi xmlns:a14="http://schemas.microsoft.com/office/drawing/2010/main" val="0"/>
+              </a:ext>
+            </a:extLst>
+          </a:blip>
+          <a:srcRect/>
+          <a:stretch>
+            <a:fillRect/>
+          </a:stretch>
+        </p:blipFill>
+        <p:spPr bwMode="auto">
+          <a:xfrm>
+            <a:off x="755576" y="4449268"/>
+            <a:ext cx="3225305" cy="2150990"/>
+          </a:xfrm>
+          <a:prstGeom prst="rect">
+            <a:avLst/>
+          </a:prstGeom>
+          <a:noFill/>
+          <a:extLst>
+            <a:ext uri="{909E8E84-426E-40DD-AFC4-6F175D3DCCD1}">
+              <a14:hiddenFill xmlns:a14="http://schemas.microsoft.com/office/drawing/2010/main">
+                <a:solidFill>
+                  <a:srgbClr val="FFFFFF"/>
+                </a:solidFill>
+              </a14:hiddenFill>
+            </a:ext>
+          </a:extLst>
+        </p:spPr>
+      </p:pic>
     </p:spTree>
     <p:extLst>
       <p:ext uri="{BB962C8B-B14F-4D97-AF65-F5344CB8AC3E}">
@@ -5567,6 +7379,13 @@
   <p:clrMapOvr>
     <a:masterClrMapping/>
   </p:clrMapOvr>
+  <p:timing>
+    <p:tnLst>
+      <p:par>
+        <p:cTn id="1" dur="indefinite" restart="never" nodeType="tmRoot"/>
+      </p:par>
+    </p:tnLst>
+  </p:timing>
 </p:sld>
 </file>
 
@@ -5589,12 +7408,61 @@
       </p:grpSpPr>
       <p:sp>
         <p:nvSpPr>
-          <p:cNvPr id="2" name="Объект 1"/>
+          <p:cNvPr id="2" name="Content Placeholder 1"/>
           <p:cNvSpPr>
             <a:spLocks noGrp="1"/>
           </p:cNvSpPr>
           <p:nvPr>
             <p:ph idx="1"/>
+          </p:nvPr>
+        </p:nvSpPr>
+        <p:spPr/>
+        <p:txBody>
+          <a:bodyPr>
+            <a:normAutofit/>
+          </a:bodyPr>
+          <a:lstStyle/>
+          <a:p>
+            <a:pPr algn="r" rtl="1"/>
+            <a:r>
+              <a:rPr lang="he-IL" dirty="0" smtClean="0"/>
+              <a:t>מהו פרוטוקול </a:t>
+            </a:r>
+            <a:r>
+              <a:rPr lang="he-IL" dirty="0"/>
+              <a:t> </a:t>
+            </a:r>
+            <a:r>
+              <a:rPr lang="en-US" dirty="0" smtClean="0"/>
+              <a:t>TDLS</a:t>
+            </a:r>
+            <a:r>
+              <a:rPr lang="he-IL" dirty="0" smtClean="0"/>
+              <a:t> ?</a:t>
+            </a:r>
+          </a:p>
+          <a:p>
+            <a:pPr algn="r" rtl="1"/>
+            <a:endParaRPr lang="he-IL" dirty="0" smtClean="0"/>
+          </a:p>
+          <a:p>
+            <a:pPr algn="r" rtl="1"/>
+            <a:endParaRPr lang="ru-RU" dirty="0"/>
+          </a:p>
+          <a:p>
+            <a:pPr algn="r" rtl="1"/>
+            <a:endParaRPr lang="he-IL" dirty="0"/>
+          </a:p>
+        </p:txBody>
+      </p:sp>
+      <p:sp>
+        <p:nvSpPr>
+          <p:cNvPr id="3" name="Title 2"/>
+          <p:cNvSpPr>
+            <a:spLocks noGrp="1"/>
+          </p:cNvSpPr>
+          <p:nvPr>
+            <p:ph type="title"/>
           </p:nvPr>
         </p:nvSpPr>
         <p:spPr/>
@@ -5602,116 +7470,30 @@
           <a:bodyPr/>
           <a:lstStyle/>
           <a:p>
-            <a:pPr lvl="1" algn="r" rtl="1"/>
-            <a:endParaRPr lang="he-IL" sz="2400" dirty="0" smtClean="0"/>
-          </a:p>
-          <a:p>
-            <a:pPr lvl="1" algn="r" rtl="1"/>
-            <a:r>
-              <a:rPr lang="he-IL" sz="2400" dirty="0" smtClean="0"/>
-              <a:t>פיתוח </a:t>
-            </a:r>
-            <a:r>
-              <a:rPr lang="he-IL" sz="2400" dirty="0"/>
-              <a:t>מספר אלגוריתמים מבוססי יוריסטיקה לביצוע </a:t>
-            </a:r>
-            <a:r>
-              <a:rPr lang="en-US" sz="2400" dirty="0" smtClean="0"/>
-              <a:t>SLS</a:t>
-            </a:r>
-            <a:endParaRPr lang="he-IL" sz="2400" dirty="0" smtClean="0"/>
-          </a:p>
-          <a:p>
-            <a:pPr marL="411480" lvl="1" indent="0" algn="r" rtl="1">
-              <a:buNone/>
-            </a:pPr>
-            <a:r>
-              <a:rPr lang="he-IL" sz="2400" dirty="0" smtClean="0"/>
-              <a:t> </a:t>
-            </a:r>
-            <a:r>
-              <a:rPr lang="he-IL" sz="2400" dirty="0"/>
-              <a:t>(</a:t>
-            </a:r>
-            <a:r>
-              <a:rPr lang="en-US" sz="2400" dirty="0"/>
-              <a:t>Smart Link Selection</a:t>
-            </a:r>
-            <a:r>
-              <a:rPr lang="he-IL" sz="2400" dirty="0" smtClean="0"/>
-              <a:t>)</a:t>
-            </a:r>
-          </a:p>
-          <a:p>
-            <a:pPr marL="411480" lvl="1" indent="0" algn="r" rtl="1">
-              <a:buNone/>
-            </a:pPr>
-            <a:r>
-              <a:rPr lang="he-IL" sz="2400" dirty="0" smtClean="0"/>
-              <a:t> </a:t>
-            </a:r>
-            <a:r>
-              <a:rPr lang="he-IL" sz="2400" dirty="0"/>
-              <a:t>ואפין התנהגותם בתנאי סביבה שונים</a:t>
-            </a:r>
-            <a:r>
-              <a:rPr lang="he-IL" sz="2400" dirty="0" smtClean="0"/>
-              <a:t>.</a:t>
-            </a:r>
-          </a:p>
-          <a:p>
-            <a:pPr marL="411480" lvl="1" indent="0" algn="r" rtl="1">
-              <a:buNone/>
-            </a:pPr>
-            <a:endParaRPr lang="ru-RU" sz="2000" dirty="0"/>
-          </a:p>
-          <a:p>
-            <a:pPr lvl="1" algn="r" rtl="1"/>
-            <a:r>
-              <a:rPr lang="he-IL" sz="2400" dirty="0"/>
-              <a:t>בניית סימולטור לצורך פיתוח ובדיקת האלגוריתמים.</a:t>
-            </a:r>
-            <a:endParaRPr lang="ru-RU" sz="2000" dirty="0"/>
-          </a:p>
-          <a:p>
-            <a:pPr algn="r" rtl="1"/>
-            <a:endParaRPr lang="ru-RU" dirty="0"/>
-          </a:p>
-        </p:txBody>
-      </p:sp>
-      <p:sp>
-        <p:nvSpPr>
-          <p:cNvPr id="3" name="Заголовок 2"/>
-          <p:cNvSpPr>
-            <a:spLocks noGrp="1"/>
-          </p:cNvSpPr>
-          <p:nvPr>
-            <p:ph type="title"/>
-          </p:nvPr>
-        </p:nvSpPr>
-        <p:spPr/>
-        <p:txBody>
-          <a:bodyPr/>
-          <a:lstStyle/>
-          <a:p>
-            <a:r>
-              <a:rPr lang="he-IL" dirty="0" smtClean="0"/>
-              <a:t>מטרת הפרויקט</a:t>
-            </a:r>
-            <a:endParaRPr lang="ru-RU" dirty="0"/>
+            <a:r>
+              <a:rPr lang="he-IL" dirty="0"/>
+              <a:t>מבוא</a:t>
+            </a:r>
           </a:p>
         </p:txBody>
       </p:sp>
     </p:spTree>
     <p:extLst>
       <p:ext uri="{BB962C8B-B14F-4D97-AF65-F5344CB8AC3E}">
-        <p14:creationId xmlns:p14="http://schemas.microsoft.com/office/powerpoint/2010/main" val="1227768707"/>
+        <p14:creationId xmlns:p14="http://schemas.microsoft.com/office/powerpoint/2010/main" val="2103635509"/>
       </p:ext>
     </p:extLst>
   </p:cSld>
   <p:clrMapOvr>
     <a:masterClrMapping/>
   </p:clrMapOvr>
+  <p:timing>
+    <p:tnLst>
+      <p:par>
+        <p:cTn id="1" dur="indefinite" restart="never" nodeType="tmRoot"/>
+      </p:par>
+    </p:tnLst>
+  </p:timing>
 </p:sld>
 </file>
 
@@ -5734,150 +7516,12 @@
       </p:grpSpPr>
       <p:sp>
         <p:nvSpPr>
-          <p:cNvPr id="2" name="Объект 1"/>
+          <p:cNvPr id="2" name="Content Placeholder 1"/>
           <p:cNvSpPr>
             <a:spLocks noGrp="1"/>
           </p:cNvSpPr>
           <p:nvPr>
             <p:ph idx="1"/>
-          </p:nvPr>
-        </p:nvSpPr>
-        <p:spPr/>
-        <p:txBody>
-          <a:bodyPr>
-            <a:normAutofit lnSpcReduction="10000"/>
-          </a:bodyPr>
-          <a:lstStyle/>
-          <a:p>
-            <a:pPr lvl="0" algn="r" rtl="1"/>
-            <a:r>
-              <a:rPr lang="he-IL" dirty="0"/>
-              <a:t>יצירת סימולטור שיהיה מסוגל לדמות העברת נתונים בין שתי תחנות </a:t>
-            </a:r>
-            <a:r>
-              <a:rPr lang="en-US" dirty="0"/>
-              <a:t>WIFI</a:t>
-            </a:r>
-            <a:r>
-              <a:rPr lang="he-IL" dirty="0"/>
-              <a:t> בצורה ישירה או דרך נקודת גישה.</a:t>
-            </a:r>
-            <a:endParaRPr lang="ru-RU" dirty="0"/>
-          </a:p>
-          <a:p>
-            <a:pPr lvl="0" algn="r" rtl="1"/>
-            <a:r>
-              <a:rPr lang="he-IL" dirty="0"/>
-              <a:t>סימולטור ידמה פעולות </a:t>
-            </a:r>
-            <a:r>
-              <a:rPr lang="en-US" dirty="0"/>
-              <a:t>WIFI</a:t>
-            </a:r>
-            <a:r>
-              <a:rPr lang="he-IL" dirty="0"/>
-              <a:t> בשכבה הפיסית ובשכבת הקו (</a:t>
-            </a:r>
-            <a:r>
-              <a:rPr lang="en-US" dirty="0"/>
-              <a:t>data link</a:t>
-            </a:r>
-            <a:r>
-              <a:rPr lang="he-IL" dirty="0"/>
-              <a:t>).</a:t>
-            </a:r>
-            <a:endParaRPr lang="ru-RU" dirty="0"/>
-          </a:p>
-          <a:p>
-            <a:pPr lvl="0" algn="r" rtl="1"/>
-            <a:r>
-              <a:rPr lang="he-IL" dirty="0"/>
-              <a:t>הסימולטור יהיה מסוגל לעבד נתוני הסביבה של </a:t>
-            </a:r>
-            <a:r>
-              <a:rPr lang="en-US" dirty="0"/>
-              <a:t>WIFI</a:t>
-            </a:r>
-            <a:r>
-              <a:rPr lang="he-IL" dirty="0"/>
-              <a:t> (</a:t>
-            </a:r>
-            <a:r>
-              <a:rPr lang="en-US" dirty="0"/>
-              <a:t>RSSI </a:t>
-            </a:r>
-            <a:r>
-              <a:rPr lang="he-IL" dirty="0"/>
-              <a:t>,</a:t>
-            </a:r>
-            <a:r>
-              <a:rPr lang="en-US" dirty="0"/>
-              <a:t>rate scaling</a:t>
-            </a:r>
-            <a:r>
-              <a:rPr lang="he-IL" dirty="0"/>
-              <a:t>, </a:t>
-            </a:r>
-            <a:r>
-              <a:rPr lang="en-US" dirty="0"/>
-              <a:t>CRC </a:t>
-            </a:r>
-            <a:r>
-              <a:rPr lang="he-IL" dirty="0"/>
-              <a:t>,ערוצי תווך זמינים, וכו').</a:t>
-            </a:r>
-            <a:endParaRPr lang="ru-RU" dirty="0"/>
-          </a:p>
-          <a:p>
-            <a:pPr lvl="0" algn="r" rtl="1"/>
-            <a:r>
-              <a:rPr lang="he-IL" dirty="0"/>
-              <a:t>תישקל אפשרות להשמת האלגוריתם על התקני </a:t>
-            </a:r>
-            <a:r>
-              <a:rPr lang="en-US" dirty="0"/>
-              <a:t>WIFI </a:t>
-            </a:r>
-            <a:r>
-              <a:rPr lang="he-IL" dirty="0"/>
-              <a:t>אמיתיים אשר תומכים בפרוטוקול </a:t>
-            </a:r>
-            <a:r>
-              <a:rPr lang="en-US" dirty="0"/>
-              <a:t>TDLS</a:t>
-            </a:r>
-            <a:endParaRPr lang="ru-RU" dirty="0"/>
-          </a:p>
-          <a:p>
-            <a:pPr lvl="0" algn="r" rtl="1"/>
-            <a:r>
-              <a:rPr lang="he-IL" dirty="0"/>
-              <a:t>פיתוח אלגוריתם יעיל לביצוע </a:t>
-            </a:r>
-            <a:r>
-              <a:rPr lang="en-US" dirty="0"/>
-              <a:t>SLS</a:t>
-            </a:r>
-            <a:r>
-              <a:rPr lang="he-IL" dirty="0"/>
-              <a:t> ואימות האלגוריתם באמצעות הסימולטור.</a:t>
-            </a:r>
-            <a:endParaRPr lang="ru-RU" dirty="0"/>
-          </a:p>
-          <a:p>
-            <a:pPr algn="r" rtl="1"/>
-            <a:endParaRPr lang="ru-RU" dirty="0"/>
-          </a:p>
-        </p:txBody>
-      </p:sp>
-      <p:sp>
-        <p:nvSpPr>
-          <p:cNvPr id="3" name="Заголовок 2"/>
-          <p:cNvSpPr>
-            <a:spLocks noGrp="1"/>
-          </p:cNvSpPr>
-          <p:nvPr>
-            <p:ph type="title"/>
           </p:nvPr>
         </p:nvSpPr>
         <p:spPr/>
@@ -5885,24 +7529,96 @@
           <a:bodyPr/>
           <a:lstStyle/>
           <a:p>
+            <a:pPr algn="r" rtl="1"/>
+            <a:r>
+              <a:rPr lang="he-IL" dirty="0"/>
+              <a:t>התרונות השימוש </a:t>
+            </a:r>
             <a:r>
               <a:rPr lang="he-IL" dirty="0" smtClean="0"/>
-              <a:t>מפרט דרישות</a:t>
-            </a:r>
-            <a:endParaRPr lang="ru-RU" dirty="0"/>
+              <a:t>בפרוטוקול </a:t>
+            </a:r>
+            <a:r>
+              <a:rPr lang="en-US" dirty="0" smtClean="0"/>
+              <a:t>TDLS</a:t>
+            </a:r>
+            <a:r>
+              <a:rPr lang="he-IL" dirty="0" smtClean="0"/>
+              <a:t>:</a:t>
+            </a:r>
+            <a:endParaRPr lang="he-IL" dirty="0"/>
+          </a:p>
+          <a:p>
+            <a:pPr lvl="1" algn="r" rtl="1"/>
+            <a:r>
+              <a:rPr lang="he-IL" dirty="0"/>
+              <a:t>קצב העברת נתונים</a:t>
+            </a:r>
+          </a:p>
+          <a:p>
+            <a:pPr lvl="1" algn="r" rtl="1"/>
+            <a:r>
+              <a:rPr lang="he-IL" dirty="0"/>
+              <a:t>תקשורת מאובטחת</a:t>
+            </a:r>
+          </a:p>
+          <a:p>
+            <a:pPr lvl="1" algn="r" rtl="1"/>
+            <a:r>
+              <a:rPr lang="he-IL" dirty="0"/>
+              <a:t>שימיש בפרוטוקולים אשר לא בהכרח נתמכים ב- </a:t>
+            </a:r>
+            <a:r>
+              <a:rPr lang="en-US" dirty="0"/>
+              <a:t>AP</a:t>
+            </a:r>
+            <a:endParaRPr lang="he-IL" dirty="0"/>
+          </a:p>
+          <a:p>
+            <a:pPr algn="r" rtl="1"/>
+            <a:endParaRPr lang="he-IL" dirty="0"/>
+          </a:p>
+        </p:txBody>
+      </p:sp>
+      <p:sp>
+        <p:nvSpPr>
+          <p:cNvPr id="3" name="Title 2"/>
+          <p:cNvSpPr>
+            <a:spLocks noGrp="1"/>
+          </p:cNvSpPr>
+          <p:nvPr>
+            <p:ph type="title"/>
+          </p:nvPr>
+        </p:nvSpPr>
+        <p:spPr/>
+        <p:txBody>
+          <a:bodyPr/>
+          <a:lstStyle/>
+          <a:p>
+            <a:r>
+              <a:rPr lang="he-IL" dirty="0"/>
+              <a:t>מבוא</a:t>
+            </a:r>
           </a:p>
         </p:txBody>
       </p:sp>
     </p:spTree>
     <p:extLst>
       <p:ext uri="{BB962C8B-B14F-4D97-AF65-F5344CB8AC3E}">
-        <p14:creationId xmlns:p14="http://schemas.microsoft.com/office/powerpoint/2010/main" val="2665851871"/>
+        <p14:creationId xmlns:p14="http://schemas.microsoft.com/office/powerpoint/2010/main" val="1781590235"/>
       </p:ext>
     </p:extLst>
   </p:cSld>
   <p:clrMapOvr>
     <a:masterClrMapping/>
   </p:clrMapOvr>
+  <p:timing>
+    <p:tnLst>
+      <p:par>
+        <p:cTn id="1" dur="indefinite" restart="never" nodeType="tmRoot"/>
+      </p:par>
+    </p:tnLst>
+  </p:timing>
 </p:sld>
 </file>
 
@@ -5925,7 +7641,7 @@
       </p:grpSpPr>
       <p:sp>
         <p:nvSpPr>
-          <p:cNvPr id="2" name="Объект 1"/>
+          <p:cNvPr id="2" name="Content Placeholder 1"/>
           <p:cNvSpPr>
             <a:spLocks noGrp="1"/>
           </p:cNvSpPr>
@@ -5938,38 +7654,55 @@
           <a:bodyPr/>
           <a:lstStyle/>
           <a:p>
-            <a:pPr lvl="0" algn="r" rtl="1"/>
+            <a:pPr algn="r" rtl="1"/>
+            <a:r>
+              <a:rPr lang="he-IL" sz="2800" dirty="0"/>
+              <a:t>מגבלות הפרוטוקול:</a:t>
+            </a:r>
+          </a:p>
+          <a:p>
+            <a:pPr lvl="1" algn="r" rtl="1"/>
             <a:r>
               <a:rPr lang="he-IL" dirty="0"/>
-              <a:t>תקשורת מחשבים.</a:t>
-            </a:r>
-            <a:endParaRPr lang="ru-RU" dirty="0"/>
-          </a:p>
-          <a:p>
-            <a:pPr lvl="0" algn="r" rtl="1"/>
-            <a:r>
-              <a:rPr lang="he-IL" dirty="0"/>
-              <a:t>סימולציה של מערכות חומרה/תוכנה.</a:t>
-            </a:r>
-            <a:endParaRPr lang="ru-RU" dirty="0"/>
-          </a:p>
-          <a:p>
-            <a:pPr lvl="0" algn="r" rtl="1"/>
-            <a:r>
-              <a:rPr lang="he-IL" dirty="0"/>
-              <a:t>פרוטוקולי ניתוב. </a:t>
-            </a:r>
-            <a:endParaRPr lang="ru-RU" dirty="0"/>
+              <a:t>אי ידיע מתי עדיף להשתמש בפרוטוקול זה</a:t>
+            </a:r>
+          </a:p>
+          <a:p>
+            <a:pPr marL="0" indent="0" algn="r" rtl="1">
+              <a:buNone/>
+            </a:pPr>
+            <a:endParaRPr lang="en-US" dirty="0" smtClean="0"/>
           </a:p>
           <a:p>
             <a:pPr algn="r" rtl="1"/>
-            <a:endParaRPr lang="ru-RU" dirty="0"/>
-          </a:p>
-        </p:txBody>
-      </p:sp>
-      <p:sp>
-        <p:nvSpPr>
-          <p:cNvPr id="3" name="Заголовок 2"/>
+            <a:r>
+              <a:rPr lang="he-IL" dirty="0" smtClean="0"/>
+              <a:t>כיצד נתמודד עם מגבלות הנ"ל?</a:t>
+            </a:r>
+          </a:p>
+          <a:p>
+            <a:pPr marL="0" indent="0" algn="r" rtl="1">
+              <a:buNone/>
+            </a:pPr>
+            <a:endParaRPr lang="he-IL" dirty="0"/>
+          </a:p>
+          <a:p>
+            <a:pPr algn="r" rtl="1"/>
+            <a:r>
+              <a:rPr lang="he-IL" dirty="0" smtClean="0"/>
+              <a:t>פתרון: </a:t>
+            </a:r>
+            <a:r>
+              <a:rPr lang="en-US" dirty="0" smtClean="0"/>
+              <a:t>Smart Link Selection</a:t>
+            </a:r>
+            <a:endParaRPr lang="he-IL" dirty="0"/>
+          </a:p>
+        </p:txBody>
+      </p:sp>
+      <p:sp>
+        <p:nvSpPr>
+          <p:cNvPr id="3" name="Title 2"/>
           <p:cNvSpPr>
             <a:spLocks noGrp="1"/>
           </p:cNvSpPr>
@@ -5977,39 +7710,35 @@
             <p:ph type="title"/>
           </p:nvPr>
         </p:nvSpPr>
-        <p:spPr>
-          <a:xfrm>
-            <a:off x="467544" y="332656"/>
-            <a:ext cx="8424936" cy="1080120"/>
-          </a:xfrm>
-        </p:spPr>
+        <p:spPr/>
         <p:txBody>
           <a:bodyPr/>
           <a:lstStyle/>
           <a:p>
-            <a:pPr lvl="0"/>
-            <a:r>
-              <a:rPr lang="he-IL" sz="3600" b="1" dirty="0"/>
-              <a:t>תחומים במדעי המחשב אליהם הפרויקט </a:t>
-            </a:r>
-            <a:r>
-              <a:rPr lang="he-IL" sz="3600" b="1" dirty="0" smtClean="0"/>
-              <a:t>משתייך</a:t>
-            </a:r>
-            <a:endParaRPr lang="ru-RU" sz="3600" dirty="0"/>
+            <a:r>
+              <a:rPr lang="he-IL" dirty="0"/>
+              <a:t>מבוא</a:t>
+            </a:r>
           </a:p>
         </p:txBody>
       </p:sp>
     </p:spTree>
     <p:extLst>
       <p:ext uri="{BB962C8B-B14F-4D97-AF65-F5344CB8AC3E}">
-        <p14:creationId xmlns:p14="http://schemas.microsoft.com/office/powerpoint/2010/main" val="1197746625"/>
+        <p14:creationId xmlns:p14="http://schemas.microsoft.com/office/powerpoint/2010/main" val="3077888859"/>
       </p:ext>
     </p:extLst>
   </p:cSld>
   <p:clrMapOvr>
     <a:masterClrMapping/>
   </p:clrMapOvr>
+  <p:timing>
+    <p:tnLst>
+      <p:par>
+        <p:cTn id="1" dur="indefinite" restart="never" nodeType="tmRoot"/>
+      </p:par>
+    </p:tnLst>
+  </p:timing>
 </p:sld>
 </file>
 
@@ -6040,46 +7769,85 @@
             <p:ph idx="1"/>
           </p:nvPr>
         </p:nvSpPr>
-        <p:spPr>
-          <a:xfrm>
-            <a:off x="323528" y="2248347"/>
-            <a:ext cx="8352927" cy="3877815"/>
-          </a:xfrm>
-        </p:spPr>
+        <p:spPr/>
         <p:txBody>
           <a:bodyPr/>
           <a:lstStyle/>
           <a:p>
-            <a:pPr lvl="0" algn="r" rtl="1"/>
-            <a:r>
-              <a:rPr lang="he-IL" dirty="0"/>
-              <a:t>הערכת פיתוח של האלגוריתמים - ניתוח של תוצאות.</a:t>
-            </a:r>
-            <a:endParaRPr lang="ru-RU" dirty="0"/>
-          </a:p>
-          <a:p>
-            <a:pPr lvl="0" algn="r" rtl="1"/>
-            <a:r>
-              <a:rPr lang="he-IL" dirty="0"/>
-              <a:t>יצירה ואימות שהסימולטור מציאותי למערכת </a:t>
-            </a:r>
-            <a:r>
-              <a:rPr lang="en-US" dirty="0"/>
-              <a:t>WIFI</a:t>
-            </a:r>
-            <a:r>
-              <a:rPr lang="he-IL" dirty="0"/>
-              <a:t> בהקשר ל- </a:t>
-            </a:r>
-            <a:r>
-              <a:rPr lang="en-US" dirty="0"/>
+            <a:pPr lvl="1" algn="r" rtl="1"/>
+            <a:endParaRPr lang="he-IL" sz="2400" dirty="0" smtClean="0"/>
+          </a:p>
+          <a:p>
+            <a:pPr lvl="1" algn="r" rtl="1"/>
+            <a:r>
+              <a:rPr lang="he-IL" sz="2400" dirty="0" smtClean="0"/>
+              <a:t>פיתוח </a:t>
+            </a:r>
+            <a:r>
+              <a:rPr lang="he-IL" sz="2400" dirty="0"/>
+              <a:t>מספר אלגוריתמים מבוססי יוריסטיקה לביצוע </a:t>
+            </a:r>
+            <a:r>
+              <a:rPr lang="en-US" sz="2400" dirty="0" smtClean="0"/>
               <a:t>SLS</a:t>
             </a:r>
-            <a:r>
-              <a:rPr lang="he-IL" dirty="0"/>
-              <a:t>. </a:t>
-            </a:r>
-            <a:endParaRPr lang="ru-RU" dirty="0"/>
+            <a:endParaRPr lang="he-IL" sz="2400" dirty="0" smtClean="0"/>
+          </a:p>
+          <a:p>
+            <a:pPr marL="411480" lvl="1" indent="0" algn="r" rtl="1">
+              <a:buNone/>
+            </a:pPr>
+            <a:r>
+              <a:rPr lang="he-IL" sz="2400" dirty="0" smtClean="0"/>
+              <a:t> </a:t>
+            </a:r>
+            <a:r>
+              <a:rPr lang="he-IL" sz="2400" dirty="0"/>
+              <a:t>(</a:t>
+            </a:r>
+            <a:r>
+              <a:rPr lang="en-US" sz="2400" dirty="0"/>
+              <a:t>Smart Link Selection</a:t>
+            </a:r>
+            <a:r>
+              <a:rPr lang="he-IL" sz="2400" dirty="0" smtClean="0"/>
+              <a:t>)</a:t>
+            </a:r>
+          </a:p>
+          <a:p>
+            <a:pPr marL="411480" lvl="1" indent="0" algn="r" rtl="1">
+              <a:buNone/>
+            </a:pPr>
+            <a:r>
+              <a:rPr lang="he-IL" sz="2400" dirty="0" smtClean="0"/>
+              <a:t> </a:t>
+            </a:r>
+            <a:r>
+              <a:rPr lang="he-IL" sz="2400" dirty="0" smtClean="0"/>
+              <a:t>ואפיון </a:t>
+            </a:r>
+            <a:r>
+              <a:rPr lang="he-IL" sz="2400" dirty="0"/>
+              <a:t>התנהגותם בתנאי סביבה שונים</a:t>
+            </a:r>
+            <a:r>
+              <a:rPr lang="he-IL" sz="2400" dirty="0" smtClean="0"/>
+              <a:t>.</a:t>
+            </a:r>
+          </a:p>
+          <a:p>
+            <a:pPr marL="411480" lvl="1" indent="0" algn="r" rtl="1">
+              <a:buNone/>
+            </a:pPr>
+            <a:endParaRPr lang="ru-RU" sz="2000" dirty="0"/>
+          </a:p>
+          <a:p>
+            <a:pPr lvl="1" algn="r" rtl="1"/>
+            <a:r>
+              <a:rPr lang="he-IL" sz="2400" dirty="0"/>
+              <a:t>בניית סימולטור לצורך פיתוח ובדיקת האלגוריתמים.</a:t>
+            </a:r>
+            <a:endParaRPr lang="ru-RU" sz="2000" dirty="0"/>
           </a:p>
           <a:p>
             <a:pPr algn="r" rtl="1"/>
@@ -6102,14 +7870,9 @@
           <a:bodyPr/>
           <a:lstStyle/>
           <a:p>
-            <a:pPr lvl="0"/>
-            <a:r>
-              <a:rPr lang="he-IL" b="1" dirty="0"/>
-              <a:t>המורכבות </a:t>
-            </a:r>
-            <a:r>
-              <a:rPr lang="he-IL" b="1" dirty="0" smtClean="0"/>
-              <a:t>בפרויקט</a:t>
+            <a:r>
+              <a:rPr lang="he-IL" dirty="0" smtClean="0"/>
+              <a:t>מטרת הפרויקט</a:t>
             </a:r>
             <a:endParaRPr lang="ru-RU" dirty="0"/>
           </a:p>
@@ -6118,13 +7881,92 @@
     </p:spTree>
     <p:extLst>
       <p:ext uri="{BB962C8B-B14F-4D97-AF65-F5344CB8AC3E}">
-        <p14:creationId xmlns:p14="http://schemas.microsoft.com/office/powerpoint/2010/main" val="1284990727"/>
+        <p14:creationId xmlns:p14="http://schemas.microsoft.com/office/powerpoint/2010/main" val="1227768707"/>
       </p:ext>
     </p:extLst>
   </p:cSld>
   <p:clrMapOvr>
     <a:masterClrMapping/>
   </p:clrMapOvr>
+  <p:timing>
+    <p:tnLst>
+      <p:par>
+        <p:cTn id="1" dur="indefinite" restart="never" nodeType="tmRoot">
+          <p:childTnLst>
+            <p:seq concurrent="1" nextAc="seek">
+              <p:cTn id="2" dur="indefinite" nodeType="mainSeq">
+                <p:childTnLst>
+                  <p:par>
+                    <p:cTn id="3" fill="hold">
+                      <p:stCondLst>
+                        <p:cond delay="indefinite"/>
+                      </p:stCondLst>
+                      <p:childTnLst>
+                        <p:par>
+                          <p:cTn id="4" fill="hold">
+                            <p:stCondLst>
+                              <p:cond delay="0"/>
+                            </p:stCondLst>
+                            <p:childTnLst>
+                              <p:par>
+                                <p:cTn id="5" presetID="1" presetClass="entr" presetSubtype="0" fill="hold" nodeType="clickEffect">
+                                  <p:stCondLst>
+                                    <p:cond delay="0"/>
+                                  </p:stCondLst>
+                                  <p:childTnLst>
+                                    <p:set>
+                                      <p:cBhvr>
+                                        <p:cTn id="6" dur="1" fill="hold">
+                                          <p:stCondLst>
+                                            <p:cond delay="0"/>
+                                          </p:stCondLst>
+                                        </p:cTn>
+                                        <p:tgtEl>
+                                          <p:spTgt spid="2">
+                                            <p:txEl>
+                                              <p:pRg st="5" end="5"/>
+                                            </p:txEl>
+                                          </p:spTgt>
+                                        </p:tgtEl>
+                                        <p:attrNameLst>
+                                          <p:attrName>style.visibility</p:attrName>
+                                        </p:attrNameLst>
+                                      </p:cBhvr>
+                                      <p:to>
+                                        <p:strVal val="visible"/>
+                                      </p:to>
+                                    </p:set>
+                                  </p:childTnLst>
+                                </p:cTn>
+                              </p:par>
+                            </p:childTnLst>
+                          </p:cTn>
+                        </p:par>
+                      </p:childTnLst>
+                    </p:cTn>
+                  </p:par>
+                </p:childTnLst>
+              </p:cTn>
+              <p:prevCondLst>
+                <p:cond evt="onPrev" delay="0">
+                  <p:tgtEl>
+                    <p:sldTgt/>
+                  </p:tgtEl>
+                </p:cond>
+              </p:prevCondLst>
+              <p:nextCondLst>
+                <p:cond evt="onNext" delay="0">
+                  <p:tgtEl>
+                    <p:sldTgt/>
+                  </p:tgtEl>
+                </p:cond>
+              </p:nextCondLst>
+            </p:seq>
+          </p:childTnLst>
+        </p:cTn>
+      </p:par>
+    </p:tnLst>
+  </p:timing>
 </p:sld>
 </file>
 
@@ -6157,100 +7999,146 @@
         </p:nvSpPr>
         <p:spPr/>
         <p:txBody>
+          <a:bodyPr>
+            <a:normAutofit/>
+          </a:bodyPr>
+          <a:lstStyle/>
+          <a:p>
+            <a:pPr lvl="0" algn="r" rtl="1"/>
+            <a:r>
+              <a:rPr lang="he-IL" dirty="0"/>
+              <a:t>יצירת סימולטור שיהיה מסוגל לדמות העברת נתונים בין שתי תחנות </a:t>
+            </a:r>
+            <a:r>
+              <a:rPr lang="en-US" dirty="0"/>
+              <a:t>WIFI</a:t>
+            </a:r>
+            <a:r>
+              <a:rPr lang="he-IL" dirty="0"/>
+              <a:t> בצורה ישירה או דרך נקודת גישה</a:t>
+            </a:r>
+            <a:r>
+              <a:rPr lang="he-IL" dirty="0" smtClean="0"/>
+              <a:t>.</a:t>
+            </a:r>
+          </a:p>
+          <a:p>
+            <a:pPr lvl="0" algn="r" rtl="1"/>
+            <a:endParaRPr lang="ru-RU" dirty="0"/>
+          </a:p>
+          <a:p>
+            <a:pPr lvl="0" algn="r" rtl="1"/>
+            <a:r>
+              <a:rPr lang="he-IL" dirty="0"/>
+              <a:t>סימולטור ידמה פעולות </a:t>
+            </a:r>
+            <a:r>
+              <a:rPr lang="en-US" dirty="0"/>
+              <a:t>WIFI</a:t>
+            </a:r>
+            <a:r>
+              <a:rPr lang="he-IL" dirty="0"/>
+              <a:t> בשכבה הפיסית ובשכבת הקו (</a:t>
+            </a:r>
+            <a:r>
+              <a:rPr lang="en-US" dirty="0"/>
+              <a:t>data link</a:t>
+            </a:r>
+            <a:r>
+              <a:rPr lang="he-IL" dirty="0" smtClean="0"/>
+              <a:t>).</a:t>
+            </a:r>
+          </a:p>
+          <a:p>
+            <a:pPr lvl="0" algn="r" rtl="1"/>
+            <a:endParaRPr lang="ru-RU" dirty="0"/>
+          </a:p>
+          <a:p>
+            <a:pPr lvl="0" algn="r" rtl="1"/>
+            <a:r>
+              <a:rPr lang="he-IL" dirty="0"/>
+              <a:t>הסימולטור יהיה מסוגל לעבד נתוני הסביבה של </a:t>
+            </a:r>
+            <a:r>
+              <a:rPr lang="en-US" dirty="0"/>
+              <a:t>WIFI</a:t>
+            </a:r>
+            <a:r>
+              <a:rPr lang="he-IL" dirty="0"/>
+              <a:t> (</a:t>
+            </a:r>
+            <a:r>
+              <a:rPr lang="en-US" dirty="0"/>
+              <a:t>RSSI </a:t>
+            </a:r>
+            <a:r>
+              <a:rPr lang="he-IL" dirty="0"/>
+              <a:t>,</a:t>
+            </a:r>
+            <a:r>
+              <a:rPr lang="en-US" dirty="0"/>
+              <a:t>rate scaling</a:t>
+            </a:r>
+            <a:r>
+              <a:rPr lang="he-IL" dirty="0"/>
+              <a:t>, </a:t>
+            </a:r>
+            <a:r>
+              <a:rPr lang="en-US" dirty="0"/>
+              <a:t>CRC </a:t>
+            </a:r>
+            <a:r>
+              <a:rPr lang="he-IL" dirty="0"/>
+              <a:t>,ערוצי תווך זמינים, וכו').</a:t>
+            </a:r>
+            <a:endParaRPr lang="ru-RU" dirty="0"/>
+          </a:p>
+          <a:p>
+            <a:pPr algn="r" rtl="1"/>
+            <a:endParaRPr lang="ru-RU" dirty="0"/>
+          </a:p>
+        </p:txBody>
+      </p:sp>
+      <p:sp>
+        <p:nvSpPr>
+          <p:cNvPr id="3" name="Заголовок 2"/>
+          <p:cNvSpPr>
+            <a:spLocks noGrp="1"/>
+          </p:cNvSpPr>
+          <p:nvPr>
+            <p:ph type="title"/>
+          </p:nvPr>
+        </p:nvSpPr>
+        <p:spPr/>
+        <p:txBody>
           <a:bodyPr/>
           <a:lstStyle/>
           <a:p>
-            <a:pPr lvl="0" algn="r" rtl="1"/>
-            <a:r>
-              <a:rPr lang="en-US" dirty="0" smtClean="0"/>
-              <a:t>Distributed </a:t>
-            </a:r>
-            <a:r>
-              <a:rPr lang="en-US" dirty="0"/>
-              <a:t>version control system</a:t>
-            </a:r>
-            <a:r>
-              <a:rPr lang="he-IL" dirty="0"/>
-              <a:t>.</a:t>
+            <a:r>
+              <a:rPr lang="he-IL" dirty="0" smtClean="0"/>
+              <a:t>מפרט דרישות</a:t>
             </a:r>
             <a:endParaRPr lang="ru-RU" dirty="0"/>
-          </a:p>
-          <a:p>
-            <a:pPr lvl="0" algn="r" rtl="1"/>
-            <a:r>
-              <a:rPr lang="he-IL" dirty="0"/>
-              <a:t>תיבדק אפשרות לשימוש בסימולטורים קיימים לדימוי שכבה פיזית של תקשורת </a:t>
-            </a:r>
-            <a:r>
-              <a:rPr lang="en-US" dirty="0"/>
-              <a:t>WIFI</a:t>
-            </a:r>
-            <a:r>
-              <a:rPr lang="he-IL" dirty="0"/>
-              <a:t>.</a:t>
-            </a:r>
-            <a:endParaRPr lang="ru-RU" dirty="0"/>
-          </a:p>
-          <a:p>
-            <a:pPr lvl="0" algn="r" rtl="1"/>
-            <a:r>
-              <a:rPr lang="he-IL" dirty="0"/>
-              <a:t>תישקל אפשרות לשימוש בכלים לעבודה ב – </a:t>
-            </a:r>
-            <a:r>
-              <a:rPr lang="en-US" dirty="0"/>
-              <a:t>Linux Kernel</a:t>
-            </a:r>
-            <a:r>
-              <a:rPr lang="he-IL" dirty="0"/>
-              <a:t>.</a:t>
-            </a:r>
-            <a:endParaRPr lang="ru-RU" dirty="0"/>
-          </a:p>
-          <a:p>
-            <a:pPr algn="r" rtl="1"/>
-            <a:endParaRPr lang="ru-RU" dirty="0"/>
-          </a:p>
-        </p:txBody>
-      </p:sp>
-      <p:sp>
-        <p:nvSpPr>
-          <p:cNvPr id="3" name="Заголовок 2"/>
-          <p:cNvSpPr>
-            <a:spLocks noGrp="1"/>
-          </p:cNvSpPr>
-          <p:nvPr>
-            <p:ph type="title"/>
-          </p:nvPr>
-        </p:nvSpPr>
-        <p:spPr/>
-        <p:txBody>
-          <a:bodyPr/>
-          <a:lstStyle/>
-          <a:p>
-            <a:pPr lvl="0"/>
-            <a:r>
-              <a:rPr lang="he-IL" sz="4000" b="1" dirty="0"/>
-              <a:t>כלים בהם יעשה שימוש במהלך </a:t>
-            </a:r>
-            <a:r>
-              <a:rPr lang="he-IL" sz="4000" b="1" dirty="0" smtClean="0"/>
-              <a:t>הפרויקט</a:t>
-            </a:r>
-            <a:endParaRPr lang="ru-RU" sz="4000" dirty="0"/>
           </a:p>
         </p:txBody>
       </p:sp>
     </p:spTree>
     <p:extLst>
       <p:ext uri="{BB962C8B-B14F-4D97-AF65-F5344CB8AC3E}">
-        <p14:creationId xmlns:p14="http://schemas.microsoft.com/office/powerpoint/2010/main" val="2294792646"/>
+        <p14:creationId xmlns:p14="http://schemas.microsoft.com/office/powerpoint/2010/main" val="2665851871"/>
       </p:ext>
     </p:extLst>
   </p:cSld>
   <p:clrMapOvr>
     <a:masterClrMapping/>
   </p:clrMapOvr>
+  <p:timing>
+    <p:tnLst>
+      <p:par>
+        <p:cTn id="1" dur="indefinite" restart="never" nodeType="tmRoot"/>
+      </p:par>
+    </p:tnLst>
+  </p:timing>
 </p:sld>
 </file>
 
@@ -6273,7 +8161,7 @@
       </p:grpSpPr>
       <p:sp>
         <p:nvSpPr>
-          <p:cNvPr id="2" name="Объект 1"/>
+          <p:cNvPr id="2" name="Content Placeholder 1"/>
           <p:cNvSpPr>
             <a:spLocks noGrp="1"/>
           </p:cNvSpPr>
@@ -6283,95 +8171,13 @@
         </p:nvSpPr>
         <p:spPr/>
         <p:txBody>
-          <a:bodyPr>
-            <a:normAutofit fontScale="85000" lnSpcReduction="20000"/>
-          </a:bodyPr>
+          <a:bodyPr/>
           <a:lstStyle/>
           <a:p>
             <a:pPr lvl="0" algn="r" rtl="1"/>
             <a:r>
-              <a:rPr lang="he-IL" b="1" dirty="0"/>
-              <a:t>נבדוק שהאלגוריתמים נותנים יעילות מרבית </a:t>
-            </a:r>
-            <a:r>
               <a:rPr lang="he-IL" dirty="0"/>
-              <a:t>– נבחר </a:t>
-            </a:r>
-            <a:r>
-              <a:rPr lang="en-US" dirty="0"/>
-              <a:t>X</a:t>
-            </a:r>
-            <a:r>
-              <a:rPr lang="he-IL" dirty="0"/>
-              <a:t> מצבי סביבה שונים (מצבים קיצוניים וחשובים). נחשב תאורטית באיזה משני מודי עבודה עדיף לנו לעבוד במצבים הנ"ל ע"מ לקבל קצב העברת נתונים מרבי. נבדוק שגם האלגוריתמים שלנו מבצעים בחירה נכונה ב"מוד" עבודה במצבים הנ"ל ע"י השווה עם החישובים התאורטיים.</a:t>
-            </a:r>
-            <a:endParaRPr lang="ru-RU" dirty="0"/>
-          </a:p>
-          <a:p>
-            <a:pPr algn="r" rtl="1"/>
-            <a:r>
-              <a:rPr lang="he-IL" dirty="0"/>
-              <a:t>(</a:t>
-            </a:r>
-            <a:r>
-              <a:rPr lang="he-IL" u="sng" dirty="0"/>
-              <a:t>מוד עבודה</a:t>
-            </a:r>
-            <a:r>
-              <a:rPr lang="he-IL" dirty="0"/>
-              <a:t>: </a:t>
-            </a:r>
-            <a:r>
-              <a:rPr lang="en-US" dirty="0"/>
-              <a:t>TDLS </a:t>
-            </a:r>
-            <a:r>
-              <a:rPr lang="he-IL" dirty="0"/>
-              <a:t> והדרך הרגילה (</a:t>
-            </a:r>
-            <a:r>
-              <a:rPr lang="en-US" dirty="0"/>
-              <a:t>BSS</a:t>
-            </a:r>
-            <a:r>
-              <a:rPr lang="he-IL" dirty="0"/>
-              <a:t>))  </a:t>
-            </a:r>
-            <a:endParaRPr lang="ru-RU" dirty="0"/>
-          </a:p>
-          <a:p>
-            <a:pPr algn="r" rtl="1"/>
-            <a:r>
-              <a:rPr lang="he-IL" dirty="0"/>
-              <a:t>(</a:t>
-            </a:r>
-            <a:r>
-              <a:rPr lang="he-IL" u="sng" dirty="0"/>
-              <a:t>מצבי סביבה</a:t>
-            </a:r>
-            <a:r>
-              <a:rPr lang="he-IL" dirty="0"/>
-              <a:t>: מרחק בין תחנות, מספר תחנות בסביה, רעש בסביה – </a:t>
-            </a:r>
-            <a:r>
-              <a:rPr lang="en-US" dirty="0"/>
-              <a:t>CRC</a:t>
-            </a:r>
-            <a:r>
-              <a:rPr lang="he-IL" dirty="0"/>
-              <a:t>, עוצמת שידור ועוד..)</a:t>
-            </a:r>
-            <a:endParaRPr lang="ru-RU" dirty="0"/>
-          </a:p>
-          <a:p>
-            <a:pPr lvl="0" algn="r" rtl="1"/>
-            <a:r>
-              <a:rPr lang="he-IL" b="1" dirty="0"/>
-              <a:t>נבדוק שהסימולטור מציאותי </a:t>
-            </a:r>
-            <a:r>
-              <a:rPr lang="he-IL" dirty="0"/>
-              <a:t>ע"י השוואת נתוני סביבה שהסימולטור מציג לבין נתוני הסביבה שמספק התקן</a:t>
+              <a:t>תישקל אפשרות להשמת האלגוריתם על התקני </a:t>
             </a:r>
             <a:r>
               <a:rPr lang="en-US" dirty="0"/>
@@ -6379,23 +8185,23 @@
             </a:r>
             <a:r>
               <a:rPr lang="he-IL" dirty="0"/>
-              <a:t> אמתי במצבי עבודה שונים (שליחת נתונים..), בתנאי סביבה שונים (מקרי קיצון ומקרי אמצע).</a:t>
-            </a:r>
+              <a:t>אמיתיים אשר תומכים בפרוטוקול </a:t>
+            </a:r>
+            <a:r>
+              <a:rPr lang="en-US" dirty="0" smtClean="0"/>
+              <a:t>TDLS</a:t>
+            </a:r>
+            <a:endParaRPr lang="he-IL" dirty="0" smtClean="0"/>
+          </a:p>
+          <a:p>
+            <a:pPr lvl="0" algn="r" rtl="1"/>
             <a:endParaRPr lang="ru-RU" dirty="0"/>
           </a:p>
           <a:p>
-            <a:pPr algn="r" rtl="1"/>
+            <a:pPr lvl="0" algn="r" rtl="1"/>
             <a:r>
               <a:rPr lang="he-IL" dirty="0"/>
-              <a:t>במילים אחרות נבדוק שהסימולטור שלנו מתנהג כמה התקן </a:t>
-            </a:r>
-            <a:r>
-              <a:rPr lang="en-US" dirty="0"/>
-              <a:t>WIFI</a:t>
-            </a:r>
-            <a:r>
-              <a:rPr lang="he-IL" dirty="0"/>
-              <a:t> אמתי ביחס לנתוני סביבה הרלוונטיים לאלגוריתמי </a:t>
+              <a:t>פיתוח אלגוריתם יעיל לביצוע </a:t>
             </a:r>
             <a:r>
               <a:rPr lang="en-US" dirty="0"/>
@@ -6403,19 +8209,19 @@
             </a:r>
             <a:r>
               <a:rPr lang="he-IL" dirty="0"/>
-              <a:t> במצבי עבודה שונים (לדוגמא: שליחת נתונים). </a:t>
+              <a:t> ואימות האלגוריתם באמצעות הסימולטור.</a:t>
             </a:r>
             <a:endParaRPr lang="ru-RU" dirty="0"/>
           </a:p>
           <a:p>
             <a:pPr algn="r" rtl="1"/>
-            <a:endParaRPr lang="ru-RU" dirty="0"/>
-          </a:p>
-        </p:txBody>
-      </p:sp>
-      <p:sp>
-        <p:nvSpPr>
-          <p:cNvPr id="3" name="Заголовок 2"/>
+            <a:endParaRPr lang="he-IL" dirty="0"/>
+          </a:p>
+        </p:txBody>
+      </p:sp>
+      <p:sp>
+        <p:nvSpPr>
+          <p:cNvPr id="3" name="Title 2"/>
           <p:cNvSpPr>
             <a:spLocks noGrp="1"/>
           </p:cNvSpPr>
@@ -6428,29 +8234,30 @@
           <a:bodyPr/>
           <a:lstStyle/>
           <a:p>
-            <a:pPr lvl="0"/>
-            <a:r>
-              <a:rPr lang="he-IL" sz="4800" b="1" dirty="0"/>
-              <a:t>כיצד תבחן הצלחה של </a:t>
-            </a:r>
-            <a:r>
-              <a:rPr lang="he-IL" sz="4800" b="1" dirty="0" smtClean="0"/>
-              <a:t>הפרויקט</a:t>
-            </a:r>
-            <a:endParaRPr lang="ru-RU" sz="4800" dirty="0"/>
+            <a:r>
+              <a:rPr lang="he-IL" dirty="0"/>
+              <a:t>מפרט דרישות</a:t>
+            </a:r>
           </a:p>
         </p:txBody>
       </p:sp>
     </p:spTree>
     <p:extLst>
       <p:ext uri="{BB962C8B-B14F-4D97-AF65-F5344CB8AC3E}">
-        <p14:creationId xmlns:p14="http://schemas.microsoft.com/office/powerpoint/2010/main" val="368764763"/>
+        <p14:creationId xmlns:p14="http://schemas.microsoft.com/office/powerpoint/2010/main" val="1892296583"/>
       </p:ext>
     </p:extLst>
   </p:cSld>
   <p:clrMapOvr>
     <a:masterClrMapping/>
   </p:clrMapOvr>
+  <p:timing>
+    <p:tnLst>
+      <p:par>
+        <p:cTn id="1" dur="indefinite" restart="never" nodeType="tmRoot"/>
+      </p:par>
+    </p:tnLst>
+  </p:timing>
 </p:sld>
 </file>
 
@@ -6716,4 +8523,289 @@
   <a:objectDefaults/>
   <a:extraClrSchemeLst/>
 </a:theme>
+</file>
+
+<file path=ppt/theme/theme2.xml><?xml version="1.0" encoding="utf-8"?>
+<a:theme xmlns:a="http://schemas.openxmlformats.org/drawingml/2006/main" name="Office Theme">
+  <a:themeElements>
+    <a:clrScheme name="Office">
+      <a:dk1>
+        <a:sysClr val="windowText" lastClr="000000"/>
+      </a:dk1>
+      <a:lt1>
+        <a:sysClr val="window" lastClr="FFFFFF"/>
+      </a:lt1>
+      <a:dk2>
+        <a:srgbClr val="1F497D"/>
+      </a:dk2>
+      <a:lt2>
+        <a:srgbClr val="EEECE1"/>
+      </a:lt2>
+      <a:accent1>
+        <a:srgbClr val="4F81BD"/>
+      </a:accent1>
+      <a:accent2>
+        <a:srgbClr val="C0504D"/>
+      </a:accent2>
+      <a:accent3>
+        <a:srgbClr val="9BBB59"/>
+      </a:accent3>
+      <a:accent4>
+        <a:srgbClr val="8064A2"/>
+      </a:accent4>
+      <a:accent5>
+        <a:srgbClr val="4BACC6"/>
+      </a:accent5>
+      <a:accent6>
+        <a:srgbClr val="F79646"/>
+      </a:accent6>
+      <a:hlink>
+        <a:srgbClr val="0000FF"/>
+      </a:hlink>
+      <a:folHlink>
+        <a:srgbClr val="800080"/>
+      </a:folHlink>
+    </a:clrScheme>
+    <a:fontScheme name="Office">
+      <a:majorFont>
+        <a:latin typeface="Calibri"/>
+        <a:ea typeface=""/>
+        <a:cs typeface=""/>
+        <a:font script="Jpan" typeface="ＭＳ Ｐゴシック"/>
+        <a:font script="Hang" typeface="맑은 고딕"/>
+        <a:font script="Hans" typeface="宋体"/>
+        <a:font script="Hant" typeface="新細明體"/>
+        <a:font script="Arab" typeface="Times New Roman"/>
+        <a:font script="Hebr" typeface="Times New Roman"/>
+        <a:font script="Thai" typeface="Angsana New"/>
+        <a:font script="Ethi" typeface="Nyala"/>
+        <a:font script="Beng" typeface="Vrinda"/>
+        <a:font script="Gujr" typeface="Shruti"/>
+        <a:font script="Khmr" typeface="MoolBoran"/>
+        <a:font script="Knda" typeface="Tunga"/>
+        <a:font script="Guru" typeface="Raavi"/>
+        <a:font script="Cans" typeface="Euphemia"/>
+        <a:font script="Cher" typeface="Plantagenet Cherokee"/>
+        <a:font script="Yiii" typeface="Microsoft Yi Baiti"/>
+        <a:font script="Tibt" typeface="Microsoft Himalaya"/>
+        <a:font script="Thaa" typeface="MV Boli"/>
+        <a:font script="Deva" typeface="Mangal"/>
+        <a:font script="Telu" typeface="Gautami"/>
+        <a:font script="Taml" typeface="Latha"/>
+        <a:font script="Syrc" typeface="Estrangelo Edessa"/>
+        <a:font script="Orya" typeface="Kalinga"/>
+        <a:font script="Mlym" typeface="Kartika"/>
+        <a:font script="Laoo" typeface="DokChampa"/>
+        <a:font script="Sinh" typeface="Iskoola Pota"/>
+        <a:font script="Mong" typeface="Mongolian Baiti"/>
+        <a:font script="Viet" typeface="Times New Roman"/>
+        <a:font script="Uigh" typeface="Microsoft Uighur"/>
+        <a:font script="Geor" typeface="Sylfaen"/>
+      </a:majorFont>
+      <a:minorFont>
+        <a:latin typeface="Calibri"/>
+        <a:ea typeface=""/>
+        <a:cs typeface=""/>
+        <a:font script="Jpan" typeface="ＭＳ Ｐゴシック"/>
+        <a:font script="Hang" typeface="맑은 고딕"/>
+        <a:font script="Hans" typeface="宋体"/>
+        <a:font script="Hant" typeface="新細明體"/>
+        <a:font script="Arab" typeface="Arial"/>
+        <a:font script="Hebr" typeface="Arial"/>
+        <a:font script="Thai" typeface="Cordia New"/>
+        <a:font script="Ethi" typeface="Nyala"/>
+        <a:font script="Beng" typeface="Vrinda"/>
+        <a:font script="Gujr" typeface="Shruti"/>
+        <a:font script="Khmr" typeface="DaunPenh"/>
+        <a:font script="Knda" typeface="Tunga"/>
+        <a:font script="Guru" typeface="Raavi"/>
+        <a:font script="Cans" typeface="Euphemia"/>
+        <a:font script="Cher" typeface="Plantagenet Cherokee"/>
+        <a:font script="Yiii" typeface="Microsoft Yi Baiti"/>
+        <a:font script="Tibt" typeface="Microsoft Himalaya"/>
+        <a:font script="Thaa" typeface="MV Boli"/>
+        <a:font script="Deva" typeface="Mangal"/>
+        <a:font script="Telu" typeface="Gautami"/>
+        <a:font script="Taml" typeface="Latha"/>
+        <a:font script="Syrc" typeface="Estrangelo Edessa"/>
+        <a:font script="Orya" typeface="Kalinga"/>
+        <a:font script="Mlym" typeface="Kartika"/>
+        <a:font script="Laoo" typeface="DokChampa"/>
+        <a:font script="Sinh" typeface="Iskoola Pota"/>
+        <a:font script="Mong" typeface="Mongolian Baiti"/>
+        <a:font script="Viet" typeface="Arial"/>
+        <a:font script="Uigh" typeface="Microsoft Uighur"/>
+        <a:font script="Geor" typeface="Sylfaen"/>
+      </a:minorFont>
+    </a:fontScheme>
+    <a:fmtScheme name="Office">
+      <a:fillStyleLst>
+        <a:solidFill>
+          <a:schemeClr val="phClr"/>
+        </a:solidFill>
+        <a:gradFill rotWithShape="1">
+          <a:gsLst>
+            <a:gs pos="0">
+              <a:schemeClr val="phClr">
+                <a:tint val="50000"/>
+                <a:satMod val="300000"/>
+              </a:schemeClr>
+            </a:gs>
+            <a:gs pos="35000">
+              <a:schemeClr val="phClr">
+                <a:tint val="37000"/>
+                <a:satMod val="300000"/>
+              </a:schemeClr>
+            </a:gs>
+            <a:gs pos="100000">
+              <a:schemeClr val="phClr">
+                <a:tint val="15000"/>
+                <a:satMod val="350000"/>
+              </a:schemeClr>
+            </a:gs>
+          </a:gsLst>
+          <a:lin ang="16200000" scaled="1"/>
+        </a:gradFill>
+        <a:gradFill rotWithShape="1">
+          <a:gsLst>
+            <a:gs pos="0">
+              <a:schemeClr val="phClr">
+                <a:shade val="51000"/>
+                <a:satMod val="130000"/>
+              </a:schemeClr>
+            </a:gs>
+            <a:gs pos="80000">
+              <a:schemeClr val="phClr">
+                <a:shade val="93000"/>
+                <a:satMod val="130000"/>
+              </a:schemeClr>
+            </a:gs>
+            <a:gs pos="100000">
+              <a:schemeClr val="phClr">
+                <a:shade val="94000"/>
+                <a:satMod val="135000"/>
+              </a:schemeClr>
+            </a:gs>
+          </a:gsLst>
+          <a:lin ang="16200000" scaled="0"/>
+        </a:gradFill>
+      </a:fillStyleLst>
+      <a:lnStyleLst>
+        <a:ln w="9525" cap="flat" cmpd="sng" algn="ctr">
+          <a:solidFill>
+            <a:schemeClr val="phClr">
+              <a:shade val="95000"/>
+              <a:satMod val="105000"/>
+            </a:schemeClr>
+          </a:solidFill>
+          <a:prstDash val="solid"/>
+        </a:ln>
+        <a:ln w="25400" cap="flat" cmpd="sng" algn="ctr">
+          <a:solidFill>
+            <a:schemeClr val="phClr"/>
+          </a:solidFill>
+          <a:prstDash val="solid"/>
+        </a:ln>
+        <a:ln w="38100" cap="flat" cmpd="sng" algn="ctr">
+          <a:solidFill>
+            <a:schemeClr val="phClr"/>
+          </a:solidFill>
+          <a:prstDash val="solid"/>
+        </a:ln>
+      </a:lnStyleLst>
+      <a:effectStyleLst>
+        <a:effectStyle>
+          <a:effectLst>
+            <a:outerShdw blurRad="40000" dist="20000" dir="5400000" rotWithShape="0">
+              <a:srgbClr val="000000">
+                <a:alpha val="38000"/>
+              </a:srgbClr>
+            </a:outerShdw>
+          </a:effectLst>
+        </a:effectStyle>
+        <a:effectStyle>
+          <a:effectLst>
+            <a:outerShdw blurRad="40000" dist="23000" dir="5400000" rotWithShape="0">
+              <a:srgbClr val="000000">
+                <a:alpha val="35000"/>
+              </a:srgbClr>
+            </a:outerShdw>
+          </a:effectLst>
+        </a:effectStyle>
+        <a:effectStyle>
+          <a:effectLst>
+            <a:outerShdw blurRad="40000" dist="23000" dir="5400000" rotWithShape="0">
+              <a:srgbClr val="000000">
+                <a:alpha val="35000"/>
+              </a:srgbClr>
+            </a:outerShdw>
+          </a:effectLst>
+          <a:scene3d>
+            <a:camera prst="orthographicFront">
+              <a:rot lat="0" lon="0" rev="0"/>
+            </a:camera>
+            <a:lightRig rig="threePt" dir="t">
+              <a:rot lat="0" lon="0" rev="1200000"/>
+            </a:lightRig>
+          </a:scene3d>
+          <a:sp3d>
+            <a:bevelT w="63500" h="25400"/>
+          </a:sp3d>
+        </a:effectStyle>
+      </a:effectStyleLst>
+      <a:bgFillStyleLst>
+        <a:solidFill>
+          <a:schemeClr val="phClr"/>
+        </a:solidFill>
+        <a:gradFill rotWithShape="1">
+          <a:gsLst>
+            <a:gs pos="0">
+              <a:schemeClr val="phClr">
+                <a:tint val="40000"/>
+                <a:satMod val="350000"/>
+              </a:schemeClr>
+            </a:gs>
+            <a:gs pos="40000">
+              <a:schemeClr val="phClr">
+                <a:tint val="45000"/>
+                <a:shade val="99000"/>
+                <a:satMod val="350000"/>
+              </a:schemeClr>
+            </a:gs>
+            <a:gs pos="100000">
+              <a:schemeClr val="phClr">
+                <a:shade val="20000"/>
+                <a:satMod val="255000"/>
+              </a:schemeClr>
+            </a:gs>
+          </a:gsLst>
+          <a:path path="circle">
+            <a:fillToRect l="50000" t="-80000" r="50000" b="180000"/>
+          </a:path>
+        </a:gradFill>
+        <a:gradFill rotWithShape="1">
+          <a:gsLst>
+            <a:gs pos="0">
+              <a:schemeClr val="phClr">
+                <a:tint val="80000"/>
+                <a:satMod val="300000"/>
+              </a:schemeClr>
+            </a:gs>
+            <a:gs pos="100000">
+              <a:schemeClr val="phClr">
+                <a:shade val="30000"/>
+                <a:satMod val="200000"/>
+              </a:schemeClr>
+            </a:gs>
+          </a:gsLst>
+          <a:path path="circle">
+            <a:fillToRect l="50000" t="50000" r="50000" b="50000"/>
+          </a:path>
+        </a:gradFill>
+      </a:bgFillStyleLst>
+    </a:fmtScheme>
+  </a:themeElements>
+  <a:objectDefaults/>
+  <a:extraClrSchemeLst/>
+</a:theme>
 </file>
</xml_diff>

<commit_message>
Added new Pictures PreMaceget Changes
Signed-off-by: Andrey Shamis <lolnik@gmail.com>
</commit_message>
<xml_diff>
--- a/מצגת.pptx
+++ b/מצגת.pptx
@@ -206,7 +206,7 @@
           <a:p>
             <a:fld id="{9A78BA3A-7736-4AAE-B32E-AB7964FE7FAF}" type="datetimeFigureOut">
               <a:rPr lang="he-IL" smtClean="0"/>
-              <a:t>ה'/כסלו/תשע"ג</a:t>
+              <a:t>ו'/כסלו/תשע"ג</a:t>
             </a:fld>
             <a:endParaRPr lang="he-IL"/>
           </a:p>
@@ -1390,7 +1390,7 @@
           <a:p>
             <a:fld id="{B4C71EC6-210F-42DE-9C53-41977AD35B3D}" type="datetimeFigureOut">
               <a:rPr lang="ru-RU" smtClean="0"/>
-              <a:t>19.11.2012</a:t>
+              <a:t>20.11.2012</a:t>
             </a:fld>
             <a:endParaRPr lang="ru-RU"/>
           </a:p>
@@ -1915,7 +1915,7 @@
           <a:p>
             <a:fld id="{B4C71EC6-210F-42DE-9C53-41977AD35B3D}" type="datetimeFigureOut">
               <a:rPr lang="ru-RU" smtClean="0"/>
-              <a:t>19.11.2012</a:t>
+              <a:t>20.11.2012</a:t>
             </a:fld>
             <a:endParaRPr lang="ru-RU"/>
           </a:p>
@@ -2229,7 +2229,7 @@
           <a:p>
             <a:fld id="{B4C71EC6-210F-42DE-9C53-41977AD35B3D}" type="datetimeFigureOut">
               <a:rPr lang="ru-RU" smtClean="0"/>
-              <a:t>19.11.2012</a:t>
+              <a:t>20.11.2012</a:t>
             </a:fld>
             <a:endParaRPr lang="ru-RU"/>
           </a:p>
@@ -2515,7 +2515,7 @@
           <a:p>
             <a:fld id="{B4C71EC6-210F-42DE-9C53-41977AD35B3D}" type="datetimeFigureOut">
               <a:rPr lang="ru-RU" smtClean="0"/>
-              <a:t>19.11.2012</a:t>
+              <a:t>20.11.2012</a:t>
             </a:fld>
             <a:endParaRPr lang="ru-RU"/>
           </a:p>
@@ -3090,7 +3090,7 @@
           <a:p>
             <a:fld id="{B4C71EC6-210F-42DE-9C53-41977AD35B3D}" type="datetimeFigureOut">
               <a:rPr lang="ru-RU" smtClean="0"/>
-              <a:t>19.11.2012</a:t>
+              <a:t>20.11.2012</a:t>
             </a:fld>
             <a:endParaRPr lang="ru-RU"/>
           </a:p>
@@ -3180,7 +3180,7 @@
           <a:p>
             <a:fld id="{B4C71EC6-210F-42DE-9C53-41977AD35B3D}" type="datetimeFigureOut">
               <a:rPr lang="ru-RU" smtClean="0"/>
-              <a:t>19.11.2012</a:t>
+              <a:t>20.11.2012</a:t>
             </a:fld>
             <a:endParaRPr lang="ru-RU"/>
           </a:p>
@@ -3889,7 +3889,7 @@
           <a:p>
             <a:fld id="{B4C71EC6-210F-42DE-9C53-41977AD35B3D}" type="datetimeFigureOut">
               <a:rPr lang="ru-RU" smtClean="0"/>
-              <a:t>19.11.2012</a:t>
+              <a:t>20.11.2012</a:t>
             </a:fld>
             <a:endParaRPr lang="ru-RU"/>
           </a:p>
@@ -4141,7 +4141,7 @@
           <a:p>
             <a:fld id="{B4C71EC6-210F-42DE-9C53-41977AD35B3D}" type="datetimeFigureOut">
               <a:rPr lang="ru-RU" smtClean="0"/>
-              <a:t>19.11.2012</a:t>
+              <a:t>20.11.2012</a:t>
             </a:fld>
             <a:endParaRPr lang="ru-RU"/>
           </a:p>
@@ -4370,7 +4370,7 @@
           <a:p>
             <a:fld id="{B4C71EC6-210F-42DE-9C53-41977AD35B3D}" type="datetimeFigureOut">
               <a:rPr lang="ru-RU" smtClean="0"/>
-              <a:t>19.11.2012</a:t>
+              <a:t>20.11.2012</a:t>
             </a:fld>
             <a:endParaRPr lang="ru-RU"/>
           </a:p>
@@ -4644,7 +4644,7 @@
           <a:p>
             <a:fld id="{B4C71EC6-210F-42DE-9C53-41977AD35B3D}" type="datetimeFigureOut">
               <a:rPr lang="ru-RU" smtClean="0"/>
-              <a:t>19.11.2012</a:t>
+              <a:t>20.11.2012</a:t>
             </a:fld>
             <a:endParaRPr lang="ru-RU"/>
           </a:p>
@@ -4930,7 +4930,7 @@
           <a:p>
             <a:fld id="{B4C71EC6-210F-42DE-9C53-41977AD35B3D}" type="datetimeFigureOut">
               <a:rPr lang="ru-RU" smtClean="0"/>
-              <a:t>19.11.2012</a:t>
+              <a:t>20.11.2012</a:t>
             </a:fld>
             <a:endParaRPr lang="ru-RU"/>
           </a:p>
@@ -5198,7 +5198,7 @@
           <a:p>
             <a:fld id="{B4C71EC6-210F-42DE-9C53-41977AD35B3D}" type="datetimeFigureOut">
               <a:rPr lang="ru-RU" smtClean="0"/>
-              <a:t>19.11.2012</a:t>
+              <a:t>20.11.2012</a:t>
             </a:fld>
             <a:endParaRPr lang="ru-RU"/>
           </a:p>
@@ -6492,7 +6492,7 @@
         </p:nvGraphicFramePr>
         <p:xfrm>
           <a:off x="1187624" y="2204864"/>
-          <a:ext cx="6697107" cy="3715897"/>
+          <a:ext cx="6697107" cy="3743265"/>
         </p:xfrm>
         <a:graphic>
           <a:graphicData uri="http://schemas.openxmlformats.org/drawingml/2006/table">
@@ -6933,13 +6933,7 @@
                         <a:rPr lang="he-IL" sz="1400" dirty="0" smtClean="0">
                           <a:effectLst/>
                         </a:rPr>
-                        <a:t>שם </a:t>
-                      </a:r>
-                      <a:r>
-                        <a:rPr lang="he-IL" sz="1400" dirty="0" smtClean="0">
-                          <a:effectLst/>
-                        </a:rPr>
-                        <a:t>המנחים:               </a:t>
+                        <a:t>שם המנחים:               </a:t>
                       </a:r>
                       <a:r>
                         <a:rPr lang="he-IL" sz="1400" dirty="0">
@@ -7185,8 +7179,8 @@
         </p:nvSpPr>
         <p:spPr>
           <a:xfrm>
-            <a:off x="699247" y="2248347"/>
-            <a:ext cx="7745505" cy="4204989"/>
+            <a:off x="107504" y="1916833"/>
+            <a:ext cx="8712967" cy="4536504"/>
           </a:xfrm>
         </p:spPr>
         <p:txBody>
@@ -7210,10 +7204,16 @@
             </a:r>
           </a:p>
           <a:p>
-            <a:pPr algn="r" rtl="1"/>
+            <a:pPr marL="0" indent="0" algn="r" rtl="1">
+              <a:buNone/>
+            </a:pPr>
+            <a:r>
+              <a:rPr lang="he-IL" dirty="0" smtClean="0"/>
+              <a:t>עבודה </a:t>
+            </a:r>
             <a:r>
               <a:rPr lang="he-IL" dirty="0"/>
-              <a:t>אופן עבודה עם </a:t>
+              <a:t>עם </a:t>
             </a:r>
             <a:r>
               <a:rPr lang="en-US" dirty="0"/>
@@ -7227,82 +7227,66 @@
               <a:rPr lang="he-IL" dirty="0" smtClean="0"/>
               <a:t>:</a:t>
             </a:r>
+            <a:endParaRPr lang="en-US" sz="1200" dirty="0" smtClean="0"/>
+          </a:p>
+          <a:p>
+            <a:pPr lvl="1" algn="r" rtl="1">
+              <a:buFont typeface="Wingdings" pitchFamily="2" charset="2"/>
+              <a:buChar char="v"/>
+            </a:pPr>
+            <a:r>
+              <a:rPr lang="he-IL" sz="1600" dirty="0"/>
+              <a:t>תקשורת לא ישירה המשתמשת בנקודת גישה (</a:t>
+            </a:r>
+            <a:r>
+              <a:rPr lang="en-US" sz="1600" dirty="0"/>
+              <a:t>Base Service Set - BSS</a:t>
+            </a:r>
+            <a:r>
+              <a:rPr lang="he-IL" sz="1600" dirty="0"/>
+              <a:t>)</a:t>
+            </a:r>
+            <a:r>
+              <a:rPr lang="en-US" sz="1600" dirty="0"/>
+              <a:t> </a:t>
+            </a:r>
+            <a:endParaRPr lang="en-US" sz="1600" dirty="0" smtClean="0"/>
+          </a:p>
+          <a:p>
+            <a:pPr lvl="1" algn="r" rtl="1">
+              <a:buFont typeface="Wingdings" pitchFamily="2" charset="2"/>
+              <a:buChar char="v"/>
+            </a:pPr>
+            <a:r>
+              <a:rPr lang="he-IL" sz="1600" dirty="0"/>
+              <a:t>תקשורת ישירה בין שני התקני </a:t>
+            </a:r>
+            <a:r>
+              <a:rPr lang="en-US" sz="1600" dirty="0"/>
+              <a:t>WIFI </a:t>
+            </a:r>
+            <a:r>
+              <a:rPr lang="he-IL" sz="1600" dirty="0"/>
+              <a:t> (</a:t>
+            </a:r>
+            <a:r>
+              <a:rPr lang="en-US" sz="1600" dirty="0"/>
+              <a:t>IBSS, Tunneled Data Link Setup - TDLS , WIFI Direct</a:t>
+            </a:r>
+            <a:r>
+              <a:rPr lang="he-IL" sz="1600" dirty="0" smtClean="0"/>
+              <a:t>)</a:t>
+            </a:r>
+            <a:endParaRPr lang="en-US" sz="1200" dirty="0"/>
           </a:p>
           <a:p>
             <a:pPr lvl="1" algn="r" rtl="1"/>
-            <a:r>
-              <a:rPr lang="he-IL" dirty="0" smtClean="0"/>
-              <a:t>תקשורת ישירה בין שני התקני </a:t>
-            </a:r>
-            <a:r>
-              <a:rPr lang="en-US" dirty="0" smtClean="0"/>
-              <a:t>WIFI </a:t>
-            </a:r>
-            <a:r>
-              <a:rPr lang="he-IL" dirty="0" smtClean="0"/>
-              <a:t> </a:t>
-            </a:r>
-            <a:r>
-              <a:rPr lang="he-IL" dirty="0"/>
-              <a:t>(</a:t>
-            </a:r>
-            <a:r>
-              <a:rPr lang="en-US" dirty="0"/>
-              <a:t>IBSS, Tunneled </a:t>
-            </a:r>
-            <a:r>
-              <a:rPr lang="en-US" dirty="0" smtClean="0"/>
-              <a:t>Data </a:t>
-            </a:r>
-            <a:r>
-              <a:rPr lang="en-US" dirty="0"/>
-              <a:t>Link Setup - TDLS , WIFI Direct</a:t>
-            </a:r>
-            <a:r>
-              <a:rPr lang="he-IL" dirty="0" smtClean="0"/>
-              <a:t>)</a:t>
-            </a:r>
-          </a:p>
-          <a:p>
-            <a:pPr lvl="1" algn="r" rtl="1"/>
-            <a:r>
-              <a:rPr lang="he-IL" dirty="0"/>
-              <a:t>תקשורת לא ישירה המשתמשת בנקודת גישה (</a:t>
-            </a:r>
-            <a:r>
-              <a:rPr lang="en-US" dirty="0"/>
-              <a:t>Base Service Set - BSS</a:t>
-            </a:r>
-            <a:r>
-              <a:rPr lang="he-IL" dirty="0"/>
-              <a:t>)</a:t>
-            </a:r>
-            <a:endParaRPr lang="ru-RU" dirty="0"/>
+            <a:endParaRPr lang="he-IL" sz="1200" dirty="0" smtClean="0"/>
           </a:p>
           <a:p>
             <a:pPr algn="r" rtl="1"/>
             <a:endParaRPr lang="ru-RU" dirty="0"/>
           </a:p>
-          <a:p>
-            <a:pPr lvl="1" algn="r" rtl="1"/>
-            <a:endParaRPr lang="ru-RU" dirty="0" smtClean="0"/>
-          </a:p>
-          <a:p>
-            <a:pPr lvl="1" algn="r" rtl="1"/>
-            <a:endParaRPr lang="he-IL" dirty="0" smtClean="0"/>
-          </a:p>
-          <a:p>
-            <a:pPr algn="r" rtl="1"/>
-            <a:endParaRPr lang="he-IL" dirty="0" smtClean="0"/>
-          </a:p>
-          <a:p>
-            <a:pPr algn="r" rtl="1"/>
-            <a:endParaRPr lang="ru-RU" dirty="0"/>
-          </a:p>
-          <a:p>
-            <a:pPr algn="r" rtl="1"/>
-            <a:endParaRPr lang="ru-RU" dirty="0"/>
-          </a:p>
         </p:txBody>
       </p:sp>
       <p:sp>
@@ -7330,9 +7314,9 @@
       </p:sp>
       <p:pic>
         <p:nvPicPr>
-          <p:cNvPr id="2050" name="Picture 2" descr="C:\Users\ilia\Documents\My Dropbox\Project\Pictures\TDLS - Support WPA.JPG"/>
+          <p:cNvPr id="4" name="Рисунок 3"/>
           <p:cNvPicPr>
-            <a:picLocks noChangeAspect="1" noChangeArrowheads="1"/>
+            <a:picLocks noChangeAspect="1"/>
           </p:cNvPicPr>
           <p:nvPr/>
         </p:nvPicPr>
@@ -7344,29 +7328,60 @@
               </a:ext>
             </a:extLst>
           </a:blip>
-          <a:srcRect/>
           <a:stretch>
             <a:fillRect/>
           </a:stretch>
         </p:blipFill>
-        <p:spPr bwMode="auto">
+        <p:spPr>
           <a:xfrm>
-            <a:off x="755576" y="4449268"/>
-            <a:ext cx="3225305" cy="2150990"/>
+            <a:off x="323528" y="3793500"/>
+            <a:ext cx="3912728" cy="2609440"/>
           </a:xfrm>
           <a:prstGeom prst="rect">
             <a:avLst/>
           </a:prstGeom>
-          <a:noFill/>
-          <a:extLst>
-            <a:ext uri="{909E8E84-426E-40DD-AFC4-6F175D3DCCD1}">
-              <a14:hiddenFill xmlns:a14="http://schemas.microsoft.com/office/drawing/2010/main">
-                <a:solidFill>
-                  <a:srgbClr val="FFFFFF"/>
-                </a:solidFill>
-              </a14:hiddenFill>
-            </a:ext>
-          </a:extLst>
+          <a:ln>
+            <a:noFill/>
+          </a:ln>
+          <a:effectLst>
+            <a:softEdge rad="112500"/>
+          </a:effectLst>
+        </p:spPr>
+      </p:pic>
+      <p:pic>
+        <p:nvPicPr>
+          <p:cNvPr id="6" name="Рисунок 5"/>
+          <p:cNvPicPr>
+            <a:picLocks noChangeAspect="1"/>
+          </p:cNvPicPr>
+          <p:nvPr/>
+        </p:nvPicPr>
+        <p:blipFill>
+          <a:blip r:embed="rId4" cstate="print">
+            <a:extLst>
+              <a:ext uri="{28A0092B-C50C-407E-A947-70E740481C1C}">
+                <a14:useLocalDpi xmlns:a14="http://schemas.microsoft.com/office/drawing/2010/main" val="0"/>
+              </a:ext>
+            </a:extLst>
+          </a:blip>
+          <a:stretch>
+            <a:fillRect/>
+          </a:stretch>
+        </p:blipFill>
+        <p:spPr>
+          <a:xfrm>
+            <a:off x="4788024" y="3803661"/>
+            <a:ext cx="3897893" cy="2599546"/>
+          </a:xfrm>
+          <a:prstGeom prst="rect">
+            <a:avLst/>
+          </a:prstGeom>
+          <a:ln>
+            <a:noFill/>
+          </a:ln>
+          <a:effectLst>
+            <a:softEdge rad="112500"/>
+          </a:effectLst>
         </p:spPr>
       </p:pic>
     </p:spTree>
@@ -7379,10 +7394,429 @@
   <p:clrMapOvr>
     <a:masterClrMapping/>
   </p:clrMapOvr>
+  <mc:AlternateContent xmlns:mc="http://schemas.openxmlformats.org/markup-compatibility/2006">
+    <mc:Choice xmlns:p14="http://schemas.microsoft.com/office/powerpoint/2010/main" Requires="p14">
+      <p:transition spd="slow" p14:dur="2000"/>
+    </mc:Choice>
+    <mc:Fallback>
+      <p:transition spd="slow"/>
+    </mc:Fallback>
+  </mc:AlternateContent>
   <p:timing>
     <p:tnLst>
       <p:par>
-        <p:cTn id="1" dur="indefinite" restart="never" nodeType="tmRoot"/>
+        <p:cTn id="1" dur="indefinite" restart="never" nodeType="tmRoot">
+          <p:childTnLst>
+            <p:seq concurrent="1" nextAc="seek">
+              <p:cTn id="2" dur="indefinite" nodeType="mainSeq">
+                <p:childTnLst>
+                  <p:par>
+                    <p:cTn id="3" fill="hold">
+                      <p:stCondLst>
+                        <p:cond delay="indefinite"/>
+                      </p:stCondLst>
+                      <p:childTnLst>
+                        <p:par>
+                          <p:cTn id="4" fill="hold">
+                            <p:stCondLst>
+                              <p:cond delay="0"/>
+                            </p:stCondLst>
+                            <p:childTnLst>
+                              <p:par>
+                                <p:cTn id="5" presetID="2" presetClass="entr" presetSubtype="4" fill="hold" nodeType="clickEffect">
+                                  <p:stCondLst>
+                                    <p:cond delay="0"/>
+                                  </p:stCondLst>
+                                  <p:childTnLst>
+                                    <p:set>
+                                      <p:cBhvr>
+                                        <p:cTn id="6" dur="1" fill="hold">
+                                          <p:stCondLst>
+                                            <p:cond delay="0"/>
+                                          </p:stCondLst>
+                                        </p:cTn>
+                                        <p:tgtEl>
+                                          <p:spTgt spid="2">
+                                            <p:txEl>
+                                              <p:pRg st="2" end="2"/>
+                                            </p:txEl>
+                                          </p:spTgt>
+                                        </p:tgtEl>
+                                        <p:attrNameLst>
+                                          <p:attrName>style.visibility</p:attrName>
+                                        </p:attrNameLst>
+                                      </p:cBhvr>
+                                      <p:to>
+                                        <p:strVal val="visible"/>
+                                      </p:to>
+                                    </p:set>
+                                    <p:anim calcmode="lin" valueType="num">
+                                      <p:cBhvr additive="base">
+                                        <p:cTn id="7" dur="500" fill="hold"/>
+                                        <p:tgtEl>
+                                          <p:spTgt spid="2">
+                                            <p:txEl>
+                                              <p:pRg st="2" end="2"/>
+                                            </p:txEl>
+                                          </p:spTgt>
+                                        </p:tgtEl>
+                                        <p:attrNameLst>
+                                          <p:attrName>ppt_x</p:attrName>
+                                        </p:attrNameLst>
+                                      </p:cBhvr>
+                                      <p:tavLst>
+                                        <p:tav tm="0">
+                                          <p:val>
+                                            <p:strVal val="#ppt_x"/>
+                                          </p:val>
+                                        </p:tav>
+                                        <p:tav tm="100000">
+                                          <p:val>
+                                            <p:strVal val="#ppt_x"/>
+                                          </p:val>
+                                        </p:tav>
+                                      </p:tavLst>
+                                    </p:anim>
+                                    <p:anim calcmode="lin" valueType="num">
+                                      <p:cBhvr additive="base">
+                                        <p:cTn id="8" dur="500" fill="hold"/>
+                                        <p:tgtEl>
+                                          <p:spTgt spid="2">
+                                            <p:txEl>
+                                              <p:pRg st="2" end="2"/>
+                                            </p:txEl>
+                                          </p:spTgt>
+                                        </p:tgtEl>
+                                        <p:attrNameLst>
+                                          <p:attrName>ppt_y</p:attrName>
+                                        </p:attrNameLst>
+                                      </p:cBhvr>
+                                      <p:tavLst>
+                                        <p:tav tm="0">
+                                          <p:val>
+                                            <p:strVal val="1+#ppt_h/2"/>
+                                          </p:val>
+                                        </p:tav>
+                                        <p:tav tm="100000">
+                                          <p:val>
+                                            <p:strVal val="#ppt_y"/>
+                                          </p:val>
+                                        </p:tav>
+                                      </p:tavLst>
+                                    </p:anim>
+                                  </p:childTnLst>
+                                </p:cTn>
+                              </p:par>
+                            </p:childTnLst>
+                          </p:cTn>
+                        </p:par>
+                      </p:childTnLst>
+                    </p:cTn>
+                  </p:par>
+                  <p:par>
+                    <p:cTn id="9" fill="hold">
+                      <p:stCondLst>
+                        <p:cond delay="indefinite"/>
+                      </p:stCondLst>
+                      <p:childTnLst>
+                        <p:par>
+                          <p:cTn id="10" fill="hold">
+                            <p:stCondLst>
+                              <p:cond delay="0"/>
+                            </p:stCondLst>
+                            <p:childTnLst>
+                              <p:par>
+                                <p:cTn id="11" presetID="2" presetClass="entr" presetSubtype="4" fill="hold" nodeType="clickEffect">
+                                  <p:stCondLst>
+                                    <p:cond delay="0"/>
+                                  </p:stCondLst>
+                                  <p:childTnLst>
+                                    <p:set>
+                                      <p:cBhvr>
+                                        <p:cTn id="12" dur="1" fill="hold">
+                                          <p:stCondLst>
+                                            <p:cond delay="0"/>
+                                          </p:stCondLst>
+                                        </p:cTn>
+                                        <p:tgtEl>
+                                          <p:spTgt spid="6"/>
+                                        </p:tgtEl>
+                                        <p:attrNameLst>
+                                          <p:attrName>style.visibility</p:attrName>
+                                        </p:attrNameLst>
+                                      </p:cBhvr>
+                                      <p:to>
+                                        <p:strVal val="visible"/>
+                                      </p:to>
+                                    </p:set>
+                                    <p:anim calcmode="lin" valueType="num">
+                                      <p:cBhvr additive="base">
+                                        <p:cTn id="13" dur="500" fill="hold"/>
+                                        <p:tgtEl>
+                                          <p:spTgt spid="6"/>
+                                        </p:tgtEl>
+                                        <p:attrNameLst>
+                                          <p:attrName>ppt_x</p:attrName>
+                                        </p:attrNameLst>
+                                      </p:cBhvr>
+                                      <p:tavLst>
+                                        <p:tav tm="0">
+                                          <p:val>
+                                            <p:strVal val="#ppt_x"/>
+                                          </p:val>
+                                        </p:tav>
+                                        <p:tav tm="100000">
+                                          <p:val>
+                                            <p:strVal val="#ppt_x"/>
+                                          </p:val>
+                                        </p:tav>
+                                      </p:tavLst>
+                                    </p:anim>
+                                    <p:anim calcmode="lin" valueType="num">
+                                      <p:cBhvr additive="base">
+                                        <p:cTn id="14" dur="500" fill="hold"/>
+                                        <p:tgtEl>
+                                          <p:spTgt spid="6"/>
+                                        </p:tgtEl>
+                                        <p:attrNameLst>
+                                          <p:attrName>ppt_y</p:attrName>
+                                        </p:attrNameLst>
+                                      </p:cBhvr>
+                                      <p:tavLst>
+                                        <p:tav tm="0">
+                                          <p:val>
+                                            <p:strVal val="1+#ppt_h/2"/>
+                                          </p:val>
+                                        </p:tav>
+                                        <p:tav tm="100000">
+                                          <p:val>
+                                            <p:strVal val="#ppt_y"/>
+                                          </p:val>
+                                        </p:tav>
+                                      </p:tavLst>
+                                    </p:anim>
+                                  </p:childTnLst>
+                                </p:cTn>
+                              </p:par>
+                            </p:childTnLst>
+                          </p:cTn>
+                        </p:par>
+                      </p:childTnLst>
+                    </p:cTn>
+                  </p:par>
+                  <p:par>
+                    <p:cTn id="15" fill="hold">
+                      <p:stCondLst>
+                        <p:cond delay="indefinite"/>
+                      </p:stCondLst>
+                      <p:childTnLst>
+                        <p:par>
+                          <p:cTn id="16" fill="hold">
+                            <p:stCondLst>
+                              <p:cond delay="0"/>
+                            </p:stCondLst>
+                            <p:childTnLst>
+                              <p:par>
+                                <p:cTn id="17" presetID="2" presetClass="entr" presetSubtype="4" fill="hold" nodeType="clickEffect">
+                                  <p:stCondLst>
+                                    <p:cond delay="0"/>
+                                  </p:stCondLst>
+                                  <p:childTnLst>
+                                    <p:set>
+                                      <p:cBhvr>
+                                        <p:cTn id="18" dur="1" fill="hold">
+                                          <p:stCondLst>
+                                            <p:cond delay="0"/>
+                                          </p:stCondLst>
+                                        </p:cTn>
+                                        <p:tgtEl>
+                                          <p:spTgt spid="2">
+                                            <p:txEl>
+                                              <p:pRg st="3" end="3"/>
+                                            </p:txEl>
+                                          </p:spTgt>
+                                        </p:tgtEl>
+                                        <p:attrNameLst>
+                                          <p:attrName>style.visibility</p:attrName>
+                                        </p:attrNameLst>
+                                      </p:cBhvr>
+                                      <p:to>
+                                        <p:strVal val="visible"/>
+                                      </p:to>
+                                    </p:set>
+                                    <p:anim calcmode="lin" valueType="num">
+                                      <p:cBhvr additive="base">
+                                        <p:cTn id="19" dur="500" fill="hold"/>
+                                        <p:tgtEl>
+                                          <p:spTgt spid="2">
+                                            <p:txEl>
+                                              <p:pRg st="3" end="3"/>
+                                            </p:txEl>
+                                          </p:spTgt>
+                                        </p:tgtEl>
+                                        <p:attrNameLst>
+                                          <p:attrName>ppt_x</p:attrName>
+                                        </p:attrNameLst>
+                                      </p:cBhvr>
+                                      <p:tavLst>
+                                        <p:tav tm="0">
+                                          <p:val>
+                                            <p:strVal val="#ppt_x"/>
+                                          </p:val>
+                                        </p:tav>
+                                        <p:tav tm="100000">
+                                          <p:val>
+                                            <p:strVal val="#ppt_x"/>
+                                          </p:val>
+                                        </p:tav>
+                                      </p:tavLst>
+                                    </p:anim>
+                                    <p:anim calcmode="lin" valueType="num">
+                                      <p:cBhvr additive="base">
+                                        <p:cTn id="20" dur="500" fill="hold"/>
+                                        <p:tgtEl>
+                                          <p:spTgt spid="2">
+                                            <p:txEl>
+                                              <p:pRg st="3" end="3"/>
+                                            </p:txEl>
+                                          </p:spTgt>
+                                        </p:tgtEl>
+                                        <p:attrNameLst>
+                                          <p:attrName>ppt_y</p:attrName>
+                                        </p:attrNameLst>
+                                      </p:cBhvr>
+                                      <p:tavLst>
+                                        <p:tav tm="0">
+                                          <p:val>
+                                            <p:strVal val="1+#ppt_h/2"/>
+                                          </p:val>
+                                        </p:tav>
+                                        <p:tav tm="100000">
+                                          <p:val>
+                                            <p:strVal val="#ppt_y"/>
+                                          </p:val>
+                                        </p:tav>
+                                      </p:tavLst>
+                                    </p:anim>
+                                  </p:childTnLst>
+                                </p:cTn>
+                              </p:par>
+                            </p:childTnLst>
+                          </p:cTn>
+                        </p:par>
+                      </p:childTnLst>
+                    </p:cTn>
+                  </p:par>
+                  <p:par>
+                    <p:cTn id="21" fill="hold">
+                      <p:stCondLst>
+                        <p:cond delay="indefinite"/>
+                      </p:stCondLst>
+                      <p:childTnLst>
+                        <p:par>
+                          <p:cTn id="22" fill="hold">
+                            <p:stCondLst>
+                              <p:cond delay="0"/>
+                            </p:stCondLst>
+                            <p:childTnLst>
+                              <p:par>
+                                <p:cTn id="23" presetID="2" presetClass="entr" presetSubtype="4" fill="hold" nodeType="clickEffect">
+                                  <p:stCondLst>
+                                    <p:cond delay="0"/>
+                                  </p:stCondLst>
+                                  <p:childTnLst>
+                                    <p:set>
+                                      <p:cBhvr>
+                                        <p:cTn id="24" dur="1" fill="hold">
+                                          <p:stCondLst>
+                                            <p:cond delay="0"/>
+                                          </p:stCondLst>
+                                        </p:cTn>
+                                        <p:tgtEl>
+                                          <p:spTgt spid="4"/>
+                                        </p:tgtEl>
+                                        <p:attrNameLst>
+                                          <p:attrName>style.visibility</p:attrName>
+                                        </p:attrNameLst>
+                                      </p:cBhvr>
+                                      <p:to>
+                                        <p:strVal val="visible"/>
+                                      </p:to>
+                                    </p:set>
+                                    <p:anim calcmode="lin" valueType="num">
+                                      <p:cBhvr additive="base">
+                                        <p:cTn id="25" dur="500" fill="hold"/>
+                                        <p:tgtEl>
+                                          <p:spTgt spid="4"/>
+                                        </p:tgtEl>
+                                        <p:attrNameLst>
+                                          <p:attrName>ppt_x</p:attrName>
+                                        </p:attrNameLst>
+                                      </p:cBhvr>
+                                      <p:tavLst>
+                                        <p:tav tm="0">
+                                          <p:val>
+                                            <p:strVal val="#ppt_x"/>
+                                          </p:val>
+                                        </p:tav>
+                                        <p:tav tm="100000">
+                                          <p:val>
+                                            <p:strVal val="#ppt_x"/>
+                                          </p:val>
+                                        </p:tav>
+                                      </p:tavLst>
+                                    </p:anim>
+                                    <p:anim calcmode="lin" valueType="num">
+                                      <p:cBhvr additive="base">
+                                        <p:cTn id="26" dur="500" fill="hold"/>
+                                        <p:tgtEl>
+                                          <p:spTgt spid="4"/>
+                                        </p:tgtEl>
+                                        <p:attrNameLst>
+                                          <p:attrName>ppt_y</p:attrName>
+                                        </p:attrNameLst>
+                                      </p:cBhvr>
+                                      <p:tavLst>
+                                        <p:tav tm="0">
+                                          <p:val>
+                                            <p:strVal val="1+#ppt_h/2"/>
+                                          </p:val>
+                                        </p:tav>
+                                        <p:tav tm="100000">
+                                          <p:val>
+                                            <p:strVal val="#ppt_y"/>
+                                          </p:val>
+                                        </p:tav>
+                                      </p:tavLst>
+                                    </p:anim>
+                                  </p:childTnLst>
+                                </p:cTn>
+                              </p:par>
+                            </p:childTnLst>
+                          </p:cTn>
+                        </p:par>
+                      </p:childTnLst>
+                    </p:cTn>
+                  </p:par>
+                </p:childTnLst>
+              </p:cTn>
+              <p:prevCondLst>
+                <p:cond evt="onPrev" delay="0">
+                  <p:tgtEl>
+                    <p:sldTgt/>
+                  </p:tgtEl>
+                </p:cond>
+              </p:prevCondLst>
+              <p:nextCondLst>
+                <p:cond evt="onNext" delay="0">
+                  <p:tgtEl>
+                    <p:sldTgt/>
+                  </p:tgtEl>
+                </p:cond>
+              </p:nextCondLst>
+            </p:seq>
+          </p:childTnLst>
+        </p:cTn>
       </p:par>
     </p:tnLst>
   </p:timing>
@@ -7416,7 +7850,12 @@
             <p:ph idx="1"/>
           </p:nvPr>
         </p:nvSpPr>
-        <p:spPr/>
+        <p:spPr>
+          <a:xfrm>
+            <a:off x="658343" y="2060848"/>
+            <a:ext cx="7745505" cy="3877815"/>
+          </a:xfrm>
+        </p:spPr>
         <p:txBody>
           <a:bodyPr>
             <a:normAutofit/>
@@ -7477,6 +7916,42 @@
           </a:p>
         </p:txBody>
       </p:sp>
+      <p:pic>
+        <p:nvPicPr>
+          <p:cNvPr id="4" name="Рисунок 3"/>
+          <p:cNvPicPr>
+            <a:picLocks noChangeAspect="1"/>
+          </p:cNvPicPr>
+          <p:nvPr/>
+        </p:nvPicPr>
+        <p:blipFill>
+          <a:blip r:embed="rId3">
+            <a:extLst>
+              <a:ext uri="{28A0092B-C50C-407E-A947-70E740481C1C}">
+                <a14:useLocalDpi xmlns:a14="http://schemas.microsoft.com/office/drawing/2010/main" val="0"/>
+              </a:ext>
+            </a:extLst>
+          </a:blip>
+          <a:stretch>
+            <a:fillRect/>
+          </a:stretch>
+        </p:blipFill>
+        <p:spPr>
+          <a:xfrm>
+            <a:off x="1403648" y="2420887"/>
+            <a:ext cx="5976664" cy="4320481"/>
+          </a:xfrm>
+          <a:prstGeom prst="rect">
+            <a:avLst/>
+          </a:prstGeom>
+          <a:ln>
+            <a:noFill/>
+          </a:ln>
+          <a:effectLst>
+            <a:softEdge rad="112500"/>
+          </a:effectLst>
+        </p:spPr>
+      </p:pic>
     </p:spTree>
     <p:extLst>
       <p:ext uri="{BB962C8B-B14F-4D97-AF65-F5344CB8AC3E}">
@@ -7490,7 +7965,121 @@
   <p:timing>
     <p:tnLst>
       <p:par>
-        <p:cTn id="1" dur="indefinite" restart="never" nodeType="tmRoot"/>
+        <p:cTn id="1" dur="indefinite" restart="never" nodeType="tmRoot">
+          <p:childTnLst>
+            <p:seq concurrent="1" nextAc="seek">
+              <p:cTn id="2" dur="indefinite" nodeType="mainSeq">
+                <p:childTnLst>
+                  <p:par>
+                    <p:cTn id="3" fill="hold">
+                      <p:stCondLst>
+                        <p:cond delay="indefinite"/>
+                      </p:stCondLst>
+                      <p:childTnLst>
+                        <p:par>
+                          <p:cTn id="4" fill="hold">
+                            <p:stCondLst>
+                              <p:cond delay="0"/>
+                            </p:stCondLst>
+                            <p:childTnLst>
+                              <p:par>
+                                <p:cTn id="5" presetID="2" presetClass="entr" presetSubtype="4" fill="hold" nodeType="clickEffect">
+                                  <p:stCondLst>
+                                    <p:cond delay="0"/>
+                                  </p:stCondLst>
+                                  <p:childTnLst>
+                                    <p:set>
+                                      <p:cBhvr>
+                                        <p:cTn id="6" dur="1" fill="hold">
+                                          <p:stCondLst>
+                                            <p:cond delay="0"/>
+                                          </p:stCondLst>
+                                        </p:cTn>
+                                        <p:tgtEl>
+                                          <p:spTgt spid="4"/>
+                                        </p:tgtEl>
+                                        <p:attrNameLst>
+                                          <p:attrName>style.visibility</p:attrName>
+                                        </p:attrNameLst>
+                                      </p:cBhvr>
+                                      <p:to>
+                                        <p:strVal val="visible"/>
+                                      </p:to>
+                                    </p:set>
+                                    <p:anim calcmode="lin" valueType="num">
+                                      <p:cBhvr additive="base">
+                                        <p:cTn id="7" dur="500" fill="hold"/>
+                                        <p:tgtEl>
+                                          <p:spTgt spid="4"/>
+                                        </p:tgtEl>
+                                        <p:attrNameLst>
+                                          <p:attrName>ppt_x</p:attrName>
+                                        </p:attrNameLst>
+                                      </p:cBhvr>
+                                      <p:tavLst>
+                                        <p:tav tm="0">
+                                          <p:val>
+                                            <p:strVal val="#ppt_x"/>
+                                          </p:val>
+                                        </p:tav>
+                                        <p:tav tm="100000">
+                                          <p:val>
+                                            <p:strVal val="#ppt_x"/>
+                                          </p:val>
+                                        </p:tav>
+                                      </p:tavLst>
+                                    </p:anim>
+                                    <p:anim calcmode="lin" valueType="num">
+                                      <p:cBhvr additive="base">
+                                        <p:cTn id="8" dur="500" fill="hold"/>
+                                        <p:tgtEl>
+                                          <p:spTgt spid="4"/>
+                                        </p:tgtEl>
+                                        <p:attrNameLst>
+                                          <p:attrName>ppt_y</p:attrName>
+                                        </p:attrNameLst>
+                                      </p:cBhvr>
+                                      <p:tavLst>
+                                        <p:tav tm="0">
+                                          <p:val>
+                                            <p:strVal val="1+#ppt_h/2"/>
+                                          </p:val>
+                                        </p:tav>
+                                        <p:tav tm="100000">
+                                          <p:val>
+                                            <p:strVal val="#ppt_y"/>
+                                          </p:val>
+                                        </p:tav>
+                                      </p:tavLst>
+                                    </p:anim>
+                                  </p:childTnLst>
+                                </p:cTn>
+                              </p:par>
+                            </p:childTnLst>
+                          </p:cTn>
+                        </p:par>
+                      </p:childTnLst>
+                    </p:cTn>
+                  </p:par>
+                </p:childTnLst>
+              </p:cTn>
+              <p:prevCondLst>
+                <p:cond evt="onPrev" delay="0">
+                  <p:tgtEl>
+                    <p:sldTgt/>
+                  </p:tgtEl>
+                </p:cond>
+              </p:prevCondLst>
+              <p:nextCondLst>
+                <p:cond evt="onNext" delay="0">
+                  <p:tgtEl>
+                    <p:sldTgt/>
+                  </p:tgtEl>
+                </p:cond>
+              </p:nextCondLst>
+            </p:seq>
+          </p:childTnLst>
+        </p:cTn>
       </p:par>
     </p:tnLst>
   </p:timing>
@@ -7820,11 +8409,7 @@
             </a:pPr>
             <a:r>
               <a:rPr lang="he-IL" sz="2400" dirty="0" smtClean="0"/>
-              <a:t> </a:t>
-            </a:r>
-            <a:r>
-              <a:rPr lang="he-IL" sz="2400" dirty="0" smtClean="0"/>
-              <a:t>ואפיון </a:t>
+              <a:t> ואפיון </a:t>
             </a:r>
             <a:r>
               <a:rPr lang="he-IL" sz="2400" dirty="0"/>

</xml_diff>

<commit_message>
Pictures for maceget and maceget with new Pictures
Signed-off-by: Andrey Shamis <lolnik@gmail.com>
</commit_message>
<xml_diff>
--- a/מצגת.pptx
+++ b/מצגת.pptx
@@ -1100,6 +1100,162 @@
 </file>
 
 <file path=ppt/notesSlides/notesSlide4.xml><?xml version="1.0" encoding="utf-8"?>
+<p:notes xmlns:a="http://schemas.openxmlformats.org/drawingml/2006/main" xmlns:r="http://schemas.openxmlformats.org/officeDocument/2006/relationships" xmlns:p="http://schemas.openxmlformats.org/presentationml/2006/main">
+  <p:cSld>
+    <p:spTree>
+      <p:nvGrpSpPr>
+        <p:cNvPr id="1" name=""/>
+        <p:cNvGrpSpPr/>
+        <p:nvPr/>
+      </p:nvGrpSpPr>
+      <p:grpSpPr>
+        <a:xfrm>
+          <a:off x="0" y="0"/>
+          <a:ext cx="0" cy="0"/>
+          <a:chOff x="0" y="0"/>
+          <a:chExt cx="0" cy="0"/>
+        </a:xfrm>
+      </p:grpSpPr>
+      <p:sp>
+        <p:nvSpPr>
+          <p:cNvPr id="2" name="Образ слайда 1"/>
+          <p:cNvSpPr>
+            <a:spLocks noGrp="1" noRot="1" noChangeAspect="1"/>
+          </p:cNvSpPr>
+          <p:nvPr>
+            <p:ph type="sldImg"/>
+          </p:nvPr>
+        </p:nvSpPr>
+        <p:spPr/>
+      </p:sp>
+      <p:sp>
+        <p:nvSpPr>
+          <p:cNvPr id="3" name="Заметки 2"/>
+          <p:cNvSpPr>
+            <a:spLocks noGrp="1"/>
+          </p:cNvSpPr>
+          <p:nvPr>
+            <p:ph type="body" idx="1"/>
+          </p:nvPr>
+        </p:nvSpPr>
+        <p:spPr/>
+        <p:txBody>
+          <a:bodyPr/>
+          <a:lstStyle/>
+          <a:p>
+            <a:pPr marL="0" marR="0" lvl="0" indent="0" algn="r" defTabSz="914400" rtl="1" eaLnBrk="1" fontAlgn="auto" latinLnBrk="0" hangingPunct="1">
+              <a:lnSpc>
+                <a:spcPct val="100000"/>
+              </a:lnSpc>
+              <a:spcBef>
+                <a:spcPts val="0"/>
+              </a:spcBef>
+              <a:spcAft>
+                <a:spcPts val="0"/>
+              </a:spcAft>
+              <a:buClrTx/>
+              <a:buSzTx/>
+              <a:buFontTx/>
+              <a:buNone/>
+              <a:tabLst/>
+              <a:defRPr/>
+            </a:pPr>
+            <a:r>
+              <a:rPr lang="he-IL" sz="1200" dirty="0" smtClean="0"/>
+              <a:t>יצירת סימולטור שיהיה מסוגל לדמות העברת נתונים בין שתי תחנות </a:t>
+            </a:r>
+            <a:r>
+              <a:rPr lang="en-US" sz="1200" dirty="0" smtClean="0"/>
+              <a:t>WIFI</a:t>
+            </a:r>
+            <a:r>
+              <a:rPr lang="he-IL" sz="1200" dirty="0" smtClean="0"/>
+              <a:t> בצורה ישירה או דרך נקודת גישה.</a:t>
+            </a:r>
+          </a:p>
+          <a:p>
+            <a:pPr lvl="0" algn="r" rtl="1"/>
+            <a:endParaRPr lang="he-IL" sz="1200" dirty="0" smtClean="0"/>
+          </a:p>
+          <a:p>
+            <a:pPr lvl="0" algn="r" rtl="1"/>
+            <a:r>
+              <a:rPr lang="he-IL" sz="1200" dirty="0" smtClean="0"/>
+              <a:t>הסימולטור יהיה מסוגל לעבד נתוני הסביבה של </a:t>
+            </a:r>
+            <a:r>
+              <a:rPr lang="en-US" sz="1200" dirty="0" smtClean="0"/>
+              <a:t>WIFI</a:t>
+            </a:r>
+            <a:r>
+              <a:rPr lang="he-IL" sz="1200" dirty="0" smtClean="0"/>
+              <a:t> (</a:t>
+            </a:r>
+            <a:r>
+              <a:rPr lang="en-US" sz="1200" dirty="0" smtClean="0"/>
+              <a:t>RSSI </a:t>
+            </a:r>
+            <a:r>
+              <a:rPr lang="he-IL" sz="1200" dirty="0" smtClean="0"/>
+              <a:t>,</a:t>
+            </a:r>
+            <a:r>
+              <a:rPr lang="en-US" sz="1200" dirty="0" smtClean="0"/>
+              <a:t>rate scaling</a:t>
+            </a:r>
+            <a:r>
+              <a:rPr lang="he-IL" sz="1200" dirty="0" smtClean="0"/>
+              <a:t>, </a:t>
+            </a:r>
+            <a:r>
+              <a:rPr lang="en-US" sz="1200" dirty="0" smtClean="0"/>
+              <a:t>CRC </a:t>
+            </a:r>
+            <a:r>
+              <a:rPr lang="he-IL" sz="1200" dirty="0" smtClean="0"/>
+              <a:t>,ערוצי תווך זמינים, וכו').</a:t>
+            </a:r>
+            <a:endParaRPr lang="he-IL" sz="1200" dirty="0" smtClean="0"/>
+          </a:p>
+        </p:txBody>
+      </p:sp>
+      <p:sp>
+        <p:nvSpPr>
+          <p:cNvPr id="4" name="Номер слайда 3"/>
+          <p:cNvSpPr>
+            <a:spLocks noGrp="1"/>
+          </p:cNvSpPr>
+          <p:nvPr>
+            <p:ph type="sldNum" sz="quarter" idx="10"/>
+          </p:nvPr>
+        </p:nvSpPr>
+        <p:spPr/>
+        <p:txBody>
+          <a:bodyPr/>
+          <a:lstStyle/>
+          <a:p>
+            <a:fld id="{7A6A5AAE-82E3-4B26-81AD-E86F1575EFF2}" type="slidenum">
+              <a:rPr lang="he-IL" smtClean="0"/>
+              <a:t>8</a:t>
+            </a:fld>
+            <a:endParaRPr lang="he-IL"/>
+          </a:p>
+        </p:txBody>
+      </p:sp>
+    </p:spTree>
+    <p:extLst>
+      <p:ext uri="{BB962C8B-B14F-4D97-AF65-F5344CB8AC3E}">
+        <p14:creationId xmlns:p14="http://schemas.microsoft.com/office/powerpoint/2010/main" val="1846658976"/>
+      </p:ext>
+    </p:extLst>
+  </p:cSld>
+  <p:clrMapOvr>
+    <a:masterClrMapping/>
+  </p:clrMapOvr>
+</p:notes>
+</file>
+
+<file path=ppt/notesSlides/notesSlide5.xml><?xml version="1.0" encoding="utf-8"?>
 <p:notes xmlns:a="http://schemas.openxmlformats.org/drawingml/2006/main" xmlns:r="http://schemas.openxmlformats.org/officeDocument/2006/relationships" xmlns:p="http://schemas.openxmlformats.org/presentationml/2006/main">
   <p:cSld>
     <p:spTree>
@@ -6240,6 +6396,72 @@
           </a:p>
         </p:txBody>
       </p:sp>
+      <p:pic>
+        <p:nvPicPr>
+          <p:cNvPr id="4" name="Рисунок 3"/>
+          <p:cNvPicPr>
+            <a:picLocks noChangeAspect="1"/>
+          </p:cNvPicPr>
+          <p:nvPr/>
+        </p:nvPicPr>
+        <p:blipFill>
+          <a:blip r:embed="rId2" cstate="print">
+            <a:extLst>
+              <a:ext uri="{28A0092B-C50C-407E-A947-70E740481C1C}">
+                <a14:useLocalDpi xmlns:a14="http://schemas.microsoft.com/office/drawing/2010/main" val="0"/>
+              </a:ext>
+            </a:extLst>
+          </a:blip>
+          <a:stretch>
+            <a:fillRect/>
+          </a:stretch>
+        </p:blipFill>
+        <p:spPr>
+          <a:xfrm>
+            <a:off x="1090646" y="2060848"/>
+            <a:ext cx="2069283" cy="864096"/>
+          </a:xfrm>
+          <a:prstGeom prst="rect">
+            <a:avLst/>
+          </a:prstGeom>
+        </p:spPr>
+      </p:pic>
+      <p:pic>
+        <p:nvPicPr>
+          <p:cNvPr id="5" name="Рисунок 4"/>
+          <p:cNvPicPr>
+            <a:picLocks noChangeAspect="1"/>
+          </p:cNvPicPr>
+          <p:nvPr/>
+        </p:nvPicPr>
+        <p:blipFill>
+          <a:blip r:embed="rId3">
+            <a:extLst>
+              <a:ext uri="{28A0092B-C50C-407E-A947-70E740481C1C}">
+                <a14:useLocalDpi xmlns:a14="http://schemas.microsoft.com/office/drawing/2010/main" val="0"/>
+              </a:ext>
+            </a:extLst>
+          </a:blip>
+          <a:stretch>
+            <a:fillRect/>
+          </a:stretch>
+        </p:blipFill>
+        <p:spPr>
+          <a:xfrm>
+            <a:off x="3635896" y="4784654"/>
+            <a:ext cx="1697246" cy="1862182"/>
+          </a:xfrm>
+          <a:prstGeom prst="rect">
+            <a:avLst/>
+          </a:prstGeom>
+          <a:ln>
+            <a:noFill/>
+          </a:ln>
+          <a:effectLst>
+            <a:softEdge rad="112500"/>
+          </a:effectLst>
+        </p:spPr>
+      </p:pic>
     </p:spTree>
     <p:extLst>
       <p:ext uri="{BB962C8B-B14F-4D97-AF65-F5344CB8AC3E}">
@@ -8619,9 +8841,16 @@
             <p:ph idx="1"/>
           </p:nvPr>
         </p:nvSpPr>
-        <p:spPr/>
-        <p:txBody>
-          <a:bodyPr/>
+        <p:spPr>
+          <a:xfrm>
+            <a:off x="699247" y="2248347"/>
+            <a:ext cx="7745505" cy="4349005"/>
+          </a:xfrm>
+        </p:spPr>
+        <p:txBody>
+          <a:bodyPr>
+            <a:normAutofit lnSpcReduction="10000"/>
+          </a:bodyPr>
           <a:lstStyle/>
           <a:p>
             <a:pPr algn="r" rtl="1"/>
@@ -8631,11 +8860,41 @@
             </a:r>
           </a:p>
           <a:p>
-            <a:pPr lvl="1" algn="r" rtl="1"/>
+            <a:pPr marL="411480" lvl="1" indent="0" algn="r" rtl="1">
+              <a:buNone/>
+            </a:pPr>
+            <a:r>
+              <a:rPr lang="he-IL" dirty="0" smtClean="0"/>
+              <a:t>		אי </a:t>
+            </a:r>
             <a:r>
               <a:rPr lang="he-IL" dirty="0"/>
-              <a:t>אי ידיע מתי עדיף להשתמש בפרוטוקול זה</a:t>
-            </a:r>
+              <a:t>ידיע מתי עדיף להשתמש בפרוטוקול זה</a:t>
+            </a:r>
+          </a:p>
+          <a:p>
+            <a:pPr marL="0" indent="0" algn="r" rtl="1">
+              <a:buNone/>
+            </a:pPr>
+            <a:endParaRPr lang="he-IL" dirty="0" smtClean="0"/>
+          </a:p>
+          <a:p>
+            <a:pPr marL="0" indent="0" algn="r" rtl="1">
+              <a:buNone/>
+            </a:pPr>
+            <a:endParaRPr lang="he-IL" dirty="0"/>
+          </a:p>
+          <a:p>
+            <a:pPr marL="0" indent="0" algn="r" rtl="1">
+              <a:buNone/>
+            </a:pPr>
+            <a:endParaRPr lang="he-IL" dirty="0" smtClean="0"/>
+          </a:p>
+          <a:p>
+            <a:pPr marL="0" indent="0" algn="r" rtl="1">
+              <a:buNone/>
+            </a:pPr>
+            <a:endParaRPr lang="he-IL" dirty="0" smtClean="0"/>
           </a:p>
           <a:p>
             <a:pPr marL="0" indent="0" algn="r" rtl="1">
@@ -8644,23 +8903,40 @@
             <a:endParaRPr lang="en-US" dirty="0" smtClean="0"/>
           </a:p>
           <a:p>
-            <a:pPr algn="r" rtl="1"/>
-            <a:r>
-              <a:rPr lang="he-IL" dirty="0" smtClean="0"/>
-              <a:t>כיצד נתמודד עם מגבלות הנ"ל?</a:t>
-            </a:r>
-          </a:p>
-          <a:p>
             <a:pPr marL="0" indent="0" algn="r" rtl="1">
               <a:buNone/>
             </a:pPr>
+            <a:endParaRPr lang="he-IL" dirty="0" smtClean="0"/>
+          </a:p>
+          <a:p>
+            <a:pPr marL="0" indent="0" algn="r" rtl="1">
+              <a:buNone/>
+            </a:pPr>
+            <a:r>
+              <a:rPr lang="he-IL" dirty="0" smtClean="0"/>
+              <a:t>כיצד </a:t>
+            </a:r>
+            <a:r>
+              <a:rPr lang="he-IL" dirty="0" smtClean="0"/>
+              <a:t>נתמודד עם מגבלות הנ"ל</a:t>
+            </a:r>
+            <a:r>
+              <a:rPr lang="he-IL" dirty="0" smtClean="0"/>
+              <a:t>?</a:t>
+            </a:r>
             <a:endParaRPr lang="he-IL" dirty="0"/>
           </a:p>
           <a:p>
-            <a:pPr algn="r" rtl="1"/>
+            <a:pPr marL="0" indent="0" algn="ctr" rtl="1">
+              <a:buNone/>
+            </a:pPr>
             <a:r>
               <a:rPr lang="he-IL" dirty="0" smtClean="0"/>
-              <a:t>פתרון: </a:t>
+              <a:t>פתרון</a:t>
+            </a:r>
+            <a:r>
+              <a:rPr lang="he-IL" dirty="0" smtClean="0"/>
+              <a:t>: </a:t>
             </a:r>
             <a:r>
               <a:rPr lang="en-US" dirty="0" smtClean="0"/>
@@ -8692,6 +8968,42 @@
           </a:p>
         </p:txBody>
       </p:sp>
+      <p:pic>
+        <p:nvPicPr>
+          <p:cNvPr id="4" name="Рисунок 3"/>
+          <p:cNvPicPr>
+            <a:picLocks noChangeAspect="1"/>
+          </p:cNvPicPr>
+          <p:nvPr/>
+        </p:nvPicPr>
+        <p:blipFill>
+          <a:blip r:embed="rId3">
+            <a:extLst>
+              <a:ext uri="{28A0092B-C50C-407E-A947-70E740481C1C}">
+                <a14:useLocalDpi xmlns:a14="http://schemas.microsoft.com/office/drawing/2010/main" val="0"/>
+              </a:ext>
+            </a:extLst>
+          </a:blip>
+          <a:stretch>
+            <a:fillRect/>
+          </a:stretch>
+        </p:blipFill>
+        <p:spPr>
+          <a:xfrm>
+            <a:off x="3131840" y="3085808"/>
+            <a:ext cx="2952328" cy="1922798"/>
+          </a:xfrm>
+          <a:prstGeom prst="rect">
+            <a:avLst/>
+          </a:prstGeom>
+          <a:ln>
+            <a:noFill/>
+          </a:ln>
+          <a:effectLst>
+            <a:softEdge rad="112500"/>
+          </a:effectLst>
+        </p:spPr>
+      </p:pic>
     </p:spTree>
     <p:extLst>
       <p:ext uri="{BB962C8B-B14F-4D97-AF65-F5344CB8AC3E}">
@@ -8739,48 +9051,88 @@
             <p:ph idx="1"/>
           </p:nvPr>
         </p:nvSpPr>
-        <p:spPr/>
+        <p:spPr>
+          <a:xfrm>
+            <a:off x="251521" y="2248347"/>
+            <a:ext cx="8640960" cy="4421013"/>
+          </a:xfrm>
+        </p:spPr>
         <p:txBody>
           <a:bodyPr/>
           <a:lstStyle/>
           <a:p>
             <a:pPr lvl="1" algn="r" rtl="1"/>
-            <a:endParaRPr lang="he-IL" sz="2400" dirty="0" smtClean="0"/>
+            <a:r>
+              <a:rPr lang="he-IL" sz="2400" dirty="0" smtClean="0"/>
+              <a:t>בניית </a:t>
+            </a:r>
+            <a:r>
+              <a:rPr lang="he-IL" sz="2400" dirty="0"/>
+              <a:t>סימולטור לצורך פיתוח ובדיקת האלגוריתמים</a:t>
+            </a:r>
+            <a:r>
+              <a:rPr lang="he-IL" sz="2400" dirty="0" smtClean="0"/>
+              <a:t>.</a:t>
+            </a:r>
           </a:p>
           <a:p>
             <a:pPr lvl="1" algn="r" rtl="1"/>
-            <a:r>
-              <a:rPr lang="he-IL" sz="2400" dirty="0" smtClean="0"/>
-              <a:t>פיתוח </a:t>
-            </a:r>
-            <a:r>
-              <a:rPr lang="he-IL" sz="2400" dirty="0"/>
-              <a:t>מספר אלגוריתמים מבוססי יוריסטיקה לביצוע </a:t>
-            </a:r>
-            <a:r>
-              <a:rPr lang="en-US" sz="2400" dirty="0" smtClean="0"/>
-              <a:t>SLS</a:t>
-            </a:r>
-            <a:endParaRPr lang="he-IL" sz="2400" dirty="0" smtClean="0"/>
+            <a:endParaRPr lang="he-IL" sz="2400" dirty="0"/>
+          </a:p>
+          <a:p>
+            <a:pPr lvl="1" algn="r" rtl="1"/>
+            <a:endParaRPr lang="he-IL" sz="2000" dirty="0" smtClean="0"/>
+          </a:p>
+          <a:p>
+            <a:pPr lvl="1" algn="r" rtl="1"/>
+            <a:endParaRPr lang="ru-RU" sz="2000" dirty="0"/>
           </a:p>
           <a:p>
             <a:pPr marL="411480" lvl="1" indent="0" algn="r" rtl="1">
               <a:buNone/>
             </a:pPr>
+            <a:endParaRPr lang="he-IL" sz="2400" dirty="0" smtClean="0"/>
+          </a:p>
+          <a:p>
+            <a:pPr marL="411480" lvl="1" indent="0" algn="r" rtl="1">
+              <a:buNone/>
+            </a:pPr>
+            <a:endParaRPr lang="he-IL" sz="2400" dirty="0"/>
+          </a:p>
+          <a:p>
+            <a:pPr lvl="1" algn="r" rtl="1"/>
             <a:r>
               <a:rPr lang="he-IL" sz="2400" dirty="0" smtClean="0"/>
+              <a:t>פיתוח </a:t>
+            </a:r>
+            <a:r>
+              <a:rPr lang="he-IL" sz="2400" dirty="0"/>
+              <a:t>מספר אלגוריתמים מבוססי יוריסטיקה לביצוע </a:t>
+            </a:r>
+            <a:r>
+              <a:rPr lang="en-US" sz="2400" dirty="0" smtClean="0"/>
+              <a:t>SLS</a:t>
+            </a:r>
+            <a:endParaRPr lang="he-IL" sz="2400" dirty="0" smtClean="0"/>
+          </a:p>
+          <a:p>
+            <a:pPr marL="411480" lvl="1" indent="0" algn="r" rtl="1">
+              <a:buNone/>
+            </a:pPr>
+            <a:r>
+              <a:rPr lang="he-IL" sz="2000" dirty="0" smtClean="0"/>
               <a:t> </a:t>
             </a:r>
             <a:r>
-              <a:rPr lang="he-IL" sz="2400" dirty="0"/>
+              <a:rPr lang="he-IL" sz="2000" dirty="0"/>
               <a:t>(</a:t>
             </a:r>
             <a:r>
-              <a:rPr lang="en-US" sz="2400" dirty="0"/>
+              <a:rPr lang="en-US" sz="2000" dirty="0"/>
               <a:t>Smart Link Selection</a:t>
             </a:r>
             <a:r>
-              <a:rPr lang="he-IL" sz="2400" dirty="0" smtClean="0"/>
+              <a:rPr lang="he-IL" sz="2000" dirty="0" smtClean="0"/>
               <a:t>)</a:t>
             </a:r>
           </a:p>
@@ -8808,14 +9160,6 @@
             <a:endParaRPr lang="ru-RU" sz="2000" dirty="0"/>
           </a:p>
           <a:p>
-            <a:pPr lvl="1" algn="r" rtl="1"/>
-            <a:r>
-              <a:rPr lang="he-IL" sz="2400" dirty="0"/>
-              <a:t>בניית סימולטור לצורך פיתוח ובדיקת האלגוריתמים.</a:t>
-            </a:r>
-            <a:endParaRPr lang="ru-RU" sz="2000" dirty="0"/>
-          </a:p>
-          <a:p>
             <a:pPr algn="r" rtl="1"/>
             <a:endParaRPr lang="ru-RU" dirty="0"/>
           </a:p>
@@ -8844,6 +9188,42 @@
           </a:p>
         </p:txBody>
       </p:sp>
+      <p:pic>
+        <p:nvPicPr>
+          <p:cNvPr id="4" name="Рисунок 3"/>
+          <p:cNvPicPr>
+            <a:picLocks noChangeAspect="1"/>
+          </p:cNvPicPr>
+          <p:nvPr/>
+        </p:nvPicPr>
+        <p:blipFill>
+          <a:blip r:embed="rId2" cstate="print">
+            <a:extLst>
+              <a:ext uri="{28A0092B-C50C-407E-A947-70E740481C1C}">
+                <a14:useLocalDpi xmlns:a14="http://schemas.microsoft.com/office/drawing/2010/main" val="0"/>
+              </a:ext>
+            </a:extLst>
+          </a:blip>
+          <a:stretch>
+            <a:fillRect/>
+          </a:stretch>
+        </p:blipFill>
+        <p:spPr>
+          <a:xfrm>
+            <a:off x="3361620" y="2564904"/>
+            <a:ext cx="2187898" cy="1962974"/>
+          </a:xfrm>
+          <a:prstGeom prst="rect">
+            <a:avLst/>
+          </a:prstGeom>
+          <a:ln>
+            <a:noFill/>
+          </a:ln>
+          <a:effectLst>
+            <a:softEdge rad="112500"/>
+          </a:effectLst>
+        </p:spPr>
+      </p:pic>
     </p:spTree>
     <p:extLst>
       <p:ext uri="{BB962C8B-B14F-4D97-AF65-F5344CB8AC3E}">
@@ -8857,79 +9237,7 @@
   <p:timing>
     <p:tnLst>
       <p:par>
-        <p:cTn id="1" dur="indefinite" restart="never" nodeType="tmRoot">
-          <p:childTnLst>
-            <p:seq concurrent="1" nextAc="seek">
-              <p:cTn id="2" dur="indefinite" nodeType="mainSeq">
-                <p:childTnLst>
-                  <p:par>
-                    <p:cTn id="3" fill="hold">
-                      <p:stCondLst>
-                        <p:cond delay="indefinite"/>
-                      </p:stCondLst>
-                      <p:childTnLst>
-                        <p:par>
-                          <p:cTn id="4" fill="hold">
-                            <p:stCondLst>
-                              <p:cond delay="0"/>
-                            </p:stCondLst>
-                            <p:childTnLst>
-                              <p:par>
-                                <p:cTn id="5" presetID="1" presetClass="entr" presetSubtype="0" fill="hold" nodeType="clickEffect">
-                                  <p:stCondLst>
-                                    <p:cond delay="0"/>
-                                  </p:stCondLst>
-                                  <p:childTnLst>
-                                    <p:set>
-                                      <p:cBhvr>
-                                        <p:cTn id="6" dur="1" fill="hold">
-                                          <p:stCondLst>
-                                            <p:cond delay="0"/>
-                                          </p:stCondLst>
-                                        </p:cTn>
-                                        <p:tgtEl>
-                                          <p:spTgt spid="2">
-                                            <p:txEl>
-                                              <p:pRg st="5" end="5"/>
-                                            </p:txEl>
-                                          </p:spTgt>
-                                        </p:tgtEl>
-                                        <p:attrNameLst>
-                                          <p:attrName>style.visibility</p:attrName>
-                                        </p:attrNameLst>
-                                      </p:cBhvr>
-                                      <p:to>
-                                        <p:strVal val="visible"/>
-                                      </p:to>
-                                    </p:set>
-                                  </p:childTnLst>
-                                </p:cTn>
-                              </p:par>
-                            </p:childTnLst>
-                          </p:cTn>
-                        </p:par>
-                      </p:childTnLst>
-                    </p:cTn>
-                  </p:par>
-                </p:childTnLst>
-              </p:cTn>
-              <p:prevCondLst>
-                <p:cond evt="onPrev" delay="0">
-                  <p:tgtEl>
-                    <p:sldTgt/>
-                  </p:tgtEl>
-                </p:cond>
-              </p:prevCondLst>
-              <p:nextCondLst>
-                <p:cond evt="onNext" delay="0">
-                  <p:tgtEl>
-                    <p:sldTgt/>
-                  </p:tgtEl>
-                </p:cond>
-              </p:nextCondLst>
-            </p:seq>
-          </p:childTnLst>
-        </p:cTn>
+        <p:cTn id="1" dur="indefinite" restart="never" nodeType="tmRoot"/>
       </p:par>
     </p:tnLst>
   </p:timing>
@@ -8965,141 +9273,127 @@
         </p:nvSpPr>
         <p:spPr>
           <a:xfrm>
-            <a:off x="107504" y="2248347"/>
-            <a:ext cx="8784975" cy="3877815"/>
+            <a:off x="0" y="2248347"/>
+            <a:ext cx="9036496" cy="4276997"/>
           </a:xfrm>
         </p:spPr>
         <p:txBody>
           <a:bodyPr>
-            <a:normAutofit/>
+            <a:normAutofit lnSpcReduction="10000"/>
           </a:bodyPr>
           <a:lstStyle/>
           <a:p>
             <a:pPr lvl="0" algn="r" rtl="1"/>
             <a:r>
-              <a:rPr lang="he-IL" dirty="0"/>
-              <a:t>יצירת סימולטור שיהיה מסוגל לדמות העברת נתונים בין שתי תחנות </a:t>
-            </a:r>
-            <a:r>
-              <a:rPr lang="en-US" dirty="0"/>
+              <a:rPr lang="he-IL" sz="2000" dirty="0"/>
+              <a:t>יצירת </a:t>
+            </a:r>
+            <a:r>
+              <a:rPr lang="he-IL" sz="2000" dirty="0" smtClean="0"/>
+              <a:t>סימולטור</a:t>
+            </a:r>
+          </a:p>
+          <a:p>
+            <a:pPr lvl="0" algn="r" rtl="1"/>
+            <a:endParaRPr lang="ru-RU" sz="2000" dirty="0"/>
+          </a:p>
+          <a:p>
+            <a:pPr lvl="0" algn="r" rtl="1"/>
+            <a:r>
+              <a:rPr lang="he-IL" sz="2000" dirty="0"/>
+              <a:t>סימולטור ידמה פעולות </a:t>
+            </a:r>
+            <a:r>
+              <a:rPr lang="en-US" sz="2000" dirty="0"/>
               <a:t>WIFI</a:t>
             </a:r>
             <a:r>
-              <a:rPr lang="he-IL" dirty="0"/>
-              <a:t> בצורה ישירה או דרך נקודת גישה</a:t>
-            </a:r>
-            <a:r>
-              <a:rPr lang="he-IL" dirty="0" smtClean="0"/>
+              <a:rPr lang="he-IL" sz="2000" dirty="0"/>
+              <a:t> בשכבה הפיסית ובשכבת הקו (</a:t>
+            </a:r>
+            <a:r>
+              <a:rPr lang="en-US" sz="2000" dirty="0"/>
+              <a:t>data link</a:t>
+            </a:r>
+            <a:r>
+              <a:rPr lang="he-IL" sz="2000" dirty="0" smtClean="0"/>
+              <a:t>).</a:t>
+            </a:r>
+          </a:p>
+          <a:p>
+            <a:pPr lvl="0" algn="r" rtl="1"/>
+            <a:endParaRPr lang="ru-RU" sz="2000" dirty="0"/>
+          </a:p>
+          <a:p>
+            <a:pPr lvl="0" algn="r" rtl="1"/>
+            <a:r>
+              <a:rPr lang="he-IL" sz="2000" dirty="0"/>
+              <a:t>הסימולטור יהיה מסוגל לעבד נתוני הסביבה של </a:t>
+            </a:r>
+            <a:r>
+              <a:rPr lang="en-US" sz="2000" dirty="0" smtClean="0"/>
+              <a:t>WIFI</a:t>
+            </a:r>
+            <a:endParaRPr lang="he-IL" sz="2000" dirty="0" smtClean="0"/>
+          </a:p>
+          <a:p>
+            <a:pPr lvl="0" algn="r" rtl="1"/>
+            <a:endParaRPr lang="he-IL" sz="2000" dirty="0" smtClean="0"/>
+          </a:p>
+          <a:p>
+            <a:pPr algn="r" rtl="1"/>
+            <a:r>
+              <a:rPr lang="he-IL" sz="2000" dirty="0"/>
+              <a:t>פיתוח אלגוריתם יעיל לביצוע </a:t>
+            </a:r>
+            <a:r>
+              <a:rPr lang="en-US" sz="2000" dirty="0" smtClean="0"/>
+              <a:t>SLS</a:t>
+            </a:r>
+            <a:endParaRPr lang="he-IL" sz="2000" dirty="0" smtClean="0"/>
+          </a:p>
+          <a:p>
+            <a:pPr algn="r" rtl="1"/>
+            <a:endParaRPr lang="he-IL" sz="2000" dirty="0" smtClean="0"/>
+          </a:p>
+          <a:p>
+            <a:pPr algn="r" rtl="1"/>
+            <a:r>
+              <a:rPr lang="he-IL" sz="2000" dirty="0" smtClean="0"/>
+              <a:t>אימות </a:t>
+            </a:r>
+            <a:r>
+              <a:rPr lang="he-IL" sz="2000" dirty="0"/>
+              <a:t>האלגוריתם באמצעות הסימולטור</a:t>
+            </a:r>
+            <a:r>
+              <a:rPr lang="he-IL" sz="2000" dirty="0" smtClean="0"/>
               <a:t>.</a:t>
             </a:r>
-            <a:endParaRPr lang="ru-RU" dirty="0"/>
+          </a:p>
+          <a:p>
+            <a:pPr algn="r" rtl="1"/>
+            <a:endParaRPr lang="en-US" sz="2000" dirty="0"/>
           </a:p>
           <a:p>
             <a:pPr lvl="0" algn="r" rtl="1"/>
             <a:r>
-              <a:rPr lang="he-IL" dirty="0"/>
-              <a:t>סימולטור ידמה פעולות </a:t>
-            </a:r>
-            <a:r>
-              <a:rPr lang="en-US" dirty="0"/>
-              <a:t>WIFI</a:t>
-            </a:r>
-            <a:r>
-              <a:rPr lang="he-IL" dirty="0"/>
-              <a:t> בשכבה הפיסית ובשכבת הקו (</a:t>
-            </a:r>
-            <a:r>
-              <a:rPr lang="en-US" dirty="0"/>
-              <a:t>data link</a:t>
-            </a:r>
-            <a:r>
-              <a:rPr lang="he-IL" dirty="0" smtClean="0"/>
-              <a:t>).</a:t>
-            </a:r>
-            <a:endParaRPr lang="ru-RU" dirty="0"/>
-          </a:p>
-          <a:p>
-            <a:pPr lvl="0" algn="r" rtl="1"/>
-            <a:r>
-              <a:rPr lang="he-IL" dirty="0"/>
-              <a:t>הסימולטור יהיה מסוגל לעבד נתוני הסביבה של </a:t>
-            </a:r>
-            <a:r>
-              <a:rPr lang="en-US" dirty="0"/>
-              <a:t>WIFI</a:t>
-            </a:r>
-            <a:r>
-              <a:rPr lang="he-IL" dirty="0"/>
-              <a:t> (</a:t>
-            </a:r>
-            <a:r>
-              <a:rPr lang="en-US" dirty="0"/>
-              <a:t>RSSI </a:t>
-            </a:r>
-            <a:r>
-              <a:rPr lang="he-IL" dirty="0"/>
-              <a:t>,</a:t>
-            </a:r>
-            <a:r>
-              <a:rPr lang="en-US" dirty="0"/>
-              <a:t>rate scaling</a:t>
-            </a:r>
-            <a:r>
-              <a:rPr lang="he-IL" dirty="0"/>
-              <a:t>, </a:t>
-            </a:r>
-            <a:r>
-              <a:rPr lang="en-US" dirty="0"/>
-              <a:t>CRC </a:t>
-            </a:r>
-            <a:r>
-              <a:rPr lang="he-IL" dirty="0"/>
-              <a:t>,ערוצי תווך זמינים, וכו</a:t>
-            </a:r>
-            <a:r>
-              <a:rPr lang="he-IL" dirty="0" smtClean="0"/>
-              <a:t>').</a:t>
-            </a:r>
-          </a:p>
-          <a:p>
-            <a:pPr algn="r" rtl="1"/>
-            <a:r>
-              <a:rPr lang="he-IL" dirty="0"/>
-              <a:t>פיתוח אלגוריתם יעיל לביצוע </a:t>
-            </a:r>
-            <a:r>
-              <a:rPr lang="en-US" dirty="0"/>
-              <a:t>SLS</a:t>
-            </a:r>
-            <a:r>
-              <a:rPr lang="he-IL" dirty="0"/>
-              <a:t> ואימות האלגוריתם באמצעות הסימולטור</a:t>
-            </a:r>
-            <a:r>
-              <a:rPr lang="he-IL" dirty="0" smtClean="0"/>
-              <a:t>.</a:t>
-            </a:r>
-            <a:endParaRPr lang="en-US" dirty="0"/>
-          </a:p>
-          <a:p>
-            <a:pPr lvl="0" algn="r" rtl="1"/>
-            <a:r>
-              <a:rPr lang="he-IL" dirty="0"/>
+              <a:rPr lang="he-IL" sz="2000" dirty="0"/>
               <a:t>תישקל אפשרות להשמת האלגוריתם על התקני </a:t>
             </a:r>
             <a:r>
-              <a:rPr lang="en-US" dirty="0"/>
+              <a:rPr lang="en-US" sz="2000" dirty="0"/>
               <a:t>WIFI </a:t>
             </a:r>
             <a:r>
-              <a:rPr lang="he-IL" dirty="0"/>
+              <a:rPr lang="he-IL" sz="2000" dirty="0"/>
               <a:t>אמיתיים אשר תומכים בפרוטוקול </a:t>
             </a:r>
             <a:r>
-              <a:rPr lang="en-US" dirty="0"/>
+              <a:rPr lang="en-US" sz="2000" dirty="0"/>
               <a:t>TDLS</a:t>
             </a:r>
-            <a:endParaRPr lang="he-IL" dirty="0"/>
+            <a:endParaRPr lang="he-IL" sz="2000" dirty="0"/>
           </a:p>
           <a:p>
             <a:pPr lvl="0" algn="r" rtl="1"/>
@@ -9198,6 +9492,20 @@
           </a:p>
           <a:p>
             <a:pPr lvl="0" algn="r" rtl="1"/>
+            <a:endParaRPr lang="he-IL" dirty="0" smtClean="0"/>
+          </a:p>
+          <a:p>
+            <a:pPr lvl="0" algn="r" rtl="1"/>
+            <a:endParaRPr lang="he-IL" dirty="0" smtClean="0"/>
+          </a:p>
+          <a:p>
+            <a:pPr lvl="0" algn="r" rtl="1"/>
+            <a:endParaRPr lang="he-IL" dirty="0"/>
+          </a:p>
+          <a:p>
+            <a:pPr marL="0" lvl="0" indent="0" algn="r" rtl="1">
+              <a:buNone/>
+            </a:pPr>
             <a:endParaRPr lang="ru-RU" dirty="0"/>
           </a:p>
           <a:p>
@@ -9256,6 +9564,42 @@
           </a:p>
         </p:txBody>
       </p:sp>
+      <p:pic>
+        <p:nvPicPr>
+          <p:cNvPr id="4" name="Рисунок 3"/>
+          <p:cNvPicPr>
+            <a:picLocks noChangeAspect="1"/>
+          </p:cNvPicPr>
+          <p:nvPr/>
+        </p:nvPicPr>
+        <p:blipFill>
+          <a:blip r:embed="rId2">
+            <a:extLst>
+              <a:ext uri="{28A0092B-C50C-407E-A947-70E740481C1C}">
+                <a14:useLocalDpi xmlns:a14="http://schemas.microsoft.com/office/drawing/2010/main" val="0"/>
+              </a:ext>
+            </a:extLst>
+          </a:blip>
+          <a:stretch>
+            <a:fillRect/>
+          </a:stretch>
+        </p:blipFill>
+        <p:spPr>
+          <a:xfrm>
+            <a:off x="2771800" y="2276872"/>
+            <a:ext cx="2650604" cy="1767069"/>
+          </a:xfrm>
+          <a:prstGeom prst="rect">
+            <a:avLst/>
+          </a:prstGeom>
+          <a:ln>
+            <a:noFill/>
+          </a:ln>
+          <a:effectLst>
+            <a:softEdge rad="112500"/>
+          </a:effectLst>
+        </p:spPr>
+      </p:pic>
     </p:spTree>
     <p:extLst>
       <p:ext uri="{BB962C8B-B14F-4D97-AF65-F5344CB8AC3E}">

</xml_diff>

<commit_message>
Maceget Maftehot file added
Signed-off-by: Andrey Shamis <lolnik@gmail.com>
</commit_message>
<xml_diff>
--- a/מצגת.pptx
+++ b/מצגת.pptx
@@ -205,7 +205,7 @@
           <a:p>
             <a:fld id="{9A78BA3A-7736-4AAE-B32E-AB7964FE7FAF}" type="datetimeFigureOut">
               <a:rPr lang="he-IL" smtClean="0"/>
-              <a:t>ו'/כסלו/תשע"ג</a:t>
+              <a:t>ז'/כסלו/תשע"ג</a:t>
             </a:fld>
             <a:endParaRPr lang="he-IL"/>
           </a:p>
@@ -597,6 +597,41 @@
             </a:pPr>
             <a:r>
               <a:rPr lang="he-IL" dirty="0" smtClean="0"/>
+              <a:t>תקשורת </a:t>
+            </a:r>
+            <a:r>
+              <a:rPr lang="he-IL" dirty="0" smtClean="0"/>
+              <a:t>לא ישירה המשתמשת בנקודת גישה (</a:t>
+            </a:r>
+            <a:r>
+              <a:rPr lang="en-US" dirty="0" smtClean="0"/>
+              <a:t>Base Service Set - BSS</a:t>
+            </a:r>
+            <a:r>
+              <a:rPr lang="he-IL" dirty="0" smtClean="0"/>
+              <a:t>)</a:t>
+            </a:r>
+          </a:p>
+          <a:p>
+            <a:pPr marL="628650" marR="0" lvl="1" indent="-171450" algn="r" defTabSz="914400" rtl="1" eaLnBrk="1" fontAlgn="auto" latinLnBrk="0" hangingPunct="1">
+              <a:lnSpc>
+                <a:spcPct val="100000"/>
+              </a:lnSpc>
+              <a:spcBef>
+                <a:spcPts val="0"/>
+              </a:spcBef>
+              <a:spcAft>
+                <a:spcPts val="0"/>
+              </a:spcAft>
+              <a:buClrTx/>
+              <a:buSzTx/>
+              <a:buFont typeface="Arial" pitchFamily="34" charset="0"/>
+              <a:buChar char="•"/>
+              <a:tabLst/>
+              <a:defRPr/>
+            </a:pPr>
+            <a:r>
+              <a:rPr lang="he-IL" dirty="0" smtClean="0"/>
               <a:t>תקשורת ישירה בין שני התקני </a:t>
             </a:r>
             <a:r>
@@ -622,18 +657,6 @@
               <a:buFont typeface="Arial" pitchFamily="34" charset="0"/>
               <a:buChar char="•"/>
             </a:pPr>
-            <a:r>
-              <a:rPr lang="he-IL" dirty="0" smtClean="0"/>
-              <a:t>תקשורת לא ישירה המשתמשת בנקודת גישה (</a:t>
-            </a:r>
-            <a:r>
-              <a:rPr lang="en-US" dirty="0" smtClean="0"/>
-              <a:t>Base Service Set - BSS</a:t>
-            </a:r>
-            <a:r>
-              <a:rPr lang="he-IL" dirty="0" smtClean="0"/>
-              <a:t>)</a:t>
-            </a:r>
             <a:endParaRPr lang="ru-RU" dirty="0" smtClean="0"/>
           </a:p>
           <a:p>
@@ -1003,6 +1026,137 @@
           <a:bodyPr/>
           <a:lstStyle/>
           <a:p>
+            <a:r>
+              <a:rPr lang="he-IL" dirty="0" smtClean="0"/>
+              <a:t>עובדים</a:t>
+            </a:r>
+            <a:r>
+              <a:rPr lang="he-IL" baseline="0" dirty="0" smtClean="0"/>
+              <a:t> בערוץ פרטי שלנו – לא מתחרים עם </a:t>
+            </a:r>
+            <a:r>
+              <a:rPr lang="en-US" baseline="0" dirty="0" smtClean="0"/>
+              <a:t>STA</a:t>
+            </a:r>
+            <a:r>
+              <a:rPr lang="he-IL" baseline="0" dirty="0" smtClean="0"/>
+              <a:t> אחרים לאומת עבודה ב </a:t>
+            </a:r>
+            <a:r>
+              <a:rPr lang="en-US" baseline="0" dirty="0" smtClean="0"/>
+              <a:t>BSS</a:t>
+            </a:r>
+            <a:endParaRPr lang="he-IL" baseline="0" dirty="0" smtClean="0"/>
+          </a:p>
+          <a:p>
+            <a:r>
+              <a:rPr lang="he-IL" baseline="0" dirty="0" smtClean="0"/>
+              <a:t>שולחים </a:t>
+            </a:r>
+            <a:r>
+              <a:rPr lang="he-IL" baseline="0" dirty="0" err="1" smtClean="0"/>
+              <a:t>פקטה</a:t>
+            </a:r>
+            <a:r>
+              <a:rPr lang="he-IL" baseline="0" dirty="0" smtClean="0"/>
+              <a:t> אחת במקום שניים (הפחתה בחצי משידור </a:t>
+            </a:r>
+            <a:r>
+              <a:rPr lang="he-IL" baseline="0" dirty="0" err="1" smtClean="0"/>
+              <a:t>וכליתת</a:t>
+            </a:r>
+            <a:r>
+              <a:rPr lang="he-IL" baseline="0" dirty="0" smtClean="0"/>
+              <a:t> </a:t>
+            </a:r>
+            <a:r>
+              <a:rPr lang="he-IL" baseline="0" dirty="0" err="1" smtClean="0"/>
+              <a:t>פקטות</a:t>
+            </a:r>
+            <a:endParaRPr lang="en-US" dirty="0"/>
+          </a:p>
+        </p:txBody>
+      </p:sp>
+      <p:sp>
+        <p:nvSpPr>
+          <p:cNvPr id="4" name="Slide Number Placeholder 3"/>
+          <p:cNvSpPr>
+            <a:spLocks noGrp="1"/>
+          </p:cNvSpPr>
+          <p:nvPr>
+            <p:ph type="sldNum" sz="quarter" idx="10"/>
+          </p:nvPr>
+        </p:nvSpPr>
+        <p:spPr/>
+        <p:txBody>
+          <a:bodyPr/>
+          <a:lstStyle/>
+          <a:p>
+            <a:fld id="{7A6A5AAE-82E3-4B26-81AD-E86F1575EFF2}" type="slidenum">
+              <a:rPr lang="he-IL" smtClean="0"/>
+              <a:t>5</a:t>
+            </a:fld>
+            <a:endParaRPr lang="he-IL"/>
+          </a:p>
+        </p:txBody>
+      </p:sp>
+    </p:spTree>
+    <p:extLst>
+      <p:ext uri="{BB962C8B-B14F-4D97-AF65-F5344CB8AC3E}">
+        <p14:creationId xmlns:p14="http://schemas.microsoft.com/office/powerpoint/2010/main" val="829733066"/>
+      </p:ext>
+    </p:extLst>
+  </p:cSld>
+  <p:clrMapOvr>
+    <a:masterClrMapping/>
+  </p:clrMapOvr>
+</p:notes>
+</file>
+
+<file path=ppt/notesSlides/notesSlide4.xml><?xml version="1.0" encoding="utf-8"?>
+<p:notes xmlns:a="http://schemas.openxmlformats.org/drawingml/2006/main" xmlns:r="http://schemas.openxmlformats.org/officeDocument/2006/relationships" xmlns:p="http://schemas.openxmlformats.org/presentationml/2006/main">
+  <p:cSld>
+    <p:spTree>
+      <p:nvGrpSpPr>
+        <p:cNvPr id="1" name=""/>
+        <p:cNvGrpSpPr/>
+        <p:nvPr/>
+      </p:nvGrpSpPr>
+      <p:grpSpPr>
+        <a:xfrm>
+          <a:off x="0" y="0"/>
+          <a:ext cx="0" cy="0"/>
+          <a:chOff x="0" y="0"/>
+          <a:chExt cx="0" cy="0"/>
+        </a:xfrm>
+      </p:grpSpPr>
+      <p:sp>
+        <p:nvSpPr>
+          <p:cNvPr id="2" name="Slide Image Placeholder 1"/>
+          <p:cNvSpPr>
+            <a:spLocks noGrp="1" noRot="1" noChangeAspect="1"/>
+          </p:cNvSpPr>
+          <p:nvPr>
+            <p:ph type="sldImg"/>
+          </p:nvPr>
+        </p:nvSpPr>
+        <p:spPr/>
+      </p:sp>
+      <p:sp>
+        <p:nvSpPr>
+          <p:cNvPr id="3" name="Notes Placeholder 2"/>
+          <p:cNvSpPr>
+            <a:spLocks noGrp="1"/>
+          </p:cNvSpPr>
+          <p:nvPr>
+            <p:ph type="body" idx="1"/>
+          </p:nvPr>
+        </p:nvSpPr>
+        <p:spPr/>
+        <p:txBody>
+          <a:bodyPr/>
+          <a:lstStyle/>
+          <a:p>
             <a:pPr marL="0" marR="0" indent="0" algn="r" defTabSz="914400" rtl="1" eaLnBrk="1" fontAlgn="auto" latinLnBrk="0" hangingPunct="1">
               <a:lnSpc>
                 <a:spcPct val="100000"/>
@@ -1099,7 +1253,7 @@
 </p:notes>
 </file>
 
-<file path=ppt/notesSlides/notesSlide4.xml><?xml version="1.0" encoding="utf-8"?>
+<file path=ppt/notesSlides/notesSlide5.xml><?xml version="1.0" encoding="utf-8"?>
 <p:notes xmlns:a="http://schemas.openxmlformats.org/drawingml/2006/main" xmlns:r="http://schemas.openxmlformats.org/officeDocument/2006/relationships" xmlns:p="http://schemas.openxmlformats.org/presentationml/2006/main">
   <p:cSld>
     <p:spTree>
@@ -1215,7 +1369,6 @@
               <a:rPr lang="he-IL" sz="1200" dirty="0" smtClean="0"/>
               <a:t>,ערוצי תווך זמינים, וכו').</a:t>
             </a:r>
-            <a:endParaRPr lang="he-IL" sz="1200" dirty="0" smtClean="0"/>
           </a:p>
         </p:txBody>
       </p:sp>
@@ -1255,7 +1408,7 @@
 </p:notes>
 </file>
 
-<file path=ppt/notesSlides/notesSlide5.xml><?xml version="1.0" encoding="utf-8"?>
+<file path=ppt/notesSlides/notesSlide6.xml><?xml version="1.0" encoding="utf-8"?>
 <p:notes xmlns:a="http://schemas.openxmlformats.org/drawingml/2006/main" xmlns:r="http://schemas.openxmlformats.org/officeDocument/2006/relationships" xmlns:p="http://schemas.openxmlformats.org/presentationml/2006/main">
   <p:cSld>
     <p:spTree>
@@ -1545,7 +1698,7 @@
           <a:p>
             <a:fld id="{B4C71EC6-210F-42DE-9C53-41977AD35B3D}" type="datetimeFigureOut">
               <a:rPr lang="ru-RU" smtClean="0"/>
-              <a:t>20.11.2012</a:t>
+              <a:t>21.11.2012</a:t>
             </a:fld>
             <a:endParaRPr lang="ru-RU"/>
           </a:p>
@@ -2070,7 +2223,7 @@
           <a:p>
             <a:fld id="{B4C71EC6-210F-42DE-9C53-41977AD35B3D}" type="datetimeFigureOut">
               <a:rPr lang="ru-RU" smtClean="0"/>
-              <a:t>20.11.2012</a:t>
+              <a:t>21.11.2012</a:t>
             </a:fld>
             <a:endParaRPr lang="ru-RU"/>
           </a:p>
@@ -2384,7 +2537,7 @@
           <a:p>
             <a:fld id="{B4C71EC6-210F-42DE-9C53-41977AD35B3D}" type="datetimeFigureOut">
               <a:rPr lang="ru-RU" smtClean="0"/>
-              <a:t>20.11.2012</a:t>
+              <a:t>21.11.2012</a:t>
             </a:fld>
             <a:endParaRPr lang="ru-RU"/>
           </a:p>
@@ -2670,7 +2823,7 @@
           <a:p>
             <a:fld id="{B4C71EC6-210F-42DE-9C53-41977AD35B3D}" type="datetimeFigureOut">
               <a:rPr lang="ru-RU" smtClean="0"/>
-              <a:t>20.11.2012</a:t>
+              <a:t>21.11.2012</a:t>
             </a:fld>
             <a:endParaRPr lang="ru-RU"/>
           </a:p>
@@ -3245,7 +3398,7 @@
           <a:p>
             <a:fld id="{B4C71EC6-210F-42DE-9C53-41977AD35B3D}" type="datetimeFigureOut">
               <a:rPr lang="ru-RU" smtClean="0"/>
-              <a:t>20.11.2012</a:t>
+              <a:t>21.11.2012</a:t>
             </a:fld>
             <a:endParaRPr lang="ru-RU"/>
           </a:p>
@@ -3335,7 +3488,7 @@
           <a:p>
             <a:fld id="{B4C71EC6-210F-42DE-9C53-41977AD35B3D}" type="datetimeFigureOut">
               <a:rPr lang="ru-RU" smtClean="0"/>
-              <a:t>20.11.2012</a:t>
+              <a:t>21.11.2012</a:t>
             </a:fld>
             <a:endParaRPr lang="ru-RU"/>
           </a:p>
@@ -4044,7 +4197,7 @@
           <a:p>
             <a:fld id="{B4C71EC6-210F-42DE-9C53-41977AD35B3D}" type="datetimeFigureOut">
               <a:rPr lang="ru-RU" smtClean="0"/>
-              <a:t>20.11.2012</a:t>
+              <a:t>21.11.2012</a:t>
             </a:fld>
             <a:endParaRPr lang="ru-RU"/>
           </a:p>
@@ -4296,7 +4449,7 @@
           <a:p>
             <a:fld id="{B4C71EC6-210F-42DE-9C53-41977AD35B3D}" type="datetimeFigureOut">
               <a:rPr lang="ru-RU" smtClean="0"/>
-              <a:t>20.11.2012</a:t>
+              <a:t>21.11.2012</a:t>
             </a:fld>
             <a:endParaRPr lang="ru-RU"/>
           </a:p>
@@ -4525,7 +4678,7 @@
           <a:p>
             <a:fld id="{B4C71EC6-210F-42DE-9C53-41977AD35B3D}" type="datetimeFigureOut">
               <a:rPr lang="ru-RU" smtClean="0"/>
-              <a:t>20.11.2012</a:t>
+              <a:t>21.11.2012</a:t>
             </a:fld>
             <a:endParaRPr lang="ru-RU"/>
           </a:p>
@@ -4799,7 +4952,7 @@
           <a:p>
             <a:fld id="{B4C71EC6-210F-42DE-9C53-41977AD35B3D}" type="datetimeFigureOut">
               <a:rPr lang="ru-RU" smtClean="0"/>
-              <a:t>20.11.2012</a:t>
+              <a:t>21.11.2012</a:t>
             </a:fld>
             <a:endParaRPr lang="ru-RU"/>
           </a:p>
@@ -5085,7 +5238,7 @@
           <a:p>
             <a:fld id="{B4C71EC6-210F-42DE-9C53-41977AD35B3D}" type="datetimeFigureOut">
               <a:rPr lang="ru-RU" smtClean="0"/>
-              <a:t>20.11.2012</a:t>
+              <a:t>21.11.2012</a:t>
             </a:fld>
             <a:endParaRPr lang="ru-RU"/>
           </a:p>
@@ -5353,7 +5506,7 @@
           <a:p>
             <a:fld id="{B4C71EC6-210F-42DE-9C53-41977AD35B3D}" type="datetimeFigureOut">
               <a:rPr lang="ru-RU" smtClean="0"/>
-              <a:t>20.11.2012</a:t>
+              <a:t>21.11.2012</a:t>
             </a:fld>
             <a:endParaRPr lang="ru-RU"/>
           </a:p>
@@ -6475,7 +6628,231 @@
   <p:timing>
     <p:tnLst>
       <p:par>
-        <p:cTn id="1" dur="indefinite" restart="never" nodeType="tmRoot"/>
+        <p:cTn id="1" dur="indefinite" restart="never" nodeType="tmRoot">
+          <p:childTnLst>
+            <p:seq concurrent="1" nextAc="seek">
+              <p:cTn id="2" dur="indefinite" nodeType="mainSeq">
+                <p:childTnLst>
+                  <p:par>
+                    <p:cTn id="3" fill="hold">
+                      <p:stCondLst>
+                        <p:cond delay="indefinite"/>
+                      </p:stCondLst>
+                      <p:childTnLst>
+                        <p:par>
+                          <p:cTn id="4" fill="hold">
+                            <p:stCondLst>
+                              <p:cond delay="0"/>
+                            </p:stCondLst>
+                            <p:childTnLst>
+                              <p:par>
+                                <p:cTn id="5" presetID="1" presetClass="entr" presetSubtype="0" fill="hold" nodeType="clickEffect">
+                                  <p:stCondLst>
+                                    <p:cond delay="0"/>
+                                  </p:stCondLst>
+                                  <p:childTnLst>
+                                    <p:set>
+                                      <p:cBhvr>
+                                        <p:cTn id="6" dur="1" fill="hold">
+                                          <p:stCondLst>
+                                            <p:cond delay="0"/>
+                                          </p:stCondLst>
+                                        </p:cTn>
+                                        <p:tgtEl>
+                                          <p:spTgt spid="2">
+                                            <p:txEl>
+                                              <p:pRg st="0" end="0"/>
+                                            </p:txEl>
+                                          </p:spTgt>
+                                        </p:tgtEl>
+                                        <p:attrNameLst>
+                                          <p:attrName>style.visibility</p:attrName>
+                                        </p:attrNameLst>
+                                      </p:cBhvr>
+                                      <p:to>
+                                        <p:strVal val="visible"/>
+                                      </p:to>
+                                    </p:set>
+                                  </p:childTnLst>
+                                </p:cTn>
+                              </p:par>
+                              <p:par>
+                                <p:cTn id="7" presetID="1" presetClass="entr" presetSubtype="0" fill="hold" nodeType="withEffect">
+                                  <p:stCondLst>
+                                    <p:cond delay="0"/>
+                                  </p:stCondLst>
+                                  <p:childTnLst>
+                                    <p:set>
+                                      <p:cBhvr>
+                                        <p:cTn id="8" dur="1" fill="hold">
+                                          <p:stCondLst>
+                                            <p:cond delay="0"/>
+                                          </p:stCondLst>
+                                        </p:cTn>
+                                        <p:tgtEl>
+                                          <p:spTgt spid="4"/>
+                                        </p:tgtEl>
+                                        <p:attrNameLst>
+                                          <p:attrName>style.visibility</p:attrName>
+                                        </p:attrNameLst>
+                                      </p:cBhvr>
+                                      <p:to>
+                                        <p:strVal val="visible"/>
+                                      </p:to>
+                                    </p:set>
+                                  </p:childTnLst>
+                                </p:cTn>
+                              </p:par>
+                            </p:childTnLst>
+                          </p:cTn>
+                        </p:par>
+                      </p:childTnLst>
+                    </p:cTn>
+                  </p:par>
+                  <p:par>
+                    <p:cTn id="9" fill="hold">
+                      <p:stCondLst>
+                        <p:cond delay="indefinite"/>
+                      </p:stCondLst>
+                      <p:childTnLst>
+                        <p:par>
+                          <p:cTn id="10" fill="hold">
+                            <p:stCondLst>
+                              <p:cond delay="0"/>
+                            </p:stCondLst>
+                            <p:childTnLst>
+                              <p:par>
+                                <p:cTn id="11" presetID="1" presetClass="entr" presetSubtype="0" fill="hold" nodeType="clickEffect">
+                                  <p:stCondLst>
+                                    <p:cond delay="0"/>
+                                  </p:stCondLst>
+                                  <p:childTnLst>
+                                    <p:set>
+                                      <p:cBhvr>
+                                        <p:cTn id="12" dur="1" fill="hold">
+                                          <p:stCondLst>
+                                            <p:cond delay="0"/>
+                                          </p:stCondLst>
+                                        </p:cTn>
+                                        <p:tgtEl>
+                                          <p:spTgt spid="2">
+                                            <p:txEl>
+                                              <p:pRg st="2" end="2"/>
+                                            </p:txEl>
+                                          </p:spTgt>
+                                        </p:tgtEl>
+                                        <p:attrNameLst>
+                                          <p:attrName>style.visibility</p:attrName>
+                                        </p:attrNameLst>
+                                      </p:cBhvr>
+                                      <p:to>
+                                        <p:strVal val="visible"/>
+                                      </p:to>
+                                    </p:set>
+                                  </p:childTnLst>
+                                </p:cTn>
+                              </p:par>
+                            </p:childTnLst>
+                          </p:cTn>
+                        </p:par>
+                      </p:childTnLst>
+                    </p:cTn>
+                  </p:par>
+                  <p:par>
+                    <p:cTn id="13" fill="hold">
+                      <p:stCondLst>
+                        <p:cond delay="indefinite"/>
+                      </p:stCondLst>
+                      <p:childTnLst>
+                        <p:par>
+                          <p:cTn id="14" fill="hold">
+                            <p:stCondLst>
+                              <p:cond delay="0"/>
+                            </p:stCondLst>
+                            <p:childTnLst>
+                              <p:par>
+                                <p:cTn id="15" presetID="1" presetClass="entr" presetSubtype="0" fill="hold" nodeType="clickEffect">
+                                  <p:stCondLst>
+                                    <p:cond delay="0"/>
+                                  </p:stCondLst>
+                                  <p:childTnLst>
+                                    <p:set>
+                                      <p:cBhvr>
+                                        <p:cTn id="16" dur="1" fill="hold">
+                                          <p:stCondLst>
+                                            <p:cond delay="0"/>
+                                          </p:stCondLst>
+                                        </p:cTn>
+                                        <p:tgtEl>
+                                          <p:spTgt spid="2">
+                                            <p:txEl>
+                                              <p:pRg st="4" end="4"/>
+                                            </p:txEl>
+                                          </p:spTgt>
+                                        </p:tgtEl>
+                                        <p:attrNameLst>
+                                          <p:attrName>style.visibility</p:attrName>
+                                        </p:attrNameLst>
+                                      </p:cBhvr>
+                                      <p:to>
+                                        <p:strVal val="visible"/>
+                                      </p:to>
+                                    </p:set>
+                                  </p:childTnLst>
+                                </p:cTn>
+                              </p:par>
+                              <p:par>
+                                <p:cTn id="17" presetID="1" presetClass="entr" presetSubtype="0" fill="hold" nodeType="withEffect">
+                                  <p:stCondLst>
+                                    <p:cond delay="0"/>
+                                  </p:stCondLst>
+                                  <p:childTnLst>
+                                    <p:set>
+                                      <p:cBhvr>
+                                        <p:cTn id="18" dur="1" fill="hold">
+                                          <p:stCondLst>
+                                            <p:cond delay="0"/>
+                                          </p:stCondLst>
+                                        </p:cTn>
+                                        <p:tgtEl>
+                                          <p:spTgt spid="5"/>
+                                        </p:tgtEl>
+                                        <p:attrNameLst>
+                                          <p:attrName>style.visibility</p:attrName>
+                                        </p:attrNameLst>
+                                      </p:cBhvr>
+                                      <p:to>
+                                        <p:strVal val="visible"/>
+                                      </p:to>
+                                    </p:set>
+                                  </p:childTnLst>
+                                </p:cTn>
+                              </p:par>
+                            </p:childTnLst>
+                          </p:cTn>
+                        </p:par>
+                      </p:childTnLst>
+                    </p:cTn>
+                  </p:par>
+                </p:childTnLst>
+              </p:cTn>
+              <p:prevCondLst>
+                <p:cond evt="onPrev" delay="0">
+                  <p:tgtEl>
+                    <p:sldTgt/>
+                  </p:tgtEl>
+                </p:cond>
+              </p:prevCondLst>
+              <p:nextCondLst>
+                <p:cond evt="onNext" delay="0">
+                  <p:tgtEl>
+                    <p:sldTgt/>
+                  </p:tgtEl>
+                </p:cond>
+              </p:nextCondLst>
+            </p:seq>
+          </p:childTnLst>
+        </p:cTn>
       </p:par>
     </p:tnLst>
   </p:timing>
@@ -7083,7 +7460,7 @@
         </p:nvGraphicFramePr>
         <p:xfrm>
           <a:off x="1187624" y="2204864"/>
-          <a:ext cx="6697107" cy="3715897"/>
+          <a:ext cx="6697107" cy="3683393"/>
         </p:xfrm>
         <a:graphic>
           <a:graphicData uri="http://schemas.openxmlformats.org/drawingml/2006/table">
@@ -7563,19 +7940,7 @@
                         <a:rPr lang="he-IL" sz="1400" dirty="0" smtClean="0">
                           <a:effectLst/>
                         </a:rPr>
-                        <a:t>                              </a:t>
-                      </a:r>
-                      <a:r>
-                        <a:rPr lang="he-IL" sz="1400" dirty="0" smtClean="0">
-                          <a:effectLst/>
-                        </a:rPr>
-                        <a:t>      </a:t>
-                      </a:r>
-                      <a:r>
-                        <a:rPr lang="he-IL" sz="1400" dirty="0" smtClean="0">
-                          <a:effectLst/>
-                        </a:rPr>
-                        <a:t>אילן פאר</a:t>
+                        <a:t>                                    אילן פאר</a:t>
                       </a:r>
                       <a:r>
                         <a:rPr lang="en-US" sz="1400" baseline="0" dirty="0" smtClean="0">
@@ -7838,22 +8203,14 @@
               <a:buChar char="v"/>
             </a:pPr>
             <a:r>
-              <a:rPr lang="he-IL" sz="1600" dirty="0"/>
-              <a:t>תקשורת לא ישירה המשתמשת בנקודת גישה (</a:t>
-            </a:r>
-            <a:r>
-              <a:rPr lang="en-US" sz="1600" dirty="0"/>
-              <a:t>Base Service Set - BSS</a:t>
-            </a:r>
-            <a:r>
-              <a:rPr lang="he-IL" sz="1600" dirty="0"/>
-              <a:t>)</a:t>
-            </a:r>
-            <a:r>
-              <a:rPr lang="en-US" sz="1600" dirty="0"/>
-              <a:t> </a:t>
-            </a:r>
-            <a:endParaRPr lang="en-US" sz="1600" dirty="0" smtClean="0"/>
+              <a:rPr lang="he-IL" sz="2000" dirty="0" smtClean="0"/>
+              <a:t>עבודה בין משתמשים באמצעות </a:t>
+            </a:r>
+            <a:r>
+              <a:rPr lang="en-US" sz="2000" dirty="0" smtClean="0"/>
+              <a:t>AP </a:t>
+            </a:r>
+            <a:endParaRPr lang="en-US" sz="2000" dirty="0" smtClean="0"/>
           </a:p>
           <a:p>
             <a:pPr lvl="1" algn="r" rtl="1">
@@ -7861,26 +8218,14 @@
               <a:buChar char="v"/>
             </a:pPr>
             <a:r>
-              <a:rPr lang="he-IL" sz="1600" dirty="0"/>
-              <a:t>תקשורת ישירה בין שני התקני </a:t>
-            </a:r>
-            <a:r>
-              <a:rPr lang="en-US" sz="1600" dirty="0"/>
-              <a:t>WIFI </a:t>
-            </a:r>
-            <a:r>
-              <a:rPr lang="he-IL" sz="1600" dirty="0"/>
-              <a:t> (</a:t>
-            </a:r>
-            <a:r>
-              <a:rPr lang="en-US" sz="1600" dirty="0"/>
-              <a:t>IBSS, Tunneled Data Link Setup - TDLS , WIFI Direct</a:t>
-            </a:r>
-            <a:r>
-              <a:rPr lang="he-IL" sz="1600" dirty="0" smtClean="0"/>
-              <a:t>)</a:t>
-            </a:r>
-            <a:endParaRPr lang="en-US" sz="1200" dirty="0"/>
+              <a:rPr lang="he-IL" sz="2000" dirty="0"/>
+              <a:t>תקשורת ישירה בין שני </a:t>
+            </a:r>
+            <a:r>
+              <a:rPr lang="he-IL" sz="2000" dirty="0" smtClean="0"/>
+              <a:t>משתמשים</a:t>
+            </a:r>
+            <a:endParaRPr lang="en-US" sz="1600" dirty="0"/>
           </a:p>
           <a:p>
             <a:pPr lvl="1" algn="r" rtl="1"/>
@@ -7997,11 +8342,11 @@
   <p:clrMapOvr>
     <a:masterClrMapping/>
   </p:clrMapOvr>
-  <mc:AlternateContent xmlns:mc="http://schemas.openxmlformats.org/markup-compatibility/2006">
-    <mc:Choice xmlns:p14="http://schemas.microsoft.com/office/powerpoint/2010/main" Requires="p14">
+  <mc:AlternateContent xmlns:mc="http://schemas.openxmlformats.org/markup-compatibility/2006" xmlns:p14="http://schemas.microsoft.com/office/powerpoint/2010/main">
+    <mc:Choice Requires="p14">
       <p:transition spd="slow" p14:dur="2000"/>
     </mc:Choice>
-    <mc:Fallback>
+    <mc:Fallback xmlns="">
       <p:transition spd="slow"/>
     </mc:Fallback>
   </mc:AlternateContent>
@@ -8110,33 +8455,15 @@
                                   </p:childTnLst>
                                 </p:cTn>
                               </p:par>
-                            </p:childTnLst>
-                          </p:cTn>
-                        </p:par>
-                      </p:childTnLst>
-                    </p:cTn>
-                  </p:par>
-                  <p:par>
-                    <p:cTn id="9" fill="hold">
-                      <p:stCondLst>
-                        <p:cond delay="indefinite"/>
-                      </p:stCondLst>
-                      <p:childTnLst>
-                        <p:par>
-                          <p:cTn id="10" fill="hold">
-                            <p:stCondLst>
-                              <p:cond delay="0"/>
-                            </p:stCondLst>
-                            <p:childTnLst>
                               <p:par>
-                                <p:cTn id="11" presetID="2" presetClass="entr" presetSubtype="4" fill="hold" nodeType="clickEffect">
+                                <p:cTn id="9" presetID="2" presetClass="entr" presetSubtype="4" fill="hold" nodeType="withEffect">
                                   <p:stCondLst>
                                     <p:cond delay="0"/>
                                   </p:stCondLst>
                                   <p:childTnLst>
                                     <p:set>
                                       <p:cBhvr>
-                                        <p:cTn id="12" dur="1" fill="hold">
+                                        <p:cTn id="10" dur="1" fill="hold">
                                           <p:stCondLst>
                                             <p:cond delay="0"/>
                                           </p:stCondLst>
@@ -8154,7 +8481,7 @@
                                     </p:set>
                                     <p:anim calcmode="lin" valueType="num">
                                       <p:cBhvr additive="base">
-                                        <p:cTn id="13" dur="500" fill="hold"/>
+                                        <p:cTn id="11" dur="500" fill="hold"/>
                                         <p:tgtEl>
                                           <p:spTgt spid="6"/>
                                         </p:tgtEl>
@@ -8177,7 +8504,7 @@
                                     </p:anim>
                                     <p:anim calcmode="lin" valueType="num">
                                       <p:cBhvr additive="base">
-                                        <p:cTn id="14" dur="500" fill="hold"/>
+                                        <p:cTn id="12" dur="500" fill="hold"/>
                                         <p:tgtEl>
                                           <p:spTgt spid="6"/>
                                         </p:tgtEl>
@@ -8208,26 +8535,26 @@
                     </p:cTn>
                   </p:par>
                   <p:par>
-                    <p:cTn id="15" fill="hold">
+                    <p:cTn id="13" fill="hold">
                       <p:stCondLst>
                         <p:cond delay="indefinite"/>
                       </p:stCondLst>
                       <p:childTnLst>
                         <p:par>
-                          <p:cTn id="16" fill="hold">
+                          <p:cTn id="14" fill="hold">
                             <p:stCondLst>
                               <p:cond delay="0"/>
                             </p:stCondLst>
                             <p:childTnLst>
                               <p:par>
-                                <p:cTn id="17" presetID="2" presetClass="entr" presetSubtype="4" fill="hold" nodeType="clickEffect">
+                                <p:cTn id="15" presetID="2" presetClass="entr" presetSubtype="4" fill="hold" nodeType="clickEffect">
                                   <p:stCondLst>
                                     <p:cond delay="0"/>
                                   </p:stCondLst>
                                   <p:childTnLst>
                                     <p:set>
                                       <p:cBhvr>
-                                        <p:cTn id="18" dur="1" fill="hold">
+                                        <p:cTn id="16" dur="1" fill="hold">
                                           <p:stCondLst>
                                             <p:cond delay="0"/>
                                           </p:stCondLst>
@@ -8249,7 +8576,7 @@
                                     </p:set>
                                     <p:anim calcmode="lin" valueType="num">
                                       <p:cBhvr additive="base">
-                                        <p:cTn id="19" dur="500" fill="hold"/>
+                                        <p:cTn id="17" dur="500" fill="hold"/>
                                         <p:tgtEl>
                                           <p:spTgt spid="2">
                                             <p:txEl>
@@ -8276,7 +8603,7 @@
                                     </p:anim>
                                     <p:anim calcmode="lin" valueType="num">
                                       <p:cBhvr additive="base">
-                                        <p:cTn id="20" dur="500" fill="hold"/>
+                                        <p:cTn id="18" dur="500" fill="hold"/>
                                         <p:tgtEl>
                                           <p:spTgt spid="2">
                                             <p:txEl>
@@ -8304,33 +8631,15 @@
                                   </p:childTnLst>
                                 </p:cTn>
                               </p:par>
-                            </p:childTnLst>
-                          </p:cTn>
-                        </p:par>
-                      </p:childTnLst>
-                    </p:cTn>
-                  </p:par>
-                  <p:par>
-                    <p:cTn id="21" fill="hold">
-                      <p:stCondLst>
-                        <p:cond delay="indefinite"/>
-                      </p:stCondLst>
-                      <p:childTnLst>
-                        <p:par>
-                          <p:cTn id="22" fill="hold">
-                            <p:stCondLst>
-                              <p:cond delay="0"/>
-                            </p:stCondLst>
-                            <p:childTnLst>
                               <p:par>
-                                <p:cTn id="23" presetID="2" presetClass="entr" presetSubtype="4" fill="hold" nodeType="clickEffect">
+                                <p:cTn id="19" presetID="2" presetClass="entr" presetSubtype="4" fill="hold" nodeType="withEffect">
                                   <p:stCondLst>
                                     <p:cond delay="0"/>
                                   </p:stCondLst>
                                   <p:childTnLst>
                                     <p:set>
                                       <p:cBhvr>
-                                        <p:cTn id="24" dur="1" fill="hold">
+                                        <p:cTn id="20" dur="1" fill="hold">
                                           <p:stCondLst>
                                             <p:cond delay="0"/>
                                           </p:stCondLst>
@@ -8348,7 +8657,7 @@
                                     </p:set>
                                     <p:anim calcmode="lin" valueType="num">
                                       <p:cBhvr additive="base">
-                                        <p:cTn id="25" dur="500" fill="hold"/>
+                                        <p:cTn id="21" dur="500" fill="hold"/>
                                         <p:tgtEl>
                                           <p:spTgt spid="4"/>
                                         </p:tgtEl>
@@ -8371,7 +8680,7 @@
                                     </p:anim>
                                     <p:anim calcmode="lin" valueType="num">
                                       <p:cBhvr additive="base">
-                                        <p:cTn id="26" dur="500" fill="hold"/>
+                                        <p:cTn id="22" dur="500" fill="hold"/>
                                         <p:tgtEl>
                                           <p:spTgt spid="4"/>
                                         </p:tgtEl>
@@ -8723,48 +9032,86 @@
           <a:p>
             <a:pPr algn="r" rtl="1"/>
             <a:r>
-              <a:rPr lang="he-IL" dirty="0"/>
+              <a:rPr lang="he-IL" sz="2800" dirty="0"/>
               <a:t>התרונות השימוש </a:t>
             </a:r>
             <a:r>
-              <a:rPr lang="he-IL" dirty="0" smtClean="0"/>
+              <a:rPr lang="he-IL" sz="2800" dirty="0" smtClean="0"/>
               <a:t>בפרוטוקול </a:t>
             </a:r>
             <a:r>
-              <a:rPr lang="en-US" dirty="0" smtClean="0"/>
+              <a:rPr lang="en-US" sz="2800" dirty="0" smtClean="0"/>
               <a:t>TDLS</a:t>
             </a:r>
             <a:r>
-              <a:rPr lang="he-IL" dirty="0" smtClean="0"/>
+              <a:rPr lang="he-IL" sz="2800" dirty="0" smtClean="0"/>
               <a:t>:</a:t>
             </a:r>
+          </a:p>
+          <a:p>
+            <a:pPr algn="r" rtl="1"/>
             <a:endParaRPr lang="he-IL" dirty="0"/>
           </a:p>
           <a:p>
-            <a:pPr lvl="1" algn="r" rtl="1"/>
-            <a:r>
-              <a:rPr lang="he-IL" dirty="0"/>
-              <a:t>קצב העברת נתונים</a:t>
-            </a:r>
-          </a:p>
-          <a:p>
-            <a:pPr lvl="1" algn="r" rtl="1"/>
-            <a:r>
-              <a:rPr lang="he-IL" dirty="0"/>
-              <a:t>תקשורת מאובטחת</a:t>
-            </a:r>
-          </a:p>
-          <a:p>
-            <a:pPr lvl="1" algn="r" rtl="1"/>
-            <a:r>
-              <a:rPr lang="he-IL" dirty="0"/>
+            <a:pPr lvl="1" algn="r" rtl="1">
+              <a:buFont typeface="Wingdings" pitchFamily="2" charset="2"/>
+              <a:buChar char="v"/>
+            </a:pPr>
+            <a:r>
+              <a:rPr lang="he-IL" sz="2400" dirty="0" smtClean="0"/>
+              <a:t>שיפור בקצב </a:t>
+            </a:r>
+            <a:r>
+              <a:rPr lang="he-IL" sz="2400" dirty="0"/>
+              <a:t>העברת </a:t>
+            </a:r>
+            <a:r>
+              <a:rPr lang="he-IL" sz="2400" dirty="0" smtClean="0"/>
+              <a:t>נתונים </a:t>
+            </a:r>
+          </a:p>
+          <a:p>
+            <a:pPr lvl="1" algn="r" rtl="1">
+              <a:buFont typeface="Wingdings" pitchFamily="2" charset="2"/>
+              <a:buChar char="v"/>
+            </a:pPr>
+            <a:endParaRPr lang="he-IL" sz="2400" dirty="0"/>
+          </a:p>
+          <a:p>
+            <a:pPr lvl="1" algn="r" rtl="1">
+              <a:buFont typeface="Wingdings" pitchFamily="2" charset="2"/>
+              <a:buChar char="v"/>
+            </a:pPr>
+            <a:r>
+              <a:rPr lang="he-IL" sz="2400" dirty="0"/>
+              <a:t>תקשורת </a:t>
+            </a:r>
+            <a:r>
+              <a:rPr lang="he-IL" sz="2400" dirty="0" smtClean="0"/>
+              <a:t>מאובטחת</a:t>
+            </a:r>
+          </a:p>
+          <a:p>
+            <a:pPr lvl="1" algn="r" rtl="1">
+              <a:buFont typeface="Wingdings" pitchFamily="2" charset="2"/>
+              <a:buChar char="v"/>
+            </a:pPr>
+            <a:endParaRPr lang="he-IL" sz="2400" dirty="0"/>
+          </a:p>
+          <a:p>
+            <a:pPr lvl="1" algn="r" rtl="1">
+              <a:buFont typeface="Wingdings" pitchFamily="2" charset="2"/>
+              <a:buChar char="v"/>
+            </a:pPr>
+            <a:r>
+              <a:rPr lang="he-IL" sz="2400" dirty="0"/>
               <a:t>שימיש בפרוטוקולים אשר לא בהכרח נתמכים ב- </a:t>
             </a:r>
             <a:r>
-              <a:rPr lang="en-US" dirty="0"/>
+              <a:rPr lang="en-US" sz="2800" dirty="0"/>
               <a:t>AP</a:t>
             </a:r>
-            <a:endParaRPr lang="he-IL" dirty="0"/>
+            <a:endParaRPr lang="he-IL" sz="2800" dirty="0"/>
           </a:p>
           <a:p>
             <a:pPr algn="r" rtl="1"/>
@@ -8807,7 +9154,177 @@
   <p:timing>
     <p:tnLst>
       <p:par>
-        <p:cTn id="1" dur="indefinite" restart="never" nodeType="tmRoot"/>
+        <p:cTn id="1" dur="indefinite" restart="never" nodeType="tmRoot">
+          <p:childTnLst>
+            <p:seq concurrent="1" nextAc="seek">
+              <p:cTn id="2" dur="indefinite" nodeType="mainSeq">
+                <p:childTnLst>
+                  <p:par>
+                    <p:cTn id="3" fill="hold">
+                      <p:stCondLst>
+                        <p:cond delay="indefinite"/>
+                      </p:stCondLst>
+                      <p:childTnLst>
+                        <p:par>
+                          <p:cTn id="4" fill="hold">
+                            <p:stCondLst>
+                              <p:cond delay="0"/>
+                            </p:stCondLst>
+                            <p:childTnLst>
+                              <p:par>
+                                <p:cTn id="5" presetID="1" presetClass="entr" presetSubtype="0" fill="hold" nodeType="clickEffect">
+                                  <p:stCondLst>
+                                    <p:cond delay="0"/>
+                                  </p:stCondLst>
+                                  <p:childTnLst>
+                                    <p:set>
+                                      <p:cBhvr>
+                                        <p:cTn id="6" dur="1" fill="hold">
+                                          <p:stCondLst>
+                                            <p:cond delay="0"/>
+                                          </p:stCondLst>
+                                        </p:cTn>
+                                        <p:tgtEl>
+                                          <p:spTgt spid="2">
+                                            <p:txEl>
+                                              <p:pRg st="2" end="2"/>
+                                            </p:txEl>
+                                          </p:spTgt>
+                                        </p:tgtEl>
+                                        <p:attrNameLst>
+                                          <p:attrName>style.visibility</p:attrName>
+                                        </p:attrNameLst>
+                                      </p:cBhvr>
+                                      <p:to>
+                                        <p:strVal val="visible"/>
+                                      </p:to>
+                                    </p:set>
+                                  </p:childTnLst>
+                                </p:cTn>
+                              </p:par>
+                            </p:childTnLst>
+                          </p:cTn>
+                        </p:par>
+                      </p:childTnLst>
+                    </p:cTn>
+                  </p:par>
+                  <p:par>
+                    <p:cTn id="7" fill="hold">
+                      <p:stCondLst>
+                        <p:cond delay="indefinite"/>
+                      </p:stCondLst>
+                      <p:childTnLst>
+                        <p:par>
+                          <p:cTn id="8" fill="hold">
+                            <p:stCondLst>
+                              <p:cond delay="0"/>
+                            </p:stCondLst>
+                            <p:childTnLst>
+                              <p:par>
+                                <p:cTn id="9" presetID="1" presetClass="entr" presetSubtype="0" fill="hold" nodeType="clickEffect">
+                                  <p:stCondLst>
+                                    <p:cond delay="0"/>
+                                  </p:stCondLst>
+                                  <p:childTnLst>
+                                    <p:set>
+                                      <p:cBhvr>
+                                        <p:cTn id="10" dur="1" fill="hold">
+                                          <p:stCondLst>
+                                            <p:cond delay="0"/>
+                                          </p:stCondLst>
+                                        </p:cTn>
+                                        <p:tgtEl>
+                                          <p:spTgt spid="2">
+                                            <p:txEl>
+                                              <p:pRg st="4" end="4"/>
+                                            </p:txEl>
+                                          </p:spTgt>
+                                        </p:tgtEl>
+                                        <p:attrNameLst>
+                                          <p:attrName>style.visibility</p:attrName>
+                                        </p:attrNameLst>
+                                      </p:cBhvr>
+                                      <p:to>
+                                        <p:strVal val="visible"/>
+                                      </p:to>
+                                    </p:set>
+                                  </p:childTnLst>
+                                </p:cTn>
+                              </p:par>
+                            </p:childTnLst>
+                          </p:cTn>
+                        </p:par>
+                      </p:childTnLst>
+                    </p:cTn>
+                  </p:par>
+                  <p:par>
+                    <p:cTn id="11" fill="hold">
+                      <p:stCondLst>
+                        <p:cond delay="indefinite"/>
+                      </p:stCondLst>
+                      <p:childTnLst>
+                        <p:par>
+                          <p:cTn id="12" fill="hold">
+                            <p:stCondLst>
+                              <p:cond delay="0"/>
+                            </p:stCondLst>
+                            <p:childTnLst>
+                              <p:par>
+                                <p:cTn id="13" presetID="1" presetClass="entr" presetSubtype="0" fill="hold" nodeType="clickEffect">
+                                  <p:stCondLst>
+                                    <p:cond delay="0"/>
+                                  </p:stCondLst>
+                                  <p:childTnLst>
+                                    <p:set>
+                                      <p:cBhvr>
+                                        <p:cTn id="14" dur="1" fill="hold">
+                                          <p:stCondLst>
+                                            <p:cond delay="0"/>
+                                          </p:stCondLst>
+                                        </p:cTn>
+                                        <p:tgtEl>
+                                          <p:spTgt spid="2">
+                                            <p:txEl>
+                                              <p:pRg st="6" end="6"/>
+                                            </p:txEl>
+                                          </p:spTgt>
+                                        </p:tgtEl>
+                                        <p:attrNameLst>
+                                          <p:attrName>style.visibility</p:attrName>
+                                        </p:attrNameLst>
+                                      </p:cBhvr>
+                                      <p:to>
+                                        <p:strVal val="visible"/>
+                                      </p:to>
+                                    </p:set>
+                                  </p:childTnLst>
+                                </p:cTn>
+                              </p:par>
+                            </p:childTnLst>
+                          </p:cTn>
+                        </p:par>
+                      </p:childTnLst>
+                    </p:cTn>
+                  </p:par>
+                </p:childTnLst>
+              </p:cTn>
+              <p:prevCondLst>
+                <p:cond evt="onPrev" delay="0">
+                  <p:tgtEl>
+                    <p:sldTgt/>
+                  </p:tgtEl>
+                </p:cond>
+              </p:prevCondLst>
+              <p:nextCondLst>
+                <p:cond evt="onNext" delay="0">
+                  <p:tgtEl>
+                    <p:sldTgt/>
+                  </p:tgtEl>
+                </p:cond>
+              </p:nextCondLst>
+            </p:seq>
+          </p:childTnLst>
+        </p:cTn>
       </p:par>
     </p:tnLst>
   </p:timing>
@@ -8914,15 +9431,7 @@
             </a:pPr>
             <a:r>
               <a:rPr lang="he-IL" dirty="0" smtClean="0"/>
-              <a:t>כיצד </a:t>
-            </a:r>
-            <a:r>
-              <a:rPr lang="he-IL" dirty="0" smtClean="0"/>
-              <a:t>נתמודד עם מגבלות הנ"ל</a:t>
-            </a:r>
-            <a:r>
-              <a:rPr lang="he-IL" dirty="0" smtClean="0"/>
-              <a:t>?</a:t>
+              <a:t>כיצד נתמודד עם מגבלות הנ"ל?</a:t>
             </a:r>
             <a:endParaRPr lang="he-IL" dirty="0"/>
           </a:p>
@@ -8932,11 +9441,7 @@
             </a:pPr>
             <a:r>
               <a:rPr lang="he-IL" dirty="0" smtClean="0"/>
-              <a:t>פתרון</a:t>
-            </a:r>
-            <a:r>
-              <a:rPr lang="he-IL" dirty="0" smtClean="0"/>
-              <a:t>: </a:t>
+              <a:t>פתרון: </a:t>
             </a:r>
             <a:r>
               <a:rPr lang="en-US" dirty="0" smtClean="0"/>
@@ -9017,7 +9522,216 @@
   <p:timing>
     <p:tnLst>
       <p:par>
-        <p:cTn id="1" dur="indefinite" restart="never" nodeType="tmRoot"/>
+        <p:cTn id="1" dur="indefinite" restart="never" nodeType="tmRoot">
+          <p:childTnLst>
+            <p:seq concurrent="1" nextAc="seek">
+              <p:cTn id="2" dur="indefinite" nodeType="mainSeq">
+                <p:childTnLst>
+                  <p:par>
+                    <p:cTn id="3" fill="hold">
+                      <p:stCondLst>
+                        <p:cond delay="indefinite"/>
+                      </p:stCondLst>
+                      <p:childTnLst>
+                        <p:par>
+                          <p:cTn id="4" fill="hold">
+                            <p:stCondLst>
+                              <p:cond delay="0"/>
+                            </p:stCondLst>
+                            <p:childTnLst>
+                              <p:par>
+                                <p:cTn id="5" presetID="1" presetClass="entr" presetSubtype="0" fill="hold" nodeType="clickEffect">
+                                  <p:stCondLst>
+                                    <p:cond delay="0"/>
+                                  </p:stCondLst>
+                                  <p:childTnLst>
+                                    <p:set>
+                                      <p:cBhvr>
+                                        <p:cTn id="6" dur="1" fill="hold">
+                                          <p:stCondLst>
+                                            <p:cond delay="0"/>
+                                          </p:stCondLst>
+                                        </p:cTn>
+                                        <p:tgtEl>
+                                          <p:spTgt spid="2">
+                                            <p:txEl>
+                                              <p:pRg st="1" end="1"/>
+                                            </p:txEl>
+                                          </p:spTgt>
+                                        </p:tgtEl>
+                                        <p:attrNameLst>
+                                          <p:attrName>style.visibility</p:attrName>
+                                        </p:attrNameLst>
+                                      </p:cBhvr>
+                                      <p:to>
+                                        <p:strVal val="visible"/>
+                                      </p:to>
+                                    </p:set>
+                                  </p:childTnLst>
+                                </p:cTn>
+                              </p:par>
+                              <p:par>
+                                <p:cTn id="7" presetID="1" presetClass="entr" presetSubtype="0" fill="hold" nodeType="withEffect">
+                                  <p:stCondLst>
+                                    <p:cond delay="0"/>
+                                  </p:stCondLst>
+                                  <p:childTnLst>
+                                    <p:set>
+                                      <p:cBhvr>
+                                        <p:cTn id="8" dur="1" fill="hold">
+                                          <p:stCondLst>
+                                            <p:cond delay="0"/>
+                                          </p:stCondLst>
+                                        </p:cTn>
+                                        <p:tgtEl>
+                                          <p:spTgt spid="4"/>
+                                        </p:tgtEl>
+                                        <p:attrNameLst>
+                                          <p:attrName>style.visibility</p:attrName>
+                                        </p:attrNameLst>
+                                      </p:cBhvr>
+                                      <p:to>
+                                        <p:strVal val="visible"/>
+                                      </p:to>
+                                    </p:set>
+                                  </p:childTnLst>
+                                </p:cTn>
+                              </p:par>
+                            </p:childTnLst>
+                          </p:cTn>
+                        </p:par>
+                      </p:childTnLst>
+                    </p:cTn>
+                  </p:par>
+                  <p:par>
+                    <p:cTn id="9" fill="hold">
+                      <p:stCondLst>
+                        <p:cond delay="indefinite"/>
+                      </p:stCondLst>
+                      <p:childTnLst>
+                        <p:par>
+                          <p:cTn id="10" fill="hold">
+                            <p:stCondLst>
+                              <p:cond delay="0"/>
+                            </p:stCondLst>
+                            <p:childTnLst>
+                              <p:par>
+                                <p:cTn id="11" presetID="1" presetClass="entr" presetSubtype="0" fill="hold" nodeType="clickEffect">
+                                  <p:stCondLst>
+                                    <p:cond delay="0"/>
+                                  </p:stCondLst>
+                                  <p:childTnLst>
+                                    <p:set>
+                                      <p:cBhvr>
+                                        <p:cTn id="12" dur="1" fill="hold">
+                                          <p:stCondLst>
+                                            <p:cond delay="0"/>
+                                          </p:stCondLst>
+                                        </p:cTn>
+                                        <p:tgtEl>
+                                          <p:spTgt spid="2">
+                                            <p:txEl>
+                                              <p:pRg st="8" end="8"/>
+                                            </p:txEl>
+                                          </p:spTgt>
+                                        </p:tgtEl>
+                                        <p:attrNameLst>
+                                          <p:attrName>style.visibility</p:attrName>
+                                        </p:attrNameLst>
+                                      </p:cBhvr>
+                                      <p:to>
+                                        <p:strVal val="visible"/>
+                                      </p:to>
+                                    </p:set>
+                                  </p:childTnLst>
+                                </p:cTn>
+                              </p:par>
+                            </p:childTnLst>
+                          </p:cTn>
+                        </p:par>
+                      </p:childTnLst>
+                    </p:cTn>
+                  </p:par>
+                  <p:par>
+                    <p:cTn id="13" fill="hold">
+                      <p:stCondLst>
+                        <p:cond delay="indefinite"/>
+                      </p:stCondLst>
+                      <p:childTnLst>
+                        <p:par>
+                          <p:cTn id="14" fill="hold">
+                            <p:stCondLst>
+                              <p:cond delay="0"/>
+                            </p:stCondLst>
+                            <p:childTnLst>
+                              <p:par>
+                                <p:cTn id="15" presetID="6" presetClass="entr" presetSubtype="16" fill="hold" nodeType="clickEffect">
+                                  <p:stCondLst>
+                                    <p:cond delay="0"/>
+                                  </p:stCondLst>
+                                  <p:childTnLst>
+                                    <p:set>
+                                      <p:cBhvr>
+                                        <p:cTn id="16" dur="1" fill="hold">
+                                          <p:stCondLst>
+                                            <p:cond delay="0"/>
+                                          </p:stCondLst>
+                                        </p:cTn>
+                                        <p:tgtEl>
+                                          <p:spTgt spid="2">
+                                            <p:txEl>
+                                              <p:pRg st="9" end="9"/>
+                                            </p:txEl>
+                                          </p:spTgt>
+                                        </p:tgtEl>
+                                        <p:attrNameLst>
+                                          <p:attrName>style.visibility</p:attrName>
+                                        </p:attrNameLst>
+                                      </p:cBhvr>
+                                      <p:to>
+                                        <p:strVal val="visible"/>
+                                      </p:to>
+                                    </p:set>
+                                    <p:animEffect transition="in" filter="circle(in)">
+                                      <p:cBhvr>
+                                        <p:cTn id="17" dur="2000"/>
+                                        <p:tgtEl>
+                                          <p:spTgt spid="2">
+                                            <p:txEl>
+                                              <p:pRg st="9" end="9"/>
+                                            </p:txEl>
+                                          </p:spTgt>
+                                        </p:tgtEl>
+                                      </p:cBhvr>
+                                    </p:animEffect>
+                                  </p:childTnLst>
+                                </p:cTn>
+                              </p:par>
+                            </p:childTnLst>
+                          </p:cTn>
+                        </p:par>
+                      </p:childTnLst>
+                    </p:cTn>
+                  </p:par>
+                </p:childTnLst>
+              </p:cTn>
+              <p:prevCondLst>
+                <p:cond evt="onPrev" delay="0">
+                  <p:tgtEl>
+                    <p:sldTgt/>
+                  </p:tgtEl>
+                </p:cond>
+              </p:prevCondLst>
+              <p:nextCondLst>
+                <p:cond evt="onNext" delay="0">
+                  <p:tgtEl>
+                    <p:sldTgt/>
+                  </p:tgtEl>
+                </p:cond>
+              </p:nextCondLst>
+            </p:seq>
+          </p:childTnLst>
+        </p:cTn>
       </p:par>
     </p:tnLst>
   </p:timing>
@@ -9237,7 +9951,217 @@
   <p:timing>
     <p:tnLst>
       <p:par>
-        <p:cTn id="1" dur="indefinite" restart="never" nodeType="tmRoot"/>
+        <p:cTn id="1" dur="indefinite" restart="never" nodeType="tmRoot">
+          <p:childTnLst>
+            <p:seq concurrent="1" nextAc="seek">
+              <p:cTn id="2" dur="indefinite" nodeType="mainSeq">
+                <p:childTnLst>
+                  <p:par>
+                    <p:cTn id="3" fill="hold">
+                      <p:stCondLst>
+                        <p:cond delay="indefinite"/>
+                      </p:stCondLst>
+                      <p:childTnLst>
+                        <p:par>
+                          <p:cTn id="4" fill="hold">
+                            <p:stCondLst>
+                              <p:cond delay="0"/>
+                            </p:stCondLst>
+                            <p:childTnLst>
+                              <p:par>
+                                <p:cTn id="5" presetID="1" presetClass="entr" presetSubtype="0" fill="hold" nodeType="clickEffect">
+                                  <p:stCondLst>
+                                    <p:cond delay="0"/>
+                                  </p:stCondLst>
+                                  <p:childTnLst>
+                                    <p:set>
+                                      <p:cBhvr>
+                                        <p:cTn id="6" dur="1" fill="hold">
+                                          <p:stCondLst>
+                                            <p:cond delay="0"/>
+                                          </p:stCondLst>
+                                        </p:cTn>
+                                        <p:tgtEl>
+                                          <p:spTgt spid="2">
+                                            <p:txEl>
+                                              <p:pRg st="0" end="0"/>
+                                            </p:txEl>
+                                          </p:spTgt>
+                                        </p:tgtEl>
+                                        <p:attrNameLst>
+                                          <p:attrName>style.visibility</p:attrName>
+                                        </p:attrNameLst>
+                                      </p:cBhvr>
+                                      <p:to>
+                                        <p:strVal val="visible"/>
+                                      </p:to>
+                                    </p:set>
+                                  </p:childTnLst>
+                                </p:cTn>
+                              </p:par>
+                              <p:par>
+                                <p:cTn id="7" presetID="1" presetClass="entr" presetSubtype="0" fill="hold" nodeType="withEffect">
+                                  <p:stCondLst>
+                                    <p:cond delay="0"/>
+                                  </p:stCondLst>
+                                  <p:childTnLst>
+                                    <p:set>
+                                      <p:cBhvr>
+                                        <p:cTn id="8" dur="1" fill="hold">
+                                          <p:stCondLst>
+                                            <p:cond delay="0"/>
+                                          </p:stCondLst>
+                                        </p:cTn>
+                                        <p:tgtEl>
+                                          <p:spTgt spid="4"/>
+                                        </p:tgtEl>
+                                        <p:attrNameLst>
+                                          <p:attrName>style.visibility</p:attrName>
+                                        </p:attrNameLst>
+                                      </p:cBhvr>
+                                      <p:to>
+                                        <p:strVal val="visible"/>
+                                      </p:to>
+                                    </p:set>
+                                  </p:childTnLst>
+                                </p:cTn>
+                              </p:par>
+                            </p:childTnLst>
+                          </p:cTn>
+                        </p:par>
+                      </p:childTnLst>
+                    </p:cTn>
+                  </p:par>
+                  <p:par>
+                    <p:cTn id="9" fill="hold">
+                      <p:stCondLst>
+                        <p:cond delay="indefinite"/>
+                      </p:stCondLst>
+                      <p:childTnLst>
+                        <p:par>
+                          <p:cTn id="10" fill="hold">
+                            <p:stCondLst>
+                              <p:cond delay="0"/>
+                            </p:stCondLst>
+                            <p:childTnLst>
+                              <p:par>
+                                <p:cTn id="11" presetID="1" presetClass="entr" presetSubtype="0" fill="hold" nodeType="clickEffect">
+                                  <p:stCondLst>
+                                    <p:cond delay="0"/>
+                                  </p:stCondLst>
+                                  <p:childTnLst>
+                                    <p:set>
+                                      <p:cBhvr>
+                                        <p:cTn id="12" dur="1" fill="hold">
+                                          <p:stCondLst>
+                                            <p:cond delay="0"/>
+                                          </p:stCondLst>
+                                        </p:cTn>
+                                        <p:tgtEl>
+                                          <p:spTgt spid="2">
+                                            <p:txEl>
+                                              <p:pRg st="6" end="6"/>
+                                            </p:txEl>
+                                          </p:spTgt>
+                                        </p:tgtEl>
+                                        <p:attrNameLst>
+                                          <p:attrName>style.visibility</p:attrName>
+                                        </p:attrNameLst>
+                                      </p:cBhvr>
+                                      <p:to>
+                                        <p:strVal val="visible"/>
+                                      </p:to>
+                                    </p:set>
+                                  </p:childTnLst>
+                                </p:cTn>
+                              </p:par>
+                              <p:par>
+                                <p:cTn id="13" presetID="1" presetClass="entr" presetSubtype="0" fill="hold" nodeType="withEffect">
+                                  <p:stCondLst>
+                                    <p:cond delay="0"/>
+                                  </p:stCondLst>
+                                  <p:childTnLst>
+                                    <p:set>
+                                      <p:cBhvr>
+                                        <p:cTn id="14" dur="1" fill="hold">
+                                          <p:stCondLst>
+                                            <p:cond delay="0"/>
+                                          </p:stCondLst>
+                                        </p:cTn>
+                                        <p:tgtEl>
+                                          <p:spTgt spid="2">
+                                            <p:txEl>
+                                              <p:pRg st="7" end="7"/>
+                                            </p:txEl>
+                                          </p:spTgt>
+                                        </p:tgtEl>
+                                        <p:attrNameLst>
+                                          <p:attrName>style.visibility</p:attrName>
+                                        </p:attrNameLst>
+                                      </p:cBhvr>
+                                      <p:to>
+                                        <p:strVal val="visible"/>
+                                      </p:to>
+                                    </p:set>
+                                  </p:childTnLst>
+                                </p:cTn>
+                              </p:par>
+                              <p:par>
+                                <p:cTn id="15" presetID="1" presetClass="entr" presetSubtype="0" fill="hold" nodeType="withEffect">
+                                  <p:stCondLst>
+                                    <p:cond delay="0"/>
+                                  </p:stCondLst>
+                                  <p:childTnLst>
+                                    <p:set>
+                                      <p:cBhvr>
+                                        <p:cTn id="16" dur="1" fill="hold">
+                                          <p:stCondLst>
+                                            <p:cond delay="0"/>
+                                          </p:stCondLst>
+                                        </p:cTn>
+                                        <p:tgtEl>
+                                          <p:spTgt spid="2">
+                                            <p:txEl>
+                                              <p:pRg st="8" end="8"/>
+                                            </p:txEl>
+                                          </p:spTgt>
+                                        </p:tgtEl>
+                                        <p:attrNameLst>
+                                          <p:attrName>style.visibility</p:attrName>
+                                        </p:attrNameLst>
+                                      </p:cBhvr>
+                                      <p:to>
+                                        <p:strVal val="visible"/>
+                                      </p:to>
+                                    </p:set>
+                                  </p:childTnLst>
+                                </p:cTn>
+                              </p:par>
+                            </p:childTnLst>
+                          </p:cTn>
+                        </p:par>
+                      </p:childTnLst>
+                    </p:cTn>
+                  </p:par>
+                </p:childTnLst>
+              </p:cTn>
+              <p:prevCondLst>
+                <p:cond evt="onPrev" delay="0">
+                  <p:tgtEl>
+                    <p:sldTgt/>
+                  </p:tgtEl>
+                </p:cond>
+              </p:prevCondLst>
+              <p:nextCondLst>
+                <p:cond evt="onNext" delay="0">
+                  <p:tgtEl>
+                    <p:sldTgt/>
+                  </p:tgtEl>
+                </p:cond>
+              </p:nextCondLst>
+            </p:seq>
+          </p:childTnLst>
+        </p:cTn>
       </p:par>
     </p:tnLst>
   </p:timing>
@@ -9274,12 +10198,12 @@
         <p:spPr>
           <a:xfrm>
             <a:off x="0" y="2248347"/>
-            <a:ext cx="9036496" cy="4276997"/>
+            <a:ext cx="9144000" cy="4276997"/>
           </a:xfrm>
         </p:spPr>
         <p:txBody>
           <a:bodyPr>
-            <a:normAutofit lnSpcReduction="10000"/>
+            <a:normAutofit/>
           </a:bodyPr>
           <a:lstStyle/>
           <a:p>
@@ -9382,7 +10306,7 @@
               <a:t>תישקל אפשרות להשמת האלגוריתם על התקני </a:t>
             </a:r>
             <a:r>
-              <a:rPr lang="en-US" sz="2000" dirty="0"/>
+              <a:rPr lang="en-US" sz="1800" dirty="0"/>
               <a:t>WIFI </a:t>
             </a:r>
             <a:r>
@@ -9390,7 +10314,7 @@
               <a:t>אמיתיים אשר תומכים בפרוטוקול </a:t>
             </a:r>
             <a:r>
-              <a:rPr lang="en-US" sz="2000" dirty="0"/>
+              <a:rPr lang="en-US" sz="1600" dirty="0" smtClean="0"/>
               <a:t>TDLS</a:t>
             </a:r>
             <a:endParaRPr lang="he-IL" sz="2000" dirty="0"/>
@@ -9441,7 +10365,324 @@
   <p:timing>
     <p:tnLst>
       <p:par>
-        <p:cTn id="1" dur="indefinite" restart="never" nodeType="tmRoot"/>
+        <p:cTn id="1" dur="indefinite" restart="never" nodeType="tmRoot">
+          <p:childTnLst>
+            <p:seq concurrent="1" nextAc="seek">
+              <p:cTn id="2" dur="indefinite" nodeType="mainSeq">
+                <p:childTnLst>
+                  <p:par>
+                    <p:cTn id="3" fill="hold">
+                      <p:stCondLst>
+                        <p:cond delay="indefinite"/>
+                      </p:stCondLst>
+                      <p:childTnLst>
+                        <p:par>
+                          <p:cTn id="4" fill="hold">
+                            <p:stCondLst>
+                              <p:cond delay="0"/>
+                            </p:stCondLst>
+                            <p:childTnLst>
+                              <p:par>
+                                <p:cTn id="5" presetID="1" presetClass="entr" presetSubtype="0" fill="hold" nodeType="clickEffect">
+                                  <p:stCondLst>
+                                    <p:cond delay="0"/>
+                                  </p:stCondLst>
+                                  <p:childTnLst>
+                                    <p:set>
+                                      <p:cBhvr>
+                                        <p:cTn id="6" dur="1" fill="hold">
+                                          <p:stCondLst>
+                                            <p:cond delay="0"/>
+                                          </p:stCondLst>
+                                        </p:cTn>
+                                        <p:tgtEl>
+                                          <p:spTgt spid="2">
+                                            <p:txEl>
+                                              <p:pRg st="0" end="0"/>
+                                            </p:txEl>
+                                          </p:spTgt>
+                                        </p:tgtEl>
+                                        <p:attrNameLst>
+                                          <p:attrName>style.visibility</p:attrName>
+                                        </p:attrNameLst>
+                                      </p:cBhvr>
+                                      <p:to>
+                                        <p:strVal val="visible"/>
+                                      </p:to>
+                                    </p:set>
+                                  </p:childTnLst>
+                                </p:cTn>
+                              </p:par>
+                            </p:childTnLst>
+                          </p:cTn>
+                        </p:par>
+                      </p:childTnLst>
+                    </p:cTn>
+                  </p:par>
+                  <p:par>
+                    <p:cTn id="7" fill="hold">
+                      <p:stCondLst>
+                        <p:cond delay="indefinite"/>
+                      </p:stCondLst>
+                      <p:childTnLst>
+                        <p:par>
+                          <p:cTn id="8" fill="hold">
+                            <p:stCondLst>
+                              <p:cond delay="0"/>
+                            </p:stCondLst>
+                            <p:childTnLst>
+                              <p:par>
+                                <p:cTn id="9" presetID="1" presetClass="entr" presetSubtype="0" fill="hold" nodeType="clickEffect">
+                                  <p:stCondLst>
+                                    <p:cond delay="0"/>
+                                  </p:stCondLst>
+                                  <p:childTnLst>
+                                    <p:set>
+                                      <p:cBhvr>
+                                        <p:cTn id="10" dur="1" fill="hold">
+                                          <p:stCondLst>
+                                            <p:cond delay="0"/>
+                                          </p:stCondLst>
+                                        </p:cTn>
+                                        <p:tgtEl>
+                                          <p:spTgt spid="2">
+                                            <p:txEl>
+                                              <p:pRg st="2" end="2"/>
+                                            </p:txEl>
+                                          </p:spTgt>
+                                        </p:tgtEl>
+                                        <p:attrNameLst>
+                                          <p:attrName>style.visibility</p:attrName>
+                                        </p:attrNameLst>
+                                      </p:cBhvr>
+                                      <p:to>
+                                        <p:strVal val="visible"/>
+                                      </p:to>
+                                    </p:set>
+                                  </p:childTnLst>
+                                </p:cTn>
+                              </p:par>
+                            </p:childTnLst>
+                          </p:cTn>
+                        </p:par>
+                      </p:childTnLst>
+                    </p:cTn>
+                  </p:par>
+                  <p:par>
+                    <p:cTn id="11" fill="hold">
+                      <p:stCondLst>
+                        <p:cond delay="indefinite"/>
+                      </p:stCondLst>
+                      <p:childTnLst>
+                        <p:par>
+                          <p:cTn id="12" fill="hold">
+                            <p:stCondLst>
+                              <p:cond delay="0"/>
+                            </p:stCondLst>
+                            <p:childTnLst>
+                              <p:par>
+                                <p:cTn id="13" presetID="1" presetClass="entr" presetSubtype="0" fill="hold" nodeType="clickEffect">
+                                  <p:stCondLst>
+                                    <p:cond delay="0"/>
+                                  </p:stCondLst>
+                                  <p:childTnLst>
+                                    <p:set>
+                                      <p:cBhvr>
+                                        <p:cTn id="14" dur="1" fill="hold">
+                                          <p:stCondLst>
+                                            <p:cond delay="0"/>
+                                          </p:stCondLst>
+                                        </p:cTn>
+                                        <p:tgtEl>
+                                          <p:spTgt spid="2">
+                                            <p:txEl>
+                                              <p:pRg st="4" end="4"/>
+                                            </p:txEl>
+                                          </p:spTgt>
+                                        </p:tgtEl>
+                                        <p:attrNameLst>
+                                          <p:attrName>style.visibility</p:attrName>
+                                        </p:attrNameLst>
+                                      </p:cBhvr>
+                                      <p:to>
+                                        <p:strVal val="visible"/>
+                                      </p:to>
+                                    </p:set>
+                                  </p:childTnLst>
+                                </p:cTn>
+                              </p:par>
+                            </p:childTnLst>
+                          </p:cTn>
+                        </p:par>
+                      </p:childTnLst>
+                    </p:cTn>
+                  </p:par>
+                  <p:par>
+                    <p:cTn id="15" fill="hold">
+                      <p:stCondLst>
+                        <p:cond delay="indefinite"/>
+                      </p:stCondLst>
+                      <p:childTnLst>
+                        <p:par>
+                          <p:cTn id="16" fill="hold">
+                            <p:stCondLst>
+                              <p:cond delay="0"/>
+                            </p:stCondLst>
+                            <p:childTnLst>
+                              <p:par>
+                                <p:cTn id="17" presetID="1" presetClass="entr" presetSubtype="0" fill="hold" nodeType="clickEffect">
+                                  <p:stCondLst>
+                                    <p:cond delay="0"/>
+                                  </p:stCondLst>
+                                  <p:childTnLst>
+                                    <p:set>
+                                      <p:cBhvr>
+                                        <p:cTn id="18" dur="1" fill="hold">
+                                          <p:stCondLst>
+                                            <p:cond delay="0"/>
+                                          </p:stCondLst>
+                                        </p:cTn>
+                                        <p:tgtEl>
+                                          <p:spTgt spid="2">
+                                            <p:txEl>
+                                              <p:pRg st="6" end="6"/>
+                                            </p:txEl>
+                                          </p:spTgt>
+                                        </p:tgtEl>
+                                        <p:attrNameLst>
+                                          <p:attrName>style.visibility</p:attrName>
+                                        </p:attrNameLst>
+                                      </p:cBhvr>
+                                      <p:to>
+                                        <p:strVal val="visible"/>
+                                      </p:to>
+                                    </p:set>
+                                  </p:childTnLst>
+                                </p:cTn>
+                              </p:par>
+                            </p:childTnLst>
+                          </p:cTn>
+                        </p:par>
+                      </p:childTnLst>
+                    </p:cTn>
+                  </p:par>
+                  <p:par>
+                    <p:cTn id="19" fill="hold">
+                      <p:stCondLst>
+                        <p:cond delay="indefinite"/>
+                      </p:stCondLst>
+                      <p:childTnLst>
+                        <p:par>
+                          <p:cTn id="20" fill="hold">
+                            <p:stCondLst>
+                              <p:cond delay="0"/>
+                            </p:stCondLst>
+                            <p:childTnLst>
+                              <p:par>
+                                <p:cTn id="21" presetID="1" presetClass="entr" presetSubtype="0" fill="hold" nodeType="clickEffect">
+                                  <p:stCondLst>
+                                    <p:cond delay="0"/>
+                                  </p:stCondLst>
+                                  <p:childTnLst>
+                                    <p:set>
+                                      <p:cBhvr>
+                                        <p:cTn id="22" dur="1" fill="hold">
+                                          <p:stCondLst>
+                                            <p:cond delay="0"/>
+                                          </p:stCondLst>
+                                        </p:cTn>
+                                        <p:tgtEl>
+                                          <p:spTgt spid="2">
+                                            <p:txEl>
+                                              <p:pRg st="8" end="8"/>
+                                            </p:txEl>
+                                          </p:spTgt>
+                                        </p:tgtEl>
+                                        <p:attrNameLst>
+                                          <p:attrName>style.visibility</p:attrName>
+                                        </p:attrNameLst>
+                                      </p:cBhvr>
+                                      <p:to>
+                                        <p:strVal val="visible"/>
+                                      </p:to>
+                                    </p:set>
+                                  </p:childTnLst>
+                                </p:cTn>
+                              </p:par>
+                            </p:childTnLst>
+                          </p:cTn>
+                        </p:par>
+                      </p:childTnLst>
+                    </p:cTn>
+                  </p:par>
+                  <p:par>
+                    <p:cTn id="23" fill="hold">
+                      <p:stCondLst>
+                        <p:cond delay="indefinite"/>
+                      </p:stCondLst>
+                      <p:childTnLst>
+                        <p:par>
+                          <p:cTn id="24" fill="hold">
+                            <p:stCondLst>
+                              <p:cond delay="0"/>
+                            </p:stCondLst>
+                            <p:childTnLst>
+                              <p:par>
+                                <p:cTn id="25" presetID="1" presetClass="entr" presetSubtype="0" fill="hold" nodeType="clickEffect">
+                                  <p:stCondLst>
+                                    <p:cond delay="0"/>
+                                  </p:stCondLst>
+                                  <p:childTnLst>
+                                    <p:set>
+                                      <p:cBhvr>
+                                        <p:cTn id="26" dur="1" fill="hold">
+                                          <p:stCondLst>
+                                            <p:cond delay="0"/>
+                                          </p:stCondLst>
+                                        </p:cTn>
+                                        <p:tgtEl>
+                                          <p:spTgt spid="2">
+                                            <p:txEl>
+                                              <p:pRg st="10" end="10"/>
+                                            </p:txEl>
+                                          </p:spTgt>
+                                        </p:tgtEl>
+                                        <p:attrNameLst>
+                                          <p:attrName>style.visibility</p:attrName>
+                                        </p:attrNameLst>
+                                      </p:cBhvr>
+                                      <p:to>
+                                        <p:strVal val="visible"/>
+                                      </p:to>
+                                    </p:set>
+                                  </p:childTnLst>
+                                </p:cTn>
+                              </p:par>
+                            </p:childTnLst>
+                          </p:cTn>
+                        </p:par>
+                      </p:childTnLst>
+                    </p:cTn>
+                  </p:par>
+                </p:childTnLst>
+              </p:cTn>
+              <p:prevCondLst>
+                <p:cond evt="onPrev" delay="0">
+                  <p:tgtEl>
+                    <p:sldTgt/>
+                  </p:tgtEl>
+                </p:cond>
+              </p:prevCondLst>
+              <p:nextCondLst>
+                <p:cond evt="onNext" delay="0">
+                  <p:tgtEl>
+                    <p:sldTgt/>
+                  </p:tgtEl>
+                </p:cond>
+              </p:nextCondLst>
+            </p:seq>
+          </p:childTnLst>
+        </p:cTn>
       </p:par>
     </p:tnLst>
   </p:timing>
@@ -9613,7 +10854,155 @@
   <p:timing>
     <p:tnLst>
       <p:par>
-        <p:cTn id="1" dur="indefinite" restart="never" nodeType="tmRoot"/>
+        <p:cTn id="1" dur="indefinite" restart="never" nodeType="tmRoot">
+          <p:childTnLst>
+            <p:seq concurrent="1" nextAc="seek">
+              <p:cTn id="2" dur="indefinite" nodeType="mainSeq">
+                <p:childTnLst>
+                  <p:par>
+                    <p:cTn id="3" fill="hold">
+                      <p:stCondLst>
+                        <p:cond delay="indefinite"/>
+                      </p:stCondLst>
+                      <p:childTnLst>
+                        <p:par>
+                          <p:cTn id="4" fill="hold">
+                            <p:stCondLst>
+                              <p:cond delay="0"/>
+                            </p:stCondLst>
+                            <p:childTnLst>
+                              <p:par>
+                                <p:cTn id="5" presetID="1" presetClass="entr" presetSubtype="0" fill="hold" nodeType="clickEffect">
+                                  <p:stCondLst>
+                                    <p:cond delay="0"/>
+                                  </p:stCondLst>
+                                  <p:childTnLst>
+                                    <p:set>
+                                      <p:cBhvr>
+                                        <p:cTn id="6" dur="1" fill="hold">
+                                          <p:stCondLst>
+                                            <p:cond delay="0"/>
+                                          </p:stCondLst>
+                                        </p:cTn>
+                                        <p:tgtEl>
+                                          <p:spTgt spid="2">
+                                            <p:txEl>
+                                              <p:pRg st="0" end="0"/>
+                                            </p:txEl>
+                                          </p:spTgt>
+                                        </p:tgtEl>
+                                        <p:attrNameLst>
+                                          <p:attrName>style.visibility</p:attrName>
+                                        </p:attrNameLst>
+                                      </p:cBhvr>
+                                      <p:to>
+                                        <p:strVal val="visible"/>
+                                      </p:to>
+                                    </p:set>
+                                  </p:childTnLst>
+                                </p:cTn>
+                              </p:par>
+                              <p:par>
+                                <p:cTn id="7" presetID="1" presetClass="entr" presetSubtype="0" fill="hold" nodeType="withEffect">
+                                  <p:stCondLst>
+                                    <p:cond delay="0"/>
+                                  </p:stCondLst>
+                                  <p:childTnLst>
+                                    <p:set>
+                                      <p:cBhvr>
+                                        <p:cTn id="8" dur="1" fill="hold">
+                                          <p:stCondLst>
+                                            <p:cond delay="0"/>
+                                          </p:stCondLst>
+                                        </p:cTn>
+                                        <p:tgtEl>
+                                          <p:spTgt spid="4"/>
+                                        </p:tgtEl>
+                                        <p:attrNameLst>
+                                          <p:attrName>style.visibility</p:attrName>
+                                        </p:attrNameLst>
+                                      </p:cBhvr>
+                                      <p:to>
+                                        <p:strVal val="visible"/>
+                                      </p:to>
+                                    </p:set>
+                                  </p:childTnLst>
+                                </p:cTn>
+                              </p:par>
+                            </p:childTnLst>
+                          </p:cTn>
+                        </p:par>
+                      </p:childTnLst>
+                    </p:cTn>
+                  </p:par>
+                  <p:par>
+                    <p:cTn id="9" fill="hold">
+                      <p:stCondLst>
+                        <p:cond delay="indefinite"/>
+                      </p:stCondLst>
+                      <p:childTnLst>
+                        <p:par>
+                          <p:cTn id="10" fill="hold">
+                            <p:stCondLst>
+                              <p:cond delay="0"/>
+                            </p:stCondLst>
+                            <p:childTnLst>
+                              <p:par>
+                                <p:cTn id="11" presetID="1" presetClass="entr" presetSubtype="0" fill="hold" nodeType="clickEffect">
+                                  <p:stCondLst>
+                                    <p:cond delay="0"/>
+                                  </p:stCondLst>
+                                  <p:childTnLst>
+                                    <p:set>
+                                      <p:cBhvr>
+                                        <p:cTn id="12" dur="1" fill="hold">
+                                          <p:stCondLst>
+                                            <p:cond delay="0"/>
+                                          </p:stCondLst>
+                                        </p:cTn>
+                                        <p:tgtEl>
+                                          <p:spTgt spid="2">
+                                            <p:txEl>
+                                              <p:pRg st="5" end="5"/>
+                                            </p:txEl>
+                                          </p:spTgt>
+                                        </p:tgtEl>
+                                        <p:attrNameLst>
+                                          <p:attrName>style.visibility</p:attrName>
+                                        </p:attrNameLst>
+                                      </p:cBhvr>
+                                      <p:to>
+                                        <p:strVal val="visible"/>
+                                      </p:to>
+                                    </p:set>
+                                  </p:childTnLst>
+                                </p:cTn>
+                              </p:par>
+                            </p:childTnLst>
+                          </p:cTn>
+                        </p:par>
+                      </p:childTnLst>
+                    </p:cTn>
+                  </p:par>
+                </p:childTnLst>
+              </p:cTn>
+              <p:prevCondLst>
+                <p:cond evt="onPrev" delay="0">
+                  <p:tgtEl>
+                    <p:sldTgt/>
+                  </p:tgtEl>
+                </p:cond>
+              </p:prevCondLst>
+              <p:nextCondLst>
+                <p:cond evt="onNext" delay="0">
+                  <p:tgtEl>
+                    <p:sldTgt/>
+                  </p:tgtEl>
+                </p:cond>
+              </p:nextCondLst>
+            </p:seq>
+          </p:childTnLst>
+        </p:cTn>
       </p:par>
     </p:tnLst>
   </p:timing>

</xml_diff>